<commit_message>
KMeans HTML page start.
</commit_message>
<xml_diff>
--- a/Additional Content/App Storyboard.pptx
+++ b/Additional Content/App Storyboard.pptx
@@ -4,6 +4,9 @@
   <p:sldMasterIdLst>
     <p:sldMasterId id="2147483648" r:id="rId1"/>
   </p:sldMasterIdLst>
+  <p:notesMasterIdLst>
+    <p:notesMasterId r:id="rId13"/>
+  </p:notesMasterIdLst>
   <p:sldIdLst>
     <p:sldId id="256" r:id="rId2"/>
     <p:sldId id="257" r:id="rId3"/>
@@ -122,6 +125,442 @@
 </p:presentation>
 </file>
 
+<file path=ppt/notesMasters/notesMaster1.xml><?xml version="1.0" encoding="utf-8"?>
+<p:notesMaster xmlns:a="http://schemas.openxmlformats.org/drawingml/2006/main" xmlns:r="http://schemas.openxmlformats.org/officeDocument/2006/relationships" xmlns:p="http://schemas.openxmlformats.org/presentationml/2006/main">
+  <p:cSld>
+    <p:bg>
+      <p:bgRef idx="1001">
+        <a:schemeClr val="bg1"/>
+      </p:bgRef>
+    </p:bg>
+    <p:spTree>
+      <p:nvGrpSpPr>
+        <p:cNvPr id="1" name=""/>
+        <p:cNvGrpSpPr/>
+        <p:nvPr/>
+      </p:nvGrpSpPr>
+      <p:grpSpPr>
+        <a:xfrm>
+          <a:off x="0" y="0"/>
+          <a:ext cx="0" cy="0"/>
+          <a:chOff x="0" y="0"/>
+          <a:chExt cx="0" cy="0"/>
+        </a:xfrm>
+      </p:grpSpPr>
+      <p:sp>
+        <p:nvSpPr>
+          <p:cNvPr id="2" name="Header Placeholder 1"/>
+          <p:cNvSpPr>
+            <a:spLocks noGrp="1"/>
+          </p:cNvSpPr>
+          <p:nvPr>
+            <p:ph type="hdr" sz="quarter"/>
+          </p:nvPr>
+        </p:nvSpPr>
+        <p:spPr>
+          <a:xfrm>
+            <a:off x="0" y="0"/>
+            <a:ext cx="2971800" cy="458788"/>
+          </a:xfrm>
+          <a:prstGeom prst="rect">
+            <a:avLst/>
+          </a:prstGeom>
+        </p:spPr>
+        <p:txBody>
+          <a:bodyPr vert="horz" lIns="91440" tIns="45720" rIns="91440" bIns="45720" rtlCol="0"/>
+          <a:lstStyle>
+            <a:lvl1pPr algn="l">
+              <a:defRPr sz="1200"/>
+            </a:lvl1pPr>
+          </a:lstStyle>
+          <a:p>
+            <a:endParaRPr lang="en-GB"/>
+          </a:p>
+        </p:txBody>
+      </p:sp>
+      <p:sp>
+        <p:nvSpPr>
+          <p:cNvPr id="3" name="Date Placeholder 2"/>
+          <p:cNvSpPr>
+            <a:spLocks noGrp="1"/>
+          </p:cNvSpPr>
+          <p:nvPr>
+            <p:ph type="dt" idx="1"/>
+          </p:nvPr>
+        </p:nvSpPr>
+        <p:spPr>
+          <a:xfrm>
+            <a:off x="3884613" y="0"/>
+            <a:ext cx="2971800" cy="458788"/>
+          </a:xfrm>
+          <a:prstGeom prst="rect">
+            <a:avLst/>
+          </a:prstGeom>
+        </p:spPr>
+        <p:txBody>
+          <a:bodyPr vert="horz" lIns="91440" tIns="45720" rIns="91440" bIns="45720" rtlCol="0"/>
+          <a:lstStyle>
+            <a:lvl1pPr algn="r">
+              <a:defRPr sz="1200"/>
+            </a:lvl1pPr>
+          </a:lstStyle>
+          <a:p>
+            <a:fld id="{DBC94D5E-0C08-6A4E-9EE5-1EAFAD773097}" type="datetimeFigureOut">
+              <a:rPr lang="en-GB" smtClean="0"/>
+              <a:t>29/06/2020</a:t>
+            </a:fld>
+            <a:endParaRPr lang="en-GB"/>
+          </a:p>
+        </p:txBody>
+      </p:sp>
+      <p:sp>
+        <p:nvSpPr>
+          <p:cNvPr id="4" name="Slide Image Placeholder 3"/>
+          <p:cNvSpPr>
+            <a:spLocks noGrp="1" noRot="1" noChangeAspect="1"/>
+          </p:cNvSpPr>
+          <p:nvPr>
+            <p:ph type="sldImg" idx="2"/>
+          </p:nvPr>
+        </p:nvSpPr>
+        <p:spPr>
+          <a:xfrm>
+            <a:off x="685800" y="1143000"/>
+            <a:ext cx="5486400" cy="3086100"/>
+          </a:xfrm>
+          <a:prstGeom prst="rect">
+            <a:avLst/>
+          </a:prstGeom>
+          <a:noFill/>
+          <a:ln w="12700">
+            <a:solidFill>
+              <a:prstClr val="black"/>
+            </a:solidFill>
+          </a:ln>
+        </p:spPr>
+        <p:txBody>
+          <a:bodyPr vert="horz" lIns="91440" tIns="45720" rIns="91440" bIns="45720" rtlCol="0" anchor="ctr"/>
+          <a:lstStyle/>
+          <a:p>
+            <a:endParaRPr lang="en-GB"/>
+          </a:p>
+        </p:txBody>
+      </p:sp>
+      <p:sp>
+        <p:nvSpPr>
+          <p:cNvPr id="5" name="Notes Placeholder 4"/>
+          <p:cNvSpPr>
+            <a:spLocks noGrp="1"/>
+          </p:cNvSpPr>
+          <p:nvPr>
+            <p:ph type="body" sz="quarter" idx="3"/>
+          </p:nvPr>
+        </p:nvSpPr>
+        <p:spPr>
+          <a:xfrm>
+            <a:off x="685800" y="4400550"/>
+            <a:ext cx="5486400" cy="3600450"/>
+          </a:xfrm>
+          <a:prstGeom prst="rect">
+            <a:avLst/>
+          </a:prstGeom>
+        </p:spPr>
+        <p:txBody>
+          <a:bodyPr vert="horz" lIns="91440" tIns="45720" rIns="91440" bIns="45720" rtlCol="0"/>
+          <a:lstStyle/>
+          <a:p>
+            <a:pPr lvl="0"/>
+            <a:r>
+              <a:rPr lang="en-GB"/>
+              <a:t>Click to edit Master text styles</a:t>
+            </a:r>
+          </a:p>
+          <a:p>
+            <a:pPr lvl="1"/>
+            <a:r>
+              <a:rPr lang="en-GB"/>
+              <a:t>Second level</a:t>
+            </a:r>
+          </a:p>
+          <a:p>
+            <a:pPr lvl="2"/>
+            <a:r>
+              <a:rPr lang="en-GB"/>
+              <a:t>Third level</a:t>
+            </a:r>
+          </a:p>
+          <a:p>
+            <a:pPr lvl="3"/>
+            <a:r>
+              <a:rPr lang="en-GB"/>
+              <a:t>Fourth level</a:t>
+            </a:r>
+          </a:p>
+          <a:p>
+            <a:pPr lvl="4"/>
+            <a:r>
+              <a:rPr lang="en-GB"/>
+              <a:t>Fifth level</a:t>
+            </a:r>
+          </a:p>
+        </p:txBody>
+      </p:sp>
+      <p:sp>
+        <p:nvSpPr>
+          <p:cNvPr id="6" name="Footer Placeholder 5"/>
+          <p:cNvSpPr>
+            <a:spLocks noGrp="1"/>
+          </p:cNvSpPr>
+          <p:nvPr>
+            <p:ph type="ftr" sz="quarter" idx="4"/>
+          </p:nvPr>
+        </p:nvSpPr>
+        <p:spPr>
+          <a:xfrm>
+            <a:off x="0" y="8685213"/>
+            <a:ext cx="2971800" cy="458787"/>
+          </a:xfrm>
+          <a:prstGeom prst="rect">
+            <a:avLst/>
+          </a:prstGeom>
+        </p:spPr>
+        <p:txBody>
+          <a:bodyPr vert="horz" lIns="91440" tIns="45720" rIns="91440" bIns="45720" rtlCol="0" anchor="b"/>
+          <a:lstStyle>
+            <a:lvl1pPr algn="l">
+              <a:defRPr sz="1200"/>
+            </a:lvl1pPr>
+          </a:lstStyle>
+          <a:p>
+            <a:endParaRPr lang="en-GB"/>
+          </a:p>
+        </p:txBody>
+      </p:sp>
+      <p:sp>
+        <p:nvSpPr>
+          <p:cNvPr id="7" name="Slide Number Placeholder 6"/>
+          <p:cNvSpPr>
+            <a:spLocks noGrp="1"/>
+          </p:cNvSpPr>
+          <p:nvPr>
+            <p:ph type="sldNum" sz="quarter" idx="5"/>
+          </p:nvPr>
+        </p:nvSpPr>
+        <p:spPr>
+          <a:xfrm>
+            <a:off x="3884613" y="8685213"/>
+            <a:ext cx="2971800" cy="458787"/>
+          </a:xfrm>
+          <a:prstGeom prst="rect">
+            <a:avLst/>
+          </a:prstGeom>
+        </p:spPr>
+        <p:txBody>
+          <a:bodyPr vert="horz" lIns="91440" tIns="45720" rIns="91440" bIns="45720" rtlCol="0" anchor="b"/>
+          <a:lstStyle>
+            <a:lvl1pPr algn="r">
+              <a:defRPr sz="1200"/>
+            </a:lvl1pPr>
+          </a:lstStyle>
+          <a:p>
+            <a:fld id="{4862C66E-3D74-BF49-9522-41AEEA025E37}" type="slidenum">
+              <a:rPr lang="en-GB" smtClean="0"/>
+              <a:t>‹#›</a:t>
+            </a:fld>
+            <a:endParaRPr lang="en-GB"/>
+          </a:p>
+        </p:txBody>
+      </p:sp>
+    </p:spTree>
+    <p:extLst>
+      <p:ext uri="{BB962C8B-B14F-4D97-AF65-F5344CB8AC3E}">
+        <p14:creationId xmlns:p14="http://schemas.microsoft.com/office/powerpoint/2010/main" val="233672357"/>
+      </p:ext>
+    </p:extLst>
+  </p:cSld>
+  <p:clrMap bg1="lt1" tx1="dk1" bg2="lt2" tx2="dk2" accent1="accent1" accent2="accent2" accent3="accent3" accent4="accent4" accent5="accent5" accent6="accent6" hlink="hlink" folHlink="folHlink"/>
+  <p:notesStyle>
+    <a:lvl1pPr marL="0" algn="l" defTabSz="914400" rtl="0" eaLnBrk="1" latinLnBrk="0" hangingPunct="1">
+      <a:defRPr sz="1200" kern="1200">
+        <a:solidFill>
+          <a:schemeClr val="tx1"/>
+        </a:solidFill>
+        <a:latin typeface="+mn-lt"/>
+        <a:ea typeface="+mn-ea"/>
+        <a:cs typeface="+mn-cs"/>
+      </a:defRPr>
+    </a:lvl1pPr>
+    <a:lvl2pPr marL="457200" algn="l" defTabSz="914400" rtl="0" eaLnBrk="1" latinLnBrk="0" hangingPunct="1">
+      <a:defRPr sz="1200" kern="1200">
+        <a:solidFill>
+          <a:schemeClr val="tx1"/>
+        </a:solidFill>
+        <a:latin typeface="+mn-lt"/>
+        <a:ea typeface="+mn-ea"/>
+        <a:cs typeface="+mn-cs"/>
+      </a:defRPr>
+    </a:lvl2pPr>
+    <a:lvl3pPr marL="914400" algn="l" defTabSz="914400" rtl="0" eaLnBrk="1" latinLnBrk="0" hangingPunct="1">
+      <a:defRPr sz="1200" kern="1200">
+        <a:solidFill>
+          <a:schemeClr val="tx1"/>
+        </a:solidFill>
+        <a:latin typeface="+mn-lt"/>
+        <a:ea typeface="+mn-ea"/>
+        <a:cs typeface="+mn-cs"/>
+      </a:defRPr>
+    </a:lvl3pPr>
+    <a:lvl4pPr marL="1371600" algn="l" defTabSz="914400" rtl="0" eaLnBrk="1" latinLnBrk="0" hangingPunct="1">
+      <a:defRPr sz="1200" kern="1200">
+        <a:solidFill>
+          <a:schemeClr val="tx1"/>
+        </a:solidFill>
+        <a:latin typeface="+mn-lt"/>
+        <a:ea typeface="+mn-ea"/>
+        <a:cs typeface="+mn-cs"/>
+      </a:defRPr>
+    </a:lvl4pPr>
+    <a:lvl5pPr marL="1828800" algn="l" defTabSz="914400" rtl="0" eaLnBrk="1" latinLnBrk="0" hangingPunct="1">
+      <a:defRPr sz="1200" kern="1200">
+        <a:solidFill>
+          <a:schemeClr val="tx1"/>
+        </a:solidFill>
+        <a:latin typeface="+mn-lt"/>
+        <a:ea typeface="+mn-ea"/>
+        <a:cs typeface="+mn-cs"/>
+      </a:defRPr>
+    </a:lvl5pPr>
+    <a:lvl6pPr marL="2286000" algn="l" defTabSz="914400" rtl="0" eaLnBrk="1" latinLnBrk="0" hangingPunct="1">
+      <a:defRPr sz="1200" kern="1200">
+        <a:solidFill>
+          <a:schemeClr val="tx1"/>
+        </a:solidFill>
+        <a:latin typeface="+mn-lt"/>
+        <a:ea typeface="+mn-ea"/>
+        <a:cs typeface="+mn-cs"/>
+      </a:defRPr>
+    </a:lvl6pPr>
+    <a:lvl7pPr marL="2743200" algn="l" defTabSz="914400" rtl="0" eaLnBrk="1" latinLnBrk="0" hangingPunct="1">
+      <a:defRPr sz="1200" kern="1200">
+        <a:solidFill>
+          <a:schemeClr val="tx1"/>
+        </a:solidFill>
+        <a:latin typeface="+mn-lt"/>
+        <a:ea typeface="+mn-ea"/>
+        <a:cs typeface="+mn-cs"/>
+      </a:defRPr>
+    </a:lvl7pPr>
+    <a:lvl8pPr marL="3200400" algn="l" defTabSz="914400" rtl="0" eaLnBrk="1" latinLnBrk="0" hangingPunct="1">
+      <a:defRPr sz="1200" kern="1200">
+        <a:solidFill>
+          <a:schemeClr val="tx1"/>
+        </a:solidFill>
+        <a:latin typeface="+mn-lt"/>
+        <a:ea typeface="+mn-ea"/>
+        <a:cs typeface="+mn-cs"/>
+      </a:defRPr>
+    </a:lvl8pPr>
+    <a:lvl9pPr marL="3657600" algn="l" defTabSz="914400" rtl="0" eaLnBrk="1" latinLnBrk="0" hangingPunct="1">
+      <a:defRPr sz="1200" kern="1200">
+        <a:solidFill>
+          <a:schemeClr val="tx1"/>
+        </a:solidFill>
+        <a:latin typeface="+mn-lt"/>
+        <a:ea typeface="+mn-ea"/>
+        <a:cs typeface="+mn-cs"/>
+      </a:defRPr>
+    </a:lvl9pPr>
+  </p:notesStyle>
+</p:notesMaster>
+</file>
+
+<file path=ppt/notesSlides/notesSlide1.xml><?xml version="1.0" encoding="utf-8"?>
+<p:notes xmlns:a="http://schemas.openxmlformats.org/drawingml/2006/main" xmlns:r="http://schemas.openxmlformats.org/officeDocument/2006/relationships" xmlns:p="http://schemas.openxmlformats.org/presentationml/2006/main">
+  <p:cSld>
+    <p:spTree>
+      <p:nvGrpSpPr>
+        <p:cNvPr id="1" name=""/>
+        <p:cNvGrpSpPr/>
+        <p:nvPr/>
+      </p:nvGrpSpPr>
+      <p:grpSpPr>
+        <a:xfrm>
+          <a:off x="0" y="0"/>
+          <a:ext cx="0" cy="0"/>
+          <a:chOff x="0" y="0"/>
+          <a:chExt cx="0" cy="0"/>
+        </a:xfrm>
+      </p:grpSpPr>
+      <p:sp>
+        <p:nvSpPr>
+          <p:cNvPr id="2" name="Slide Image Placeholder 1"/>
+          <p:cNvSpPr>
+            <a:spLocks noGrp="1" noRot="1" noChangeAspect="1"/>
+          </p:cNvSpPr>
+          <p:nvPr>
+            <p:ph type="sldImg"/>
+          </p:nvPr>
+        </p:nvSpPr>
+        <p:spPr/>
+      </p:sp>
+      <p:sp>
+        <p:nvSpPr>
+          <p:cNvPr id="3" name="Notes Placeholder 2"/>
+          <p:cNvSpPr>
+            <a:spLocks noGrp="1"/>
+          </p:cNvSpPr>
+          <p:nvPr>
+            <p:ph type="body" idx="1"/>
+          </p:nvPr>
+        </p:nvSpPr>
+        <p:spPr/>
+        <p:txBody>
+          <a:bodyPr/>
+          <a:lstStyle/>
+          <a:p>
+            <a:r>
+              <a:rPr lang="en-GB" dirty="0"/>
+              <a:t>K-Means will need to have an option for the play to guess how many centroids there is.</a:t>
+            </a:r>
+          </a:p>
+        </p:txBody>
+      </p:sp>
+      <p:sp>
+        <p:nvSpPr>
+          <p:cNvPr id="4" name="Slide Number Placeholder 3"/>
+          <p:cNvSpPr>
+            <a:spLocks noGrp="1"/>
+          </p:cNvSpPr>
+          <p:nvPr>
+            <p:ph type="sldNum" sz="quarter" idx="5"/>
+          </p:nvPr>
+        </p:nvSpPr>
+        <p:spPr/>
+        <p:txBody>
+          <a:bodyPr/>
+          <a:lstStyle/>
+          <a:p>
+            <a:fld id="{4862C66E-3D74-BF49-9522-41AEEA025E37}" type="slidenum">
+              <a:rPr lang="en-GB" smtClean="0"/>
+              <a:t>6</a:t>
+            </a:fld>
+            <a:endParaRPr lang="en-GB"/>
+          </a:p>
+        </p:txBody>
+      </p:sp>
+    </p:spTree>
+    <p:extLst>
+      <p:ext uri="{BB962C8B-B14F-4D97-AF65-F5344CB8AC3E}">
+        <p14:creationId xmlns:p14="http://schemas.microsoft.com/office/powerpoint/2010/main" val="2047753515"/>
+      </p:ext>
+    </p:extLst>
+  </p:cSld>
+  <p:clrMapOvr>
+    <a:masterClrMapping/>
+  </p:clrMapOvr>
+</p:notes>
+</file>
+
 <file path=ppt/slideLayouts/slideLayout1.xml><?xml version="1.0" encoding="utf-8"?>
 <p:sldLayout xmlns:a="http://schemas.openxmlformats.org/drawingml/2006/main" xmlns:r="http://schemas.openxmlformats.org/officeDocument/2006/relationships" xmlns:p="http://schemas.openxmlformats.org/presentationml/2006/main" type="title" preserve="1">
   <p:cSld name="Title Slide">
@@ -271,7 +710,7 @@
           <a:p>
             <a:fld id="{FE643DE3-4F0B-9F47-9FDB-A8115BD25AA4}" type="datetimeFigureOut">
               <a:rPr lang="en-US" smtClean="0"/>
-              <a:t>6/26/20</a:t>
+              <a:t>6/29/20</a:t>
             </a:fld>
             <a:endParaRPr lang="en-US"/>
           </a:p>
@@ -471,7 +910,7 @@
           <a:p>
             <a:fld id="{FE643DE3-4F0B-9F47-9FDB-A8115BD25AA4}" type="datetimeFigureOut">
               <a:rPr lang="en-US" smtClean="0"/>
-              <a:t>6/26/20</a:t>
+              <a:t>6/29/20</a:t>
             </a:fld>
             <a:endParaRPr lang="en-US"/>
           </a:p>
@@ -681,7 +1120,7 @@
           <a:p>
             <a:fld id="{FE643DE3-4F0B-9F47-9FDB-A8115BD25AA4}" type="datetimeFigureOut">
               <a:rPr lang="en-US" smtClean="0"/>
-              <a:t>6/26/20</a:t>
+              <a:t>6/29/20</a:t>
             </a:fld>
             <a:endParaRPr lang="en-US"/>
           </a:p>
@@ -881,7 +1320,7 @@
           <a:p>
             <a:fld id="{FE643DE3-4F0B-9F47-9FDB-A8115BD25AA4}" type="datetimeFigureOut">
               <a:rPr lang="en-US" smtClean="0"/>
-              <a:t>6/26/20</a:t>
+              <a:t>6/29/20</a:t>
             </a:fld>
             <a:endParaRPr lang="en-US"/>
           </a:p>
@@ -1157,7 +1596,7 @@
           <a:p>
             <a:fld id="{FE643DE3-4F0B-9F47-9FDB-A8115BD25AA4}" type="datetimeFigureOut">
               <a:rPr lang="en-US" smtClean="0"/>
-              <a:t>6/26/20</a:t>
+              <a:t>6/29/20</a:t>
             </a:fld>
             <a:endParaRPr lang="en-US"/>
           </a:p>
@@ -1425,7 +1864,7 @@
           <a:p>
             <a:fld id="{FE643DE3-4F0B-9F47-9FDB-A8115BD25AA4}" type="datetimeFigureOut">
               <a:rPr lang="en-US" smtClean="0"/>
-              <a:t>6/26/20</a:t>
+              <a:t>6/29/20</a:t>
             </a:fld>
             <a:endParaRPr lang="en-US"/>
           </a:p>
@@ -1840,7 +2279,7 @@
           <a:p>
             <a:fld id="{FE643DE3-4F0B-9F47-9FDB-A8115BD25AA4}" type="datetimeFigureOut">
               <a:rPr lang="en-US" smtClean="0"/>
-              <a:t>6/26/20</a:t>
+              <a:t>6/29/20</a:t>
             </a:fld>
             <a:endParaRPr lang="en-US"/>
           </a:p>
@@ -1982,7 +2421,7 @@
           <a:p>
             <a:fld id="{FE643DE3-4F0B-9F47-9FDB-A8115BD25AA4}" type="datetimeFigureOut">
               <a:rPr lang="en-US" smtClean="0"/>
-              <a:t>6/26/20</a:t>
+              <a:t>6/29/20</a:t>
             </a:fld>
             <a:endParaRPr lang="en-US"/>
           </a:p>
@@ -2095,7 +2534,7 @@
           <a:p>
             <a:fld id="{FE643DE3-4F0B-9F47-9FDB-A8115BD25AA4}" type="datetimeFigureOut">
               <a:rPr lang="en-US" smtClean="0"/>
-              <a:t>6/26/20</a:t>
+              <a:t>6/29/20</a:t>
             </a:fld>
             <a:endParaRPr lang="en-US"/>
           </a:p>
@@ -2408,7 +2847,7 @@
           <a:p>
             <a:fld id="{FE643DE3-4F0B-9F47-9FDB-A8115BD25AA4}" type="datetimeFigureOut">
               <a:rPr lang="en-US" smtClean="0"/>
-              <a:t>6/26/20</a:t>
+              <a:t>6/29/20</a:t>
             </a:fld>
             <a:endParaRPr lang="en-US"/>
           </a:p>
@@ -2697,7 +3136,7 @@
           <a:p>
             <a:fld id="{FE643DE3-4F0B-9F47-9FDB-A8115BD25AA4}" type="datetimeFigureOut">
               <a:rPr lang="en-US" smtClean="0"/>
-              <a:t>6/26/20</a:t>
+              <a:t>6/29/20</a:t>
             </a:fld>
             <a:endParaRPr lang="en-US"/>
           </a:p>
@@ -2940,7 +3379,7 @@
           <a:p>
             <a:fld id="{FE643DE3-4F0B-9F47-9FDB-A8115BD25AA4}" type="datetimeFigureOut">
               <a:rPr lang="en-US" smtClean="0"/>
-              <a:t>6/26/20</a:t>
+              <a:t>6/29/20</a:t>
             </a:fld>
             <a:endParaRPr lang="en-US"/>
           </a:p>
@@ -3646,6 +4085,87 @@
         <p:spPr>
           <a:xfrm>
             <a:off x="1490597" y="3356975"/>
+            <a:ext cx="4744523" cy="3135900"/>
+          </a:xfrm>
+          <a:prstGeom prst="rect">
+            <a:avLst/>
+          </a:prstGeom>
+        </p:spPr>
+        <p:style>
+          <a:lnRef idx="2">
+            <a:schemeClr val="accent3">
+              <a:shade val="50000"/>
+            </a:schemeClr>
+          </a:lnRef>
+          <a:fillRef idx="1">
+            <a:schemeClr val="accent3"/>
+          </a:fillRef>
+          <a:effectRef idx="0">
+            <a:schemeClr val="accent3"/>
+          </a:effectRef>
+          <a:fontRef idx="minor">
+            <a:schemeClr val="lt1"/>
+          </a:fontRef>
+        </p:style>
+        <p:txBody>
+          <a:bodyPr rtlCol="0" anchor="ctr"/>
+          <a:lstStyle/>
+          <a:p>
+            <a:pPr algn="ctr"/>
+            <a:r>
+              <a:rPr lang="en-GB" dirty="0"/>
+              <a:t>List of all the available awards.</a:t>
+            </a:r>
+          </a:p>
+          <a:p>
+            <a:pPr algn="ctr"/>
+            <a:endParaRPr lang="en-GB" dirty="0"/>
+          </a:p>
+          <a:p>
+            <a:pPr algn="ctr"/>
+            <a:endParaRPr lang="en-GB" dirty="0"/>
+          </a:p>
+          <a:p>
+            <a:pPr algn="ctr"/>
+            <a:endParaRPr lang="en-GB" dirty="0"/>
+          </a:p>
+          <a:p>
+            <a:pPr algn="ctr"/>
+            <a:endParaRPr lang="en-GB" dirty="0"/>
+          </a:p>
+          <a:p>
+            <a:pPr algn="ctr"/>
+            <a:endParaRPr lang="en-GB" dirty="0"/>
+          </a:p>
+          <a:p>
+            <a:pPr algn="ctr"/>
+            <a:endParaRPr lang="en-GB" dirty="0"/>
+          </a:p>
+          <a:p>
+            <a:pPr algn="ctr"/>
+            <a:endParaRPr lang="en-GB" dirty="0"/>
+          </a:p>
+          <a:p>
+            <a:pPr algn="ctr"/>
+            <a:endParaRPr lang="en-GB" dirty="0"/>
+          </a:p>
+        </p:txBody>
+      </p:sp>
+      <p:sp>
+        <p:nvSpPr>
+          <p:cNvPr id="8" name="Rectangle 7">
+            <a:extLst>
+              <a:ext uri="{FF2B5EF4-FFF2-40B4-BE49-F238E27FC236}">
+                <a16:creationId xmlns:a16="http://schemas.microsoft.com/office/drawing/2014/main" id="{4CF69489-887D-5A44-BA91-CFA0B5CC1C79}"/>
+              </a:ext>
+            </a:extLst>
+          </p:cNvPr>
+          <p:cNvSpPr/>
+          <p:nvPr/>
+        </p:nvSpPr>
+        <p:spPr>
+          <a:xfrm>
+            <a:off x="6492660" y="3356975"/>
             <a:ext cx="4208745" cy="3135900"/>
           </a:xfrm>
           <a:prstGeom prst="rect">
@@ -3675,17 +4195,45 @@
             <a:pPr algn="ctr"/>
             <a:r>
               <a:rPr lang="en-GB" dirty="0"/>
-              <a:t>List of all the available awards.</a:t>
-            </a:r>
-          </a:p>
-        </p:txBody>
-      </p:sp>
-      <p:sp>
-        <p:nvSpPr>
-          <p:cNvPr id="8" name="Rectangle 7">
-            <a:extLst>
-              <a:ext uri="{FF2B5EF4-FFF2-40B4-BE49-F238E27FC236}">
-                <a16:creationId xmlns:a16="http://schemas.microsoft.com/office/drawing/2014/main" id="{4CF69489-887D-5A44-BA91-CFA0B5CC1C79}"/>
+              <a:t>Leader board/ High score area</a:t>
+            </a:r>
+          </a:p>
+          <a:p>
+            <a:pPr algn="ctr"/>
+            <a:endParaRPr lang="en-GB" dirty="0"/>
+          </a:p>
+          <a:p>
+            <a:pPr algn="ctr"/>
+            <a:endParaRPr lang="en-GB" dirty="0"/>
+          </a:p>
+          <a:p>
+            <a:pPr algn="ctr"/>
+            <a:endParaRPr lang="en-GB" dirty="0"/>
+          </a:p>
+          <a:p>
+            <a:pPr algn="ctr"/>
+            <a:endParaRPr lang="en-GB" dirty="0"/>
+          </a:p>
+          <a:p>
+            <a:pPr algn="ctr"/>
+            <a:endParaRPr lang="en-GB" dirty="0"/>
+          </a:p>
+          <a:p>
+            <a:pPr algn="ctr"/>
+            <a:endParaRPr lang="en-GB" dirty="0"/>
+          </a:p>
+          <a:p>
+            <a:pPr algn="ctr"/>
+            <a:endParaRPr lang="en-GB" dirty="0"/>
+          </a:p>
+        </p:txBody>
+      </p:sp>
+      <p:sp>
+        <p:nvSpPr>
+          <p:cNvPr id="9" name="Rectangle 8">
+            <a:extLst>
+              <a:ext uri="{FF2B5EF4-FFF2-40B4-BE49-F238E27FC236}">
+                <a16:creationId xmlns:a16="http://schemas.microsoft.com/office/drawing/2014/main" id="{F6190546-2D56-AD4D-84D4-7911CF46105A}"/>
               </a:ext>
             </a:extLst>
           </p:cNvPr>
@@ -3694,8 +4242,8 @@
         </p:nvSpPr>
         <p:spPr>
           <a:xfrm>
-            <a:off x="6058420" y="4052170"/>
-            <a:ext cx="4208745" cy="1691014"/>
+            <a:off x="4595631" y="3995600"/>
+            <a:ext cx="2588821" cy="1691014"/>
           </a:xfrm>
           <a:prstGeom prst="rect">
             <a:avLst/>
@@ -3703,15 +4251,15 @@
         </p:spPr>
         <p:style>
           <a:lnRef idx="2">
-            <a:schemeClr val="accent3">
+            <a:schemeClr val="accent4">
               <a:shade val="50000"/>
             </a:schemeClr>
           </a:lnRef>
           <a:fillRef idx="1">
-            <a:schemeClr val="accent3"/>
+            <a:schemeClr val="accent4"/>
           </a:fillRef>
           <a:effectRef idx="0">
-            <a:schemeClr val="accent3"/>
+            <a:schemeClr val="accent4"/>
           </a:effectRef>
           <a:fontRef idx="minor">
             <a:schemeClr val="lt1"/>
@@ -3720,6 +4268,13 @@
         <p:txBody>
           <a:bodyPr rtlCol="0" anchor="ctr"/>
           <a:lstStyle/>
+          <a:p>
+            <a:pPr algn="ctr"/>
+            <a:r>
+              <a:rPr lang="en-GB" dirty="0"/>
+              <a:t>*Pop-up window*</a:t>
+            </a:r>
+          </a:p>
           <a:p>
             <a:pPr algn="ctr"/>
             <a:r>
@@ -3846,6 +4401,41 @@
                 </a:schemeClr>
               </a:solidFill>
             </a:endParaRPr>
+          </a:p>
+        </p:txBody>
+      </p:sp>
+      <p:sp>
+        <p:nvSpPr>
+          <p:cNvPr id="3" name="TextBox 2">
+            <a:extLst>
+              <a:ext uri="{FF2B5EF4-FFF2-40B4-BE49-F238E27FC236}">
+                <a16:creationId xmlns:a16="http://schemas.microsoft.com/office/drawing/2014/main" id="{82A09F91-EC7A-5245-B52C-99D7E2CF9BF3}"/>
+              </a:ext>
+            </a:extLst>
+          </p:cNvPr>
+          <p:cNvSpPr txBox="1"/>
+          <p:nvPr/>
+        </p:nvSpPr>
+        <p:spPr>
+          <a:xfrm>
+            <a:off x="1745672" y="2315689"/>
+            <a:ext cx="8217725" cy="369332"/>
+          </a:xfrm>
+          <a:prstGeom prst="rect">
+            <a:avLst/>
+          </a:prstGeom>
+          <a:noFill/>
+        </p:spPr>
+        <p:txBody>
+          <a:bodyPr wrap="square" rtlCol="0">
+            <a:spAutoFit/>
+          </a:bodyPr>
+          <a:lstStyle/>
+          <a:p>
+            <a:r>
+              <a:rPr lang="en-GB" dirty="0"/>
+              <a:t>List resources/books/ lecture slides that content was taken from?</a:t>
+            </a:r>
           </a:p>
         </p:txBody>
       </p:sp>
@@ -5290,7 +5880,9 @@
             <a:avLst/>
           </a:prstGeom>
           <a:solidFill>
-            <a:srgbClr val="0C4EC2"/>
+            <a:schemeClr val="accent1">
+              <a:lumMod val="75000"/>
+            </a:schemeClr>
           </a:solidFill>
         </p:spPr>
         <p:style>
@@ -5328,6 +5920,431 @@
                 </a:schemeClr>
               </a:solidFill>
             </a:endParaRPr>
+          </a:p>
+        </p:txBody>
+      </p:sp>
+      <p:sp>
+        <p:nvSpPr>
+          <p:cNvPr id="3" name="Rectangle 2">
+            <a:extLst>
+              <a:ext uri="{FF2B5EF4-FFF2-40B4-BE49-F238E27FC236}">
+                <a16:creationId xmlns:a16="http://schemas.microsoft.com/office/drawing/2014/main" id="{3E4BDA3D-0EA3-A742-89D8-E93A6FEED745}"/>
+              </a:ext>
+            </a:extLst>
+          </p:cNvPr>
+          <p:cNvSpPr/>
+          <p:nvPr/>
+        </p:nvSpPr>
+        <p:spPr>
+          <a:xfrm>
+            <a:off x="1318161" y="1775361"/>
+            <a:ext cx="9547761" cy="801584"/>
+          </a:xfrm>
+          <a:prstGeom prst="rect">
+            <a:avLst/>
+          </a:prstGeom>
+        </p:spPr>
+        <p:style>
+          <a:lnRef idx="2">
+            <a:schemeClr val="accent3">
+              <a:shade val="50000"/>
+            </a:schemeClr>
+          </a:lnRef>
+          <a:fillRef idx="1">
+            <a:schemeClr val="accent3"/>
+          </a:fillRef>
+          <a:effectRef idx="0">
+            <a:schemeClr val="accent3"/>
+          </a:effectRef>
+          <a:fontRef idx="minor">
+            <a:schemeClr val="lt1"/>
+          </a:fontRef>
+        </p:style>
+        <p:txBody>
+          <a:bodyPr rtlCol="0" anchor="ctr"/>
+          <a:lstStyle/>
+          <a:p>
+            <a:pPr algn="ctr"/>
+            <a:endParaRPr lang="en-GB"/>
+          </a:p>
+        </p:txBody>
+      </p:sp>
+      <p:sp>
+        <p:nvSpPr>
+          <p:cNvPr id="5" name="Rectangle 4">
+            <a:extLst>
+              <a:ext uri="{FF2B5EF4-FFF2-40B4-BE49-F238E27FC236}">
+                <a16:creationId xmlns:a16="http://schemas.microsoft.com/office/drawing/2014/main" id="{FC59767B-29C7-D84F-8909-8296DAE67931}"/>
+              </a:ext>
+            </a:extLst>
+          </p:cNvPr>
+          <p:cNvSpPr/>
+          <p:nvPr/>
+        </p:nvSpPr>
+        <p:spPr>
+          <a:xfrm>
+            <a:off x="3696517" y="1653615"/>
+            <a:ext cx="1992270" cy="923330"/>
+          </a:xfrm>
+          <a:prstGeom prst="rect">
+            <a:avLst/>
+          </a:prstGeom>
+          <a:noFill/>
+        </p:spPr>
+        <p:txBody>
+          <a:bodyPr wrap="square" lIns="91440" tIns="45720" rIns="91440" bIns="45720">
+            <a:spAutoFit/>
+          </a:bodyPr>
+          <a:lstStyle/>
+          <a:p>
+            <a:pPr algn="ctr"/>
+            <a:r>
+              <a:rPr lang="en-GB" sz="5400" b="1" dirty="0">
+                <a:ln w="12700" cmpd="sng">
+                  <a:solidFill>
+                    <a:srgbClr val="C4623E"/>
+                  </a:solidFill>
+                  <a:prstDash val="solid"/>
+                </a:ln>
+                <a:solidFill>
+                  <a:srgbClr val="C3C02C"/>
+                </a:solidFill>
+              </a:rPr>
+              <a:t>Linear</a:t>
+            </a:r>
+          </a:p>
+        </p:txBody>
+      </p:sp>
+      <p:sp>
+        <p:nvSpPr>
+          <p:cNvPr id="6" name="Rectangle 5">
+            <a:extLst>
+              <a:ext uri="{FF2B5EF4-FFF2-40B4-BE49-F238E27FC236}">
+                <a16:creationId xmlns:a16="http://schemas.microsoft.com/office/drawing/2014/main" id="{43F74CAD-D9B8-9647-87FD-0765A2B43177}"/>
+              </a:ext>
+            </a:extLst>
+          </p:cNvPr>
+          <p:cNvSpPr/>
+          <p:nvPr/>
+        </p:nvSpPr>
+        <p:spPr>
+          <a:xfrm>
+            <a:off x="5568403" y="1653615"/>
+            <a:ext cx="3518656" cy="923330"/>
+          </a:xfrm>
+          <a:prstGeom prst="rect">
+            <a:avLst/>
+          </a:prstGeom>
+          <a:noFill/>
+        </p:spPr>
+        <p:txBody>
+          <a:bodyPr wrap="none" lIns="91440" tIns="45720" rIns="91440" bIns="45720">
+            <a:spAutoFit/>
+          </a:bodyPr>
+          <a:lstStyle/>
+          <a:p>
+            <a:pPr algn="ctr"/>
+            <a:r>
+              <a:rPr lang="en-GB" sz="5400" b="1" cap="none" spc="0" dirty="0">
+                <a:ln w="12700" cmpd="sng">
+                  <a:solidFill>
+                    <a:srgbClr val="6214C4"/>
+                  </a:solidFill>
+                  <a:prstDash val="solid"/>
+                </a:ln>
+                <a:solidFill>
+                  <a:srgbClr val="03C1A1"/>
+                </a:solidFill>
+                <a:effectLst/>
+              </a:rPr>
+              <a:t>Regression!</a:t>
+            </a:r>
+          </a:p>
+        </p:txBody>
+      </p:sp>
+      <p:pic>
+        <p:nvPicPr>
+          <p:cNvPr id="8" name="Picture 7" descr="A screenshot of a cell phone&#10;&#10;Description automatically generated">
+            <a:extLst>
+              <a:ext uri="{FF2B5EF4-FFF2-40B4-BE49-F238E27FC236}">
+                <a16:creationId xmlns:a16="http://schemas.microsoft.com/office/drawing/2014/main" id="{D23C3B8A-E956-8745-BBC9-5A104EAB1BE5}"/>
+              </a:ext>
+            </a:extLst>
+          </p:cNvPr>
+          <p:cNvPicPr>
+            <a:picLocks noChangeAspect="1"/>
+          </p:cNvPicPr>
+          <p:nvPr/>
+        </p:nvPicPr>
+        <p:blipFill>
+          <a:blip r:embed="rId3"/>
+          <a:stretch>
+            <a:fillRect/>
+          </a:stretch>
+        </p:blipFill>
+        <p:spPr>
+          <a:xfrm>
+            <a:off x="1318161" y="2709595"/>
+            <a:ext cx="4370626" cy="2586800"/>
+          </a:xfrm>
+          <a:prstGeom prst="rect">
+            <a:avLst/>
+          </a:prstGeom>
+        </p:spPr>
+      </p:pic>
+      <p:sp>
+        <p:nvSpPr>
+          <p:cNvPr id="9" name="Rectangle 8">
+            <a:extLst>
+              <a:ext uri="{FF2B5EF4-FFF2-40B4-BE49-F238E27FC236}">
+                <a16:creationId xmlns:a16="http://schemas.microsoft.com/office/drawing/2014/main" id="{D85EFC7B-B6BF-CC4D-A607-D3D7344DFDCD}"/>
+              </a:ext>
+            </a:extLst>
+          </p:cNvPr>
+          <p:cNvSpPr/>
+          <p:nvPr/>
+        </p:nvSpPr>
+        <p:spPr>
+          <a:xfrm>
+            <a:off x="5830784" y="2709595"/>
+            <a:ext cx="5035138" cy="1203817"/>
+          </a:xfrm>
+          <a:prstGeom prst="rect">
+            <a:avLst/>
+          </a:prstGeom>
+          <a:solidFill>
+            <a:srgbClr val="C3C02C"/>
+          </a:solidFill>
+        </p:spPr>
+        <p:style>
+          <a:lnRef idx="2">
+            <a:schemeClr val="accent4">
+              <a:shade val="50000"/>
+            </a:schemeClr>
+          </a:lnRef>
+          <a:fillRef idx="1">
+            <a:schemeClr val="accent4"/>
+          </a:fillRef>
+          <a:effectRef idx="0">
+            <a:schemeClr val="accent4"/>
+          </a:effectRef>
+          <a:fontRef idx="minor">
+            <a:schemeClr val="lt1"/>
+          </a:fontRef>
+        </p:style>
+        <p:txBody>
+          <a:bodyPr rtlCol="0" anchor="ctr"/>
+          <a:lstStyle/>
+          <a:p>
+            <a:r>
+              <a:rPr lang="en-GB" dirty="0"/>
+              <a:t>Aim:</a:t>
+            </a:r>
+          </a:p>
+          <a:p>
+            <a:r>
+              <a:rPr lang="en-GB" dirty="0"/>
+              <a:t>You must complete the challenge – description here!</a:t>
+            </a:r>
+          </a:p>
+        </p:txBody>
+      </p:sp>
+      <p:sp>
+        <p:nvSpPr>
+          <p:cNvPr id="10" name="Rectangle 9">
+            <a:extLst>
+              <a:ext uri="{FF2B5EF4-FFF2-40B4-BE49-F238E27FC236}">
+                <a16:creationId xmlns:a16="http://schemas.microsoft.com/office/drawing/2014/main" id="{27D3B4CD-C78C-4540-A314-9ABCA26AED39}"/>
+              </a:ext>
+            </a:extLst>
+          </p:cNvPr>
+          <p:cNvSpPr/>
+          <p:nvPr/>
+        </p:nvSpPr>
+        <p:spPr>
+          <a:xfrm>
+            <a:off x="1318161" y="5795158"/>
+            <a:ext cx="4370626" cy="647206"/>
+          </a:xfrm>
+          <a:prstGeom prst="rect">
+            <a:avLst/>
+          </a:prstGeom>
+          <a:solidFill>
+            <a:srgbClr val="07C2A1"/>
+          </a:solidFill>
+        </p:spPr>
+        <p:style>
+          <a:lnRef idx="2">
+            <a:schemeClr val="accent1">
+              <a:shade val="50000"/>
+            </a:schemeClr>
+          </a:lnRef>
+          <a:fillRef idx="1">
+            <a:schemeClr val="accent1"/>
+          </a:fillRef>
+          <a:effectRef idx="0">
+            <a:schemeClr val="accent1"/>
+          </a:effectRef>
+          <a:fontRef idx="minor">
+            <a:schemeClr val="lt1"/>
+          </a:fontRef>
+        </p:style>
+        <p:txBody>
+          <a:bodyPr rtlCol="0" anchor="ctr"/>
+          <a:lstStyle/>
+          <a:p>
+            <a:r>
+              <a:rPr lang="en-GB" dirty="0"/>
+              <a:t>Tip:</a:t>
+            </a:r>
+          </a:p>
+          <a:p>
+            <a:r>
+              <a:rPr lang="en-GB" dirty="0"/>
+              <a:t>Tip of how the algorithm works.</a:t>
+            </a:r>
+          </a:p>
+        </p:txBody>
+      </p:sp>
+      <p:sp>
+        <p:nvSpPr>
+          <p:cNvPr id="11" name="Rectangle 10">
+            <a:extLst>
+              <a:ext uri="{FF2B5EF4-FFF2-40B4-BE49-F238E27FC236}">
+                <a16:creationId xmlns:a16="http://schemas.microsoft.com/office/drawing/2014/main" id="{A599C392-E5C4-8F4E-B9B2-F4EDFCB3FDFE}"/>
+              </a:ext>
+            </a:extLst>
+          </p:cNvPr>
+          <p:cNvSpPr/>
+          <p:nvPr/>
+        </p:nvSpPr>
+        <p:spPr>
+          <a:xfrm>
+            <a:off x="1318161" y="5333468"/>
+            <a:ext cx="4370626" cy="319187"/>
+          </a:xfrm>
+          <a:prstGeom prst="rect">
+            <a:avLst/>
+          </a:prstGeom>
+          <a:solidFill>
+            <a:srgbClr val="C00000"/>
+          </a:solidFill>
+        </p:spPr>
+        <p:style>
+          <a:lnRef idx="2">
+            <a:schemeClr val="accent1">
+              <a:shade val="50000"/>
+            </a:schemeClr>
+          </a:lnRef>
+          <a:fillRef idx="1">
+            <a:schemeClr val="accent1"/>
+          </a:fillRef>
+          <a:effectRef idx="0">
+            <a:schemeClr val="accent1"/>
+          </a:effectRef>
+          <a:fontRef idx="minor">
+            <a:schemeClr val="lt1"/>
+          </a:fontRef>
+        </p:style>
+        <p:txBody>
+          <a:bodyPr rtlCol="0" anchor="ctr"/>
+          <a:lstStyle/>
+          <a:p>
+            <a:pPr algn="ctr"/>
+            <a:r>
+              <a:rPr lang="en-GB" dirty="0"/>
+              <a:t>Player % Turn!</a:t>
+            </a:r>
+          </a:p>
+        </p:txBody>
+      </p:sp>
+      <p:sp>
+        <p:nvSpPr>
+          <p:cNvPr id="12" name="Rectangle 11">
+            <a:extLst>
+              <a:ext uri="{FF2B5EF4-FFF2-40B4-BE49-F238E27FC236}">
+                <a16:creationId xmlns:a16="http://schemas.microsoft.com/office/drawing/2014/main" id="{9E4C4BF7-0226-EC48-B0BE-3E7B762E2547}"/>
+              </a:ext>
+            </a:extLst>
+          </p:cNvPr>
+          <p:cNvSpPr/>
+          <p:nvPr/>
+        </p:nvSpPr>
+        <p:spPr>
+          <a:xfrm>
+            <a:off x="5830784" y="4001984"/>
+            <a:ext cx="5035138" cy="2048494"/>
+          </a:xfrm>
+          <a:prstGeom prst="rect">
+            <a:avLst/>
+          </a:prstGeom>
+        </p:spPr>
+        <p:style>
+          <a:lnRef idx="2">
+            <a:schemeClr val="accent3">
+              <a:shade val="50000"/>
+            </a:schemeClr>
+          </a:lnRef>
+          <a:fillRef idx="1">
+            <a:schemeClr val="accent3"/>
+          </a:fillRef>
+          <a:effectRef idx="0">
+            <a:schemeClr val="accent3"/>
+          </a:effectRef>
+          <a:fontRef idx="minor">
+            <a:schemeClr val="lt1"/>
+          </a:fontRef>
+        </p:style>
+        <p:txBody>
+          <a:bodyPr rtlCol="0" anchor="ctr"/>
+          <a:lstStyle/>
+          <a:p>
+            <a:r>
+              <a:rPr lang="en-GB" dirty="0"/>
+              <a:t>Score: P1 – 200 | P2 – 300</a:t>
+            </a:r>
+          </a:p>
+          <a:p>
+            <a:endParaRPr lang="en-GB" dirty="0"/>
+          </a:p>
+          <a:p>
+            <a:r>
+              <a:rPr lang="en-GB" dirty="0"/>
+              <a:t>Current Moves:</a:t>
+            </a:r>
+          </a:p>
+          <a:p>
+            <a:r>
+              <a:rPr lang="en-GB" dirty="0"/>
+              <a:t>P1:			P2:</a:t>
+            </a:r>
+          </a:p>
+          <a:p>
+            <a:pPr marL="342900" indent="-342900">
+              <a:buAutoNum type="arabicPeriod"/>
+            </a:pPr>
+            <a:r>
+              <a:rPr lang="en-GB" dirty="0"/>
+              <a:t>X, y			1. X, y</a:t>
+            </a:r>
+          </a:p>
+          <a:p>
+            <a:pPr marL="342900" indent="-342900">
+              <a:buAutoNum type="arabicPeriod"/>
+            </a:pPr>
+            <a:r>
+              <a:rPr lang="en-GB" dirty="0"/>
+              <a:t>X, y			2. X, y</a:t>
+            </a:r>
+          </a:p>
+          <a:p>
+            <a:pPr marL="342900" indent="-342900">
+              <a:buAutoNum type="arabicPeriod"/>
+            </a:pPr>
+            <a:r>
+              <a:rPr lang="en-GB" dirty="0"/>
+              <a:t>X, y			3. X, y</a:t>
+            </a:r>
           </a:p>
         </p:txBody>
       </p:sp>
@@ -7388,4 +8405,299 @@
     </a:ext>
   </a:extLst>
 </a:theme>
+</file>
+
+<file path=ppt/theme/theme2.xml><?xml version="1.0" encoding="utf-8"?>
+<a:theme xmlns:a="http://schemas.openxmlformats.org/drawingml/2006/main" name="Office Theme">
+  <a:themeElements>
+    <a:clrScheme name="Office">
+      <a:dk1>
+        <a:sysClr val="windowText" lastClr="000000"/>
+      </a:dk1>
+      <a:lt1>
+        <a:sysClr val="window" lastClr="FFFFFF"/>
+      </a:lt1>
+      <a:dk2>
+        <a:srgbClr val="44546A"/>
+      </a:dk2>
+      <a:lt2>
+        <a:srgbClr val="E7E6E6"/>
+      </a:lt2>
+      <a:accent1>
+        <a:srgbClr val="4472C4"/>
+      </a:accent1>
+      <a:accent2>
+        <a:srgbClr val="ED7D31"/>
+      </a:accent2>
+      <a:accent3>
+        <a:srgbClr val="A5A5A5"/>
+      </a:accent3>
+      <a:accent4>
+        <a:srgbClr val="FFC000"/>
+      </a:accent4>
+      <a:accent5>
+        <a:srgbClr val="5B9BD5"/>
+      </a:accent5>
+      <a:accent6>
+        <a:srgbClr val="70AD47"/>
+      </a:accent6>
+      <a:hlink>
+        <a:srgbClr val="0563C1"/>
+      </a:hlink>
+      <a:folHlink>
+        <a:srgbClr val="954F72"/>
+      </a:folHlink>
+    </a:clrScheme>
+    <a:fontScheme name="Office">
+      <a:majorFont>
+        <a:latin typeface="Calibri Light" panose="020F0302020204030204"/>
+        <a:ea typeface=""/>
+        <a:cs typeface=""/>
+        <a:font script="Jpan" typeface="游ゴシック Light"/>
+        <a:font script="Hang" typeface="맑은 고딕"/>
+        <a:font script="Hans" typeface="等线 Light"/>
+        <a:font script="Hant" typeface="新細明體"/>
+        <a:font script="Arab" typeface="Times New Roman"/>
+        <a:font script="Hebr" typeface="Times New Roman"/>
+        <a:font script="Thai" typeface="Angsana New"/>
+        <a:font script="Ethi" typeface="Nyala"/>
+        <a:font script="Beng" typeface="Vrinda"/>
+        <a:font script="Gujr" typeface="Shruti"/>
+        <a:font script="Khmr" typeface="MoolBoran"/>
+        <a:font script="Knda" typeface="Tunga"/>
+        <a:font script="Guru" typeface="Raavi"/>
+        <a:font script="Cans" typeface="Euphemia"/>
+        <a:font script="Cher" typeface="Plantagenet Cherokee"/>
+        <a:font script="Yiii" typeface="Microsoft Yi Baiti"/>
+        <a:font script="Tibt" typeface="Microsoft Himalaya"/>
+        <a:font script="Thaa" typeface="MV Boli"/>
+        <a:font script="Deva" typeface="Mangal"/>
+        <a:font script="Telu" typeface="Gautami"/>
+        <a:font script="Taml" typeface="Latha"/>
+        <a:font script="Syrc" typeface="Estrangelo Edessa"/>
+        <a:font script="Orya" typeface="Kalinga"/>
+        <a:font script="Mlym" typeface="Kartika"/>
+        <a:font script="Laoo" typeface="DokChampa"/>
+        <a:font script="Sinh" typeface="Iskoola Pota"/>
+        <a:font script="Mong" typeface="Mongolian Baiti"/>
+        <a:font script="Viet" typeface="Times New Roman"/>
+        <a:font script="Uigh" typeface="Microsoft Uighur"/>
+        <a:font script="Geor" typeface="Sylfaen"/>
+        <a:font script="Armn" typeface="Arial"/>
+        <a:font script="Bugi" typeface="Leelawadee UI"/>
+        <a:font script="Bopo" typeface="Microsoft JhengHei"/>
+        <a:font script="Java" typeface="Javanese Text"/>
+        <a:font script="Lisu" typeface="Segoe UI"/>
+        <a:font script="Mymr" typeface="Myanmar Text"/>
+        <a:font script="Nkoo" typeface="Ebrima"/>
+        <a:font script="Olck" typeface="Nirmala UI"/>
+        <a:font script="Osma" typeface="Ebrima"/>
+        <a:font script="Phag" typeface="Phagspa"/>
+        <a:font script="Syrn" typeface="Estrangelo Edessa"/>
+        <a:font script="Syrj" typeface="Estrangelo Edessa"/>
+        <a:font script="Syre" typeface="Estrangelo Edessa"/>
+        <a:font script="Sora" typeface="Nirmala UI"/>
+        <a:font script="Tale" typeface="Microsoft Tai Le"/>
+        <a:font script="Talu" typeface="Microsoft New Tai Lue"/>
+        <a:font script="Tfng" typeface="Ebrima"/>
+      </a:majorFont>
+      <a:minorFont>
+        <a:latin typeface="Calibri" panose="020F0502020204030204"/>
+        <a:ea typeface=""/>
+        <a:cs typeface=""/>
+        <a:font script="Jpan" typeface="游ゴシック"/>
+        <a:font script="Hang" typeface="맑은 고딕"/>
+        <a:font script="Hans" typeface="等线"/>
+        <a:font script="Hant" typeface="新細明體"/>
+        <a:font script="Arab" typeface="Arial"/>
+        <a:font script="Hebr" typeface="Arial"/>
+        <a:font script="Thai" typeface="Cordia New"/>
+        <a:font script="Ethi" typeface="Nyala"/>
+        <a:font script="Beng" typeface="Vrinda"/>
+        <a:font script="Gujr" typeface="Shruti"/>
+        <a:font script="Khmr" typeface="DaunPenh"/>
+        <a:font script="Knda" typeface="Tunga"/>
+        <a:font script="Guru" typeface="Raavi"/>
+        <a:font script="Cans" typeface="Euphemia"/>
+        <a:font script="Cher" typeface="Plantagenet Cherokee"/>
+        <a:font script="Yiii" typeface="Microsoft Yi Baiti"/>
+        <a:font script="Tibt" typeface="Microsoft Himalaya"/>
+        <a:font script="Thaa" typeface="MV Boli"/>
+        <a:font script="Deva" typeface="Mangal"/>
+        <a:font script="Telu" typeface="Gautami"/>
+        <a:font script="Taml" typeface="Latha"/>
+        <a:font script="Syrc" typeface="Estrangelo Edessa"/>
+        <a:font script="Orya" typeface="Kalinga"/>
+        <a:font script="Mlym" typeface="Kartika"/>
+        <a:font script="Laoo" typeface="DokChampa"/>
+        <a:font script="Sinh" typeface="Iskoola Pota"/>
+        <a:font script="Mong" typeface="Mongolian Baiti"/>
+        <a:font script="Viet" typeface="Arial"/>
+        <a:font script="Uigh" typeface="Microsoft Uighur"/>
+        <a:font script="Geor" typeface="Sylfaen"/>
+        <a:font script="Armn" typeface="Arial"/>
+        <a:font script="Bugi" typeface="Leelawadee UI"/>
+        <a:font script="Bopo" typeface="Microsoft JhengHei"/>
+        <a:font script="Java" typeface="Javanese Text"/>
+        <a:font script="Lisu" typeface="Segoe UI"/>
+        <a:font script="Mymr" typeface="Myanmar Text"/>
+        <a:font script="Nkoo" typeface="Ebrima"/>
+        <a:font script="Olck" typeface="Nirmala UI"/>
+        <a:font script="Osma" typeface="Ebrima"/>
+        <a:font script="Phag" typeface="Phagspa"/>
+        <a:font script="Syrn" typeface="Estrangelo Edessa"/>
+        <a:font script="Syrj" typeface="Estrangelo Edessa"/>
+        <a:font script="Syre" typeface="Estrangelo Edessa"/>
+        <a:font script="Sora" typeface="Nirmala UI"/>
+        <a:font script="Tale" typeface="Microsoft Tai Le"/>
+        <a:font script="Talu" typeface="Microsoft New Tai Lue"/>
+        <a:font script="Tfng" typeface="Ebrima"/>
+      </a:minorFont>
+    </a:fontScheme>
+    <a:fmtScheme name="Office">
+      <a:fillStyleLst>
+        <a:solidFill>
+          <a:schemeClr val="phClr"/>
+        </a:solidFill>
+        <a:gradFill rotWithShape="1">
+          <a:gsLst>
+            <a:gs pos="0">
+              <a:schemeClr val="phClr">
+                <a:lumMod val="110000"/>
+                <a:satMod val="105000"/>
+                <a:tint val="67000"/>
+              </a:schemeClr>
+            </a:gs>
+            <a:gs pos="50000">
+              <a:schemeClr val="phClr">
+                <a:lumMod val="105000"/>
+                <a:satMod val="103000"/>
+                <a:tint val="73000"/>
+              </a:schemeClr>
+            </a:gs>
+            <a:gs pos="100000">
+              <a:schemeClr val="phClr">
+                <a:lumMod val="105000"/>
+                <a:satMod val="109000"/>
+                <a:tint val="81000"/>
+              </a:schemeClr>
+            </a:gs>
+          </a:gsLst>
+          <a:lin ang="5400000" scaled="0"/>
+        </a:gradFill>
+        <a:gradFill rotWithShape="1">
+          <a:gsLst>
+            <a:gs pos="0">
+              <a:schemeClr val="phClr">
+                <a:satMod val="103000"/>
+                <a:lumMod val="102000"/>
+                <a:tint val="94000"/>
+              </a:schemeClr>
+            </a:gs>
+            <a:gs pos="50000">
+              <a:schemeClr val="phClr">
+                <a:satMod val="110000"/>
+                <a:lumMod val="100000"/>
+                <a:shade val="100000"/>
+              </a:schemeClr>
+            </a:gs>
+            <a:gs pos="100000">
+              <a:schemeClr val="phClr">
+                <a:lumMod val="99000"/>
+                <a:satMod val="120000"/>
+                <a:shade val="78000"/>
+              </a:schemeClr>
+            </a:gs>
+          </a:gsLst>
+          <a:lin ang="5400000" scaled="0"/>
+        </a:gradFill>
+      </a:fillStyleLst>
+      <a:lnStyleLst>
+        <a:ln w="6350" cap="flat" cmpd="sng" algn="ctr">
+          <a:solidFill>
+            <a:schemeClr val="phClr"/>
+          </a:solidFill>
+          <a:prstDash val="solid"/>
+          <a:miter lim="800000"/>
+        </a:ln>
+        <a:ln w="12700" cap="flat" cmpd="sng" algn="ctr">
+          <a:solidFill>
+            <a:schemeClr val="phClr"/>
+          </a:solidFill>
+          <a:prstDash val="solid"/>
+          <a:miter lim="800000"/>
+        </a:ln>
+        <a:ln w="19050" cap="flat" cmpd="sng" algn="ctr">
+          <a:solidFill>
+            <a:schemeClr val="phClr"/>
+          </a:solidFill>
+          <a:prstDash val="solid"/>
+          <a:miter lim="800000"/>
+        </a:ln>
+      </a:lnStyleLst>
+      <a:effectStyleLst>
+        <a:effectStyle>
+          <a:effectLst/>
+        </a:effectStyle>
+        <a:effectStyle>
+          <a:effectLst/>
+        </a:effectStyle>
+        <a:effectStyle>
+          <a:effectLst>
+            <a:outerShdw blurRad="57150" dist="19050" dir="5400000" algn="ctr" rotWithShape="0">
+              <a:srgbClr val="000000">
+                <a:alpha val="63000"/>
+              </a:srgbClr>
+            </a:outerShdw>
+          </a:effectLst>
+        </a:effectStyle>
+      </a:effectStyleLst>
+      <a:bgFillStyleLst>
+        <a:solidFill>
+          <a:schemeClr val="phClr"/>
+        </a:solidFill>
+        <a:solidFill>
+          <a:schemeClr val="phClr">
+            <a:tint val="95000"/>
+            <a:satMod val="170000"/>
+          </a:schemeClr>
+        </a:solidFill>
+        <a:gradFill rotWithShape="1">
+          <a:gsLst>
+            <a:gs pos="0">
+              <a:schemeClr val="phClr">
+                <a:tint val="93000"/>
+                <a:satMod val="150000"/>
+                <a:shade val="98000"/>
+                <a:lumMod val="102000"/>
+              </a:schemeClr>
+            </a:gs>
+            <a:gs pos="50000">
+              <a:schemeClr val="phClr">
+                <a:tint val="98000"/>
+                <a:satMod val="130000"/>
+                <a:shade val="90000"/>
+                <a:lumMod val="103000"/>
+              </a:schemeClr>
+            </a:gs>
+            <a:gs pos="100000">
+              <a:schemeClr val="phClr">
+                <a:shade val="63000"/>
+                <a:satMod val="120000"/>
+              </a:schemeClr>
+            </a:gs>
+          </a:gsLst>
+          <a:lin ang="5400000" scaled="0"/>
+        </a:gradFill>
+      </a:bgFillStyleLst>
+    </a:fmtScheme>
+  </a:themeElements>
+  <a:objectDefaults/>
+  <a:extraClrSchemeLst/>
+  <a:extLst>
+    <a:ext uri="{05A4C25C-085E-4340-85A3-A5531E510DB2}">
+      <thm15:themeFamily xmlns:thm15="http://schemas.microsoft.com/office/thememl/2012/main" name="Office Theme" id="{62F939B6-93AF-4DB8-9C6B-D6C7DFDC589F}" vid="{4A3C46E8-61CC-4603-A589-7422A47A8E4A}"/>
+    </a:ext>
+  </a:extLst>
+</a:theme>
 </file>
</xml_diff>

<commit_message>
K-Means learning zone development.
</commit_message>
<xml_diff>
--- a/Additional Content/App Storyboard.pptx
+++ b/Additional Content/App Storyboard.pptx
@@ -5,7 +5,7 @@
     <p:sldMasterId id="2147483648" r:id="rId1"/>
   </p:sldMasterIdLst>
   <p:notesMasterIdLst>
-    <p:notesMasterId r:id="rId13"/>
+    <p:notesMasterId r:id="rId14"/>
   </p:notesMasterIdLst>
   <p:sldIdLst>
     <p:sldId id="256" r:id="rId2"/>
@@ -14,11 +14,12 @@
     <p:sldId id="259" r:id="rId5"/>
     <p:sldId id="265" r:id="rId6"/>
     <p:sldId id="260" r:id="rId7"/>
-    <p:sldId id="262" r:id="rId8"/>
-    <p:sldId id="263" r:id="rId9"/>
-    <p:sldId id="267" r:id="rId10"/>
-    <p:sldId id="266" r:id="rId11"/>
-    <p:sldId id="264" r:id="rId12"/>
+    <p:sldId id="268" r:id="rId8"/>
+    <p:sldId id="262" r:id="rId9"/>
+    <p:sldId id="263" r:id="rId10"/>
+    <p:sldId id="267" r:id="rId11"/>
+    <p:sldId id="266" r:id="rId12"/>
+    <p:sldId id="264" r:id="rId13"/>
   </p:sldIdLst>
   <p:sldSz cx="12192000" cy="6858000"/>
   <p:notesSz cx="6858000" cy="9144000"/>
@@ -552,6 +553,93 @@
     <p:extLst>
       <p:ext uri="{BB962C8B-B14F-4D97-AF65-F5344CB8AC3E}">
         <p14:creationId xmlns:p14="http://schemas.microsoft.com/office/powerpoint/2010/main" val="2047753515"/>
+      </p:ext>
+    </p:extLst>
+  </p:cSld>
+  <p:clrMapOvr>
+    <a:masterClrMapping/>
+  </p:clrMapOvr>
+</p:notes>
+</file>
+
+<file path=ppt/notesSlides/notesSlide2.xml><?xml version="1.0" encoding="utf-8"?>
+<p:notes xmlns:a="http://schemas.openxmlformats.org/drawingml/2006/main" xmlns:r="http://schemas.openxmlformats.org/officeDocument/2006/relationships" xmlns:p="http://schemas.openxmlformats.org/presentationml/2006/main">
+  <p:cSld>
+    <p:spTree>
+      <p:nvGrpSpPr>
+        <p:cNvPr id="1" name=""/>
+        <p:cNvGrpSpPr/>
+        <p:nvPr/>
+      </p:nvGrpSpPr>
+      <p:grpSpPr>
+        <a:xfrm>
+          <a:off x="0" y="0"/>
+          <a:ext cx="0" cy="0"/>
+          <a:chOff x="0" y="0"/>
+          <a:chExt cx="0" cy="0"/>
+        </a:xfrm>
+      </p:grpSpPr>
+      <p:sp>
+        <p:nvSpPr>
+          <p:cNvPr id="2" name="Slide Image Placeholder 1"/>
+          <p:cNvSpPr>
+            <a:spLocks noGrp="1" noRot="1" noChangeAspect="1"/>
+          </p:cNvSpPr>
+          <p:nvPr>
+            <p:ph type="sldImg"/>
+          </p:nvPr>
+        </p:nvSpPr>
+        <p:spPr/>
+      </p:sp>
+      <p:sp>
+        <p:nvSpPr>
+          <p:cNvPr id="3" name="Notes Placeholder 2"/>
+          <p:cNvSpPr>
+            <a:spLocks noGrp="1"/>
+          </p:cNvSpPr>
+          <p:nvPr>
+            <p:ph type="body" idx="1"/>
+          </p:nvPr>
+        </p:nvSpPr>
+        <p:spPr/>
+        <p:txBody>
+          <a:bodyPr/>
+          <a:lstStyle/>
+          <a:p>
+            <a:r>
+              <a:rPr lang="en-GB" dirty="0"/>
+              <a:t>K-Means will need to have an option for the play to guess how many centroids there is.</a:t>
+            </a:r>
+          </a:p>
+        </p:txBody>
+      </p:sp>
+      <p:sp>
+        <p:nvSpPr>
+          <p:cNvPr id="4" name="Slide Number Placeholder 3"/>
+          <p:cNvSpPr>
+            <a:spLocks noGrp="1"/>
+          </p:cNvSpPr>
+          <p:nvPr>
+            <p:ph type="sldNum" sz="quarter" idx="5"/>
+          </p:nvPr>
+        </p:nvSpPr>
+        <p:spPr/>
+        <p:txBody>
+          <a:bodyPr/>
+          <a:lstStyle/>
+          <a:p>
+            <a:fld id="{4862C66E-3D74-BF49-9522-41AEEA025E37}" type="slidenum">
+              <a:rPr lang="en-GB" smtClean="0"/>
+              <a:t>7</a:t>
+            </a:fld>
+            <a:endParaRPr lang="en-GB"/>
+          </a:p>
+        </p:txBody>
+      </p:sp>
+    </p:spTree>
+    <p:extLst>
+      <p:ext uri="{BB962C8B-B14F-4D97-AF65-F5344CB8AC3E}">
+        <p14:creationId xmlns:p14="http://schemas.microsoft.com/office/powerpoint/2010/main" val="1300788782"/>
       </p:ext>
     </p:extLst>
   </p:cSld>
@@ -3892,7 +3980,7 @@
           <p:cNvPr id="2" name="Title 1">
             <a:extLst>
               <a:ext uri="{FF2B5EF4-FFF2-40B4-BE49-F238E27FC236}">
-                <a16:creationId xmlns:a16="http://schemas.microsoft.com/office/drawing/2014/main" id="{F41F7F4C-C6E2-2449-AE06-87EB9C5D2977}"/>
+                <a16:creationId xmlns:a16="http://schemas.microsoft.com/office/drawing/2014/main" id="{D990EE0B-FF66-4341-A99A-29C5674D01B1}"/>
               </a:ext>
             </a:extLst>
           </p:cNvPr>
@@ -3910,7 +3998,7 @@
           <a:p>
             <a:r>
               <a:rPr lang="en-US" dirty="0"/>
-              <a:t>Awards Screen (Gamification Badges)</a:t>
+              <a:t>Free Play Area</a:t>
             </a:r>
           </a:p>
         </p:txBody>
@@ -3920,7 +4008,7 @@
           <p:cNvPr id="4" name="Rectangle 3">
             <a:extLst>
               <a:ext uri="{FF2B5EF4-FFF2-40B4-BE49-F238E27FC236}">
-                <a16:creationId xmlns:a16="http://schemas.microsoft.com/office/drawing/2014/main" id="{38BAC55F-C9F4-D54E-8DB1-60EF3A6725B2}"/>
+                <a16:creationId xmlns:a16="http://schemas.microsoft.com/office/drawing/2014/main" id="{AE699655-BFBD-6B4A-B89D-E5AB7E2DBB4B}"/>
               </a:ext>
             </a:extLst>
           </p:cNvPr>
@@ -3929,7 +4017,7 @@
         </p:nvSpPr>
         <p:spPr>
           <a:xfrm>
-            <a:off x="1233054" y="1738108"/>
+            <a:off x="1233054" y="1690688"/>
             <a:ext cx="9725891" cy="4833258"/>
           </a:xfrm>
           <a:prstGeom prst="rect">
@@ -3979,10 +4067,10 @@
       </p:sp>
       <p:sp>
         <p:nvSpPr>
-          <p:cNvPr id="5" name="Rectangle 4">
-            <a:extLst>
-              <a:ext uri="{FF2B5EF4-FFF2-40B4-BE49-F238E27FC236}">
-                <a16:creationId xmlns:a16="http://schemas.microsoft.com/office/drawing/2014/main" id="{F0F52900-A732-2243-A848-75CE77613AD8}"/>
+          <p:cNvPr id="3" name="Rectangle 2">
+            <a:extLst>
+              <a:ext uri="{FF2B5EF4-FFF2-40B4-BE49-F238E27FC236}">
+                <a16:creationId xmlns:a16="http://schemas.microsoft.com/office/drawing/2014/main" id="{A0D8486E-39F7-9642-8379-ED365262BA53}"/>
               </a:ext>
             </a:extLst>
           </p:cNvPr>
@@ -3990,9 +4078,63 @@
           <p:nvPr/>
         </p:nvSpPr>
         <p:spPr>
-          <a:xfrm rot="20576065">
-            <a:off x="3384964" y="1888853"/>
-            <a:ext cx="2329916" cy="923330"/>
+          <a:xfrm>
+            <a:off x="1440493" y="2091847"/>
+            <a:ext cx="4265112" cy="2386208"/>
+          </a:xfrm>
+          <a:prstGeom prst="rect">
+            <a:avLst/>
+          </a:prstGeom>
+          <a:solidFill>
+            <a:schemeClr val="bg2">
+              <a:lumMod val="75000"/>
+            </a:schemeClr>
+          </a:solidFill>
+        </p:spPr>
+        <p:style>
+          <a:lnRef idx="2">
+            <a:schemeClr val="accent1">
+              <a:shade val="50000"/>
+            </a:schemeClr>
+          </a:lnRef>
+          <a:fillRef idx="1">
+            <a:schemeClr val="accent1"/>
+          </a:fillRef>
+          <a:effectRef idx="0">
+            <a:schemeClr val="accent1"/>
+          </a:effectRef>
+          <a:fontRef idx="minor">
+            <a:schemeClr val="lt1"/>
+          </a:fontRef>
+        </p:style>
+        <p:txBody>
+          <a:bodyPr rtlCol="0" anchor="ctr"/>
+          <a:lstStyle/>
+          <a:p>
+            <a:pPr algn="ctr"/>
+            <a:r>
+              <a:rPr lang="en-GB" dirty="0"/>
+              <a:t>Model/ Interaction Area</a:t>
+            </a:r>
+          </a:p>
+        </p:txBody>
+      </p:sp>
+      <p:sp>
+        <p:nvSpPr>
+          <p:cNvPr id="5" name="TextBox 4">
+            <a:extLst>
+              <a:ext uri="{FF2B5EF4-FFF2-40B4-BE49-F238E27FC236}">
+                <a16:creationId xmlns:a16="http://schemas.microsoft.com/office/drawing/2014/main" id="{02680A0B-7899-EA45-8783-6A222BB1B468}"/>
+              </a:ext>
+            </a:extLst>
+          </p:cNvPr>
+          <p:cNvSpPr txBox="1"/>
+          <p:nvPr/>
+        </p:nvSpPr>
+        <p:spPr>
+          <a:xfrm>
+            <a:off x="5987441" y="2116899"/>
+            <a:ext cx="4597052" cy="1477328"/>
           </a:xfrm>
           <a:prstGeom prst="rect">
             <a:avLst/>
@@ -4000,25 +4142,52 @@
           <a:noFill/>
         </p:spPr>
         <p:txBody>
-          <a:bodyPr wrap="square" lIns="91440" tIns="45720" rIns="91440" bIns="45720">
+          <a:bodyPr wrap="square" rtlCol="0">
             <a:spAutoFit/>
           </a:bodyPr>
           <a:lstStyle/>
           <a:p>
-            <a:pPr algn="ctr"/>
-            <a:r>
-              <a:rPr lang="en-GB" sz="5400" b="1" dirty="0">
-                <a:ln w="12700" cmpd="sng">
-                  <a:solidFill>
-                    <a:srgbClr val="C4623E"/>
-                  </a:solidFill>
-                  <a:prstDash val="solid"/>
-                </a:ln>
+            <a:r>
+              <a:rPr lang="en-GB" dirty="0">
                 <a:solidFill>
-                  <a:srgbClr val="C3C02C"/>
+                  <a:schemeClr val="bg1"/>
                 </a:solidFill>
               </a:rPr>
-              <a:t>Awards</a:t>
+              <a:t>Model: [Name] </a:t>
+            </a:r>
+          </a:p>
+          <a:p>
+            <a:endParaRPr lang="en-GB" dirty="0">
+              <a:solidFill>
+                <a:schemeClr val="bg1"/>
+              </a:solidFill>
+            </a:endParaRPr>
+          </a:p>
+          <a:p>
+            <a:r>
+              <a:rPr lang="en-GB" dirty="0">
+                <a:solidFill>
+                  <a:schemeClr val="bg1"/>
+                </a:solidFill>
+              </a:rPr>
+              <a:t>Learning Type: [Supervised/ Unsupervised]</a:t>
+            </a:r>
+          </a:p>
+          <a:p>
+            <a:endParaRPr lang="en-GB" dirty="0">
+              <a:solidFill>
+                <a:schemeClr val="bg1"/>
+              </a:solidFill>
+            </a:endParaRPr>
+          </a:p>
+          <a:p>
+            <a:r>
+              <a:rPr lang="en-GB" dirty="0">
+                <a:solidFill>
+                  <a:schemeClr val="bg1"/>
+                </a:solidFill>
+              </a:rPr>
+              <a:t>Overview: [Brief overview of the model]</a:t>
             </a:r>
           </a:p>
         </p:txBody>
@@ -4028,7 +4197,7 @@
           <p:cNvPr id="6" name="Rectangle 5">
             <a:extLst>
               <a:ext uri="{FF2B5EF4-FFF2-40B4-BE49-F238E27FC236}">
-                <a16:creationId xmlns:a16="http://schemas.microsoft.com/office/drawing/2014/main" id="{6BF916E9-FF5C-7B49-BC31-9D6E35AFDF71}"/>
+                <a16:creationId xmlns:a16="http://schemas.microsoft.com/office/drawing/2014/main" id="{C68B7AD0-0961-DA41-81F4-5646B8F71C77}"/>
               </a:ext>
             </a:extLst>
           </p:cNvPr>
@@ -4036,72 +4205,31 @@
           <p:nvPr/>
         </p:nvSpPr>
         <p:spPr>
-          <a:xfrm rot="534280">
-            <a:off x="5298619" y="2251572"/>
-            <a:ext cx="1825371" cy="923330"/>
+          <a:xfrm>
+            <a:off x="1440493" y="4603315"/>
+            <a:ext cx="9388258" cy="1841326"/>
           </a:xfrm>
           <a:prstGeom prst="rect">
             <a:avLst/>
           </a:prstGeom>
-          <a:noFill/>
-        </p:spPr>
-        <p:txBody>
-          <a:bodyPr wrap="none" lIns="91440" tIns="45720" rIns="91440" bIns="45720">
-            <a:spAutoFit/>
-          </a:bodyPr>
-          <a:lstStyle/>
-          <a:p>
-            <a:pPr algn="ctr"/>
-            <a:r>
-              <a:rPr lang="en-GB" sz="5400" b="1" cap="none" spc="0" dirty="0">
-                <a:ln w="12700" cmpd="sng">
-                  <a:solidFill>
-                    <a:srgbClr val="6214C4"/>
-                  </a:solidFill>
-                  <a:prstDash val="solid"/>
-                </a:ln>
-                <a:solidFill>
-                  <a:srgbClr val="03C1A1"/>
-                </a:solidFill>
-                <a:effectLst/>
-              </a:rPr>
-              <a:t>Zone!</a:t>
-            </a:r>
-          </a:p>
-        </p:txBody>
-      </p:sp>
-      <p:sp>
-        <p:nvSpPr>
-          <p:cNvPr id="7" name="Rectangle 6">
-            <a:extLst>
-              <a:ext uri="{FF2B5EF4-FFF2-40B4-BE49-F238E27FC236}">
-                <a16:creationId xmlns:a16="http://schemas.microsoft.com/office/drawing/2014/main" id="{1A761DC7-809D-974F-8D69-B45CA5FEC1DA}"/>
-              </a:ext>
-            </a:extLst>
-          </p:cNvPr>
-          <p:cNvSpPr/>
-          <p:nvPr/>
-        </p:nvSpPr>
-        <p:spPr>
-          <a:xfrm>
-            <a:off x="1490597" y="3356975"/>
-            <a:ext cx="4744523" cy="3135900"/>
-          </a:xfrm>
-          <a:prstGeom prst="rect">
-            <a:avLst/>
-          </a:prstGeom>
+          <a:solidFill>
+            <a:schemeClr val="accent5">
+              <a:lumMod val="60000"/>
+              <a:lumOff val="40000"/>
+            </a:schemeClr>
+          </a:solidFill>
         </p:spPr>
         <p:style>
           <a:lnRef idx="2">
-            <a:schemeClr val="accent3">
+            <a:schemeClr val="accent1">
               <a:shade val="50000"/>
             </a:schemeClr>
           </a:lnRef>
           <a:fillRef idx="1">
-            <a:schemeClr val="accent3"/>
+            <a:schemeClr val="accent1"/>
           </a:fillRef>
           <a:effectRef idx="0">
-            <a:schemeClr val="accent3"/>
+            <a:schemeClr val="accent1"/>
           </a:effectRef>
           <a:fontRef idx="minor">
             <a:schemeClr val="lt1"/>
@@ -4112,182 +4240,353 @@
           <a:lstStyle/>
           <a:p>
             <a:pPr algn="ctr"/>
-            <a:r>
-              <a:rPr lang="en-GB" dirty="0"/>
-              <a:t>List of all the available awards.</a:t>
-            </a:r>
-          </a:p>
-          <a:p>
-            <a:pPr algn="ctr"/>
             <a:endParaRPr lang="en-GB" dirty="0"/>
           </a:p>
-          <a:p>
-            <a:pPr algn="ctr"/>
-            <a:endParaRPr lang="en-GB" dirty="0"/>
-          </a:p>
-          <a:p>
-            <a:pPr algn="ctr"/>
-            <a:endParaRPr lang="en-GB" dirty="0"/>
-          </a:p>
-          <a:p>
-            <a:pPr algn="ctr"/>
-            <a:endParaRPr lang="en-GB" dirty="0"/>
-          </a:p>
-          <a:p>
-            <a:pPr algn="ctr"/>
-            <a:endParaRPr lang="en-GB" dirty="0"/>
-          </a:p>
-          <a:p>
-            <a:pPr algn="ctr"/>
-            <a:endParaRPr lang="en-GB" dirty="0"/>
-          </a:p>
-          <a:p>
-            <a:pPr algn="ctr"/>
-            <a:endParaRPr lang="en-GB" dirty="0"/>
-          </a:p>
-          <a:p>
-            <a:pPr algn="ctr"/>
-            <a:endParaRPr lang="en-GB" dirty="0"/>
-          </a:p>
-        </p:txBody>
-      </p:sp>
-      <p:sp>
-        <p:nvSpPr>
-          <p:cNvPr id="8" name="Rectangle 7">
-            <a:extLst>
-              <a:ext uri="{FF2B5EF4-FFF2-40B4-BE49-F238E27FC236}">
-                <a16:creationId xmlns:a16="http://schemas.microsoft.com/office/drawing/2014/main" id="{4CF69489-887D-5A44-BA91-CFA0B5CC1C79}"/>
-              </a:ext>
-            </a:extLst>
-          </p:cNvPr>
-          <p:cNvSpPr/>
+        </p:txBody>
+      </p:sp>
+      <p:grpSp>
+        <p:nvGrpSpPr>
+          <p:cNvPr id="21" name="Group 20">
+            <a:extLst>
+              <a:ext uri="{FF2B5EF4-FFF2-40B4-BE49-F238E27FC236}">
+                <a16:creationId xmlns:a16="http://schemas.microsoft.com/office/drawing/2014/main" id="{90C3EB00-BCD7-CB45-85B0-F92D9E2FD51A}"/>
+              </a:ext>
+            </a:extLst>
+          </p:cNvPr>
+          <p:cNvGrpSpPr/>
           <p:nvPr/>
-        </p:nvSpPr>
-        <p:spPr>
+        </p:nvGrpSpPr>
+        <p:grpSpPr>
           <a:xfrm>
-            <a:off x="6492660" y="3356975"/>
-            <a:ext cx="4208745" cy="3135900"/>
+            <a:off x="10256729" y="5339951"/>
+            <a:ext cx="494778" cy="1041385"/>
+            <a:chOff x="10256729" y="4688597"/>
+            <a:chExt cx="494778" cy="1041385"/>
           </a:xfrm>
-          <a:prstGeom prst="rect">
-            <a:avLst/>
-          </a:prstGeom>
-        </p:spPr>
-        <p:style>
-          <a:lnRef idx="2">
-            <a:schemeClr val="accent3">
-              <a:shade val="50000"/>
-            </a:schemeClr>
-          </a:lnRef>
-          <a:fillRef idx="1">
-            <a:schemeClr val="accent3"/>
-          </a:fillRef>
-          <a:effectRef idx="0">
-            <a:schemeClr val="accent3"/>
-          </a:effectRef>
-          <a:fontRef idx="minor">
-            <a:schemeClr val="lt1"/>
-          </a:fontRef>
-        </p:style>
-        <p:txBody>
-          <a:bodyPr rtlCol="0" anchor="ctr"/>
-          <a:lstStyle/>
-          <a:p>
-            <a:pPr algn="ctr"/>
-            <a:r>
-              <a:rPr lang="en-GB" dirty="0"/>
-              <a:t>Leader board/ High score area</a:t>
-            </a:r>
-          </a:p>
-          <a:p>
-            <a:pPr algn="ctr"/>
-            <a:endParaRPr lang="en-GB" dirty="0"/>
-          </a:p>
-          <a:p>
-            <a:pPr algn="ctr"/>
-            <a:endParaRPr lang="en-GB" dirty="0"/>
-          </a:p>
-          <a:p>
-            <a:pPr algn="ctr"/>
-            <a:endParaRPr lang="en-GB" dirty="0"/>
-          </a:p>
-          <a:p>
-            <a:pPr algn="ctr"/>
-            <a:endParaRPr lang="en-GB" dirty="0"/>
-          </a:p>
-          <a:p>
-            <a:pPr algn="ctr"/>
-            <a:endParaRPr lang="en-GB" dirty="0"/>
-          </a:p>
-          <a:p>
-            <a:pPr algn="ctr"/>
-            <a:endParaRPr lang="en-GB" dirty="0"/>
-          </a:p>
-          <a:p>
-            <a:pPr algn="ctr"/>
-            <a:endParaRPr lang="en-GB" dirty="0"/>
-          </a:p>
-        </p:txBody>
-      </p:sp>
-      <p:sp>
-        <p:nvSpPr>
-          <p:cNvPr id="9" name="Rectangle 8">
-            <a:extLst>
-              <a:ext uri="{FF2B5EF4-FFF2-40B4-BE49-F238E27FC236}">
-                <a16:creationId xmlns:a16="http://schemas.microsoft.com/office/drawing/2014/main" id="{F6190546-2D56-AD4D-84D4-7911CF46105A}"/>
-              </a:ext>
-            </a:extLst>
-          </p:cNvPr>
-          <p:cNvSpPr/>
-          <p:nvPr/>
-        </p:nvSpPr>
-        <p:spPr>
-          <a:xfrm>
-            <a:off x="4595631" y="3995600"/>
-            <a:ext cx="2588821" cy="1691014"/>
-          </a:xfrm>
-          <a:prstGeom prst="rect">
-            <a:avLst/>
-          </a:prstGeom>
-        </p:spPr>
-        <p:style>
-          <a:lnRef idx="2">
-            <a:schemeClr val="accent4">
-              <a:shade val="50000"/>
-            </a:schemeClr>
-          </a:lnRef>
-          <a:fillRef idx="1">
-            <a:schemeClr val="accent4"/>
-          </a:fillRef>
-          <a:effectRef idx="0">
-            <a:schemeClr val="accent4"/>
-          </a:effectRef>
-          <a:fontRef idx="minor">
-            <a:schemeClr val="lt1"/>
-          </a:fontRef>
-        </p:style>
-        <p:txBody>
-          <a:bodyPr rtlCol="0" anchor="ctr"/>
-          <a:lstStyle/>
-          <a:p>
-            <a:pPr algn="ctr"/>
-            <a:r>
-              <a:rPr lang="en-GB" dirty="0"/>
-              <a:t>*Pop-up window*</a:t>
-            </a:r>
-          </a:p>
-          <a:p>
-            <a:pPr algn="ctr"/>
-            <a:r>
-              <a:rPr lang="en-GB" dirty="0"/>
-              <a:t>Explanation of how to get them/ a snippet of the award if won</a:t>
-            </a:r>
-          </a:p>
-        </p:txBody>
-      </p:sp>
+        </p:grpSpPr>
+        <p:grpSp>
+          <p:nvGrpSpPr>
+            <p:cNvPr id="13" name="Group 12">
+              <a:extLst>
+                <a:ext uri="{FF2B5EF4-FFF2-40B4-BE49-F238E27FC236}">
+                  <a16:creationId xmlns:a16="http://schemas.microsoft.com/office/drawing/2014/main" id="{BD9D634E-A2B0-4045-B893-EF1891625EF3}"/>
+                </a:ext>
+              </a:extLst>
+            </p:cNvPr>
+            <p:cNvGrpSpPr/>
+            <p:nvPr/>
+          </p:nvGrpSpPr>
+          <p:grpSpPr>
+            <a:xfrm>
+              <a:off x="10256729" y="5434806"/>
+              <a:ext cx="494778" cy="295176"/>
+              <a:chOff x="5122859" y="6116564"/>
+              <a:chExt cx="494778" cy="295176"/>
+            </a:xfrm>
+          </p:grpSpPr>
+          <p:sp>
+            <p:nvSpPr>
+              <p:cNvPr id="14" name="Rounded Rectangle 13">
+                <a:extLst>
+                  <a:ext uri="{FF2B5EF4-FFF2-40B4-BE49-F238E27FC236}">
+                    <a16:creationId xmlns:a16="http://schemas.microsoft.com/office/drawing/2014/main" id="{8F2E4D8C-2AF9-134E-947B-E79997CF652E}"/>
+                  </a:ext>
+                </a:extLst>
+              </p:cNvPr>
+              <p:cNvSpPr/>
+              <p:nvPr/>
+            </p:nvSpPr>
+            <p:spPr>
+              <a:xfrm>
+                <a:off x="5122859" y="6116564"/>
+                <a:ext cx="494778" cy="295176"/>
+              </a:xfrm>
+              <a:prstGeom prst="roundRect">
+                <a:avLst/>
+              </a:prstGeom>
+              <a:solidFill>
+                <a:srgbClr val="07C2A1"/>
+              </a:solidFill>
+            </p:spPr>
+            <p:style>
+              <a:lnRef idx="2">
+                <a:schemeClr val="accent1">
+                  <a:shade val="50000"/>
+                </a:schemeClr>
+              </a:lnRef>
+              <a:fillRef idx="1">
+                <a:schemeClr val="accent1"/>
+              </a:fillRef>
+              <a:effectRef idx="0">
+                <a:schemeClr val="accent1"/>
+              </a:effectRef>
+              <a:fontRef idx="minor">
+                <a:schemeClr val="lt1"/>
+              </a:fontRef>
+            </p:style>
+            <p:txBody>
+              <a:bodyPr rtlCol="0" anchor="ctr"/>
+              <a:lstStyle/>
+              <a:p>
+                <a:pPr algn="ctr"/>
+                <a:endParaRPr lang="en-GB"/>
+              </a:p>
+            </p:txBody>
+          </p:sp>
+          <p:pic>
+            <p:nvPicPr>
+              <p:cNvPr id="15" name="Graphic 14">
+                <a:extLst>
+                  <a:ext uri="{FF2B5EF4-FFF2-40B4-BE49-F238E27FC236}">
+                    <a16:creationId xmlns:a16="http://schemas.microsoft.com/office/drawing/2014/main" id="{AD931E40-A3F3-6944-8412-C4D1E131D2E0}"/>
+                  </a:ext>
+                </a:extLst>
+              </p:cNvPr>
+              <p:cNvPicPr>
+                <a:picLocks noChangeAspect="1"/>
+              </p:cNvPicPr>
+              <p:nvPr/>
+            </p:nvPicPr>
+            <p:blipFill>
+              <a:blip r:embed="rId2">
+                <a:extLst>
+                  <a:ext uri="{96DAC541-7B7A-43D3-8B79-37D633B846F1}">
+                    <asvg:svgBlip xmlns:asvg="http://schemas.microsoft.com/office/drawing/2016/SVG/main" r:embed="rId3"/>
+                  </a:ext>
+                </a:extLst>
+              </a:blip>
+              <a:stretch>
+                <a:fillRect/>
+              </a:stretch>
+            </p:blipFill>
+            <p:spPr>
+              <a:xfrm>
+                <a:off x="5238448" y="6146996"/>
+                <a:ext cx="263600" cy="234311"/>
+              </a:xfrm>
+              <a:prstGeom prst="rect">
+                <a:avLst/>
+              </a:prstGeom>
+            </p:spPr>
+          </p:pic>
+        </p:grpSp>
+        <p:grpSp>
+          <p:nvGrpSpPr>
+            <p:cNvPr id="20" name="Group 19">
+              <a:extLst>
+                <a:ext uri="{FF2B5EF4-FFF2-40B4-BE49-F238E27FC236}">
+                  <a16:creationId xmlns:a16="http://schemas.microsoft.com/office/drawing/2014/main" id="{501F6700-AEE9-924E-80B7-E39BF9151F9C}"/>
+                </a:ext>
+              </a:extLst>
+            </p:cNvPr>
+            <p:cNvGrpSpPr/>
+            <p:nvPr/>
+          </p:nvGrpSpPr>
+          <p:grpSpPr>
+            <a:xfrm>
+              <a:off x="10256729" y="4688597"/>
+              <a:ext cx="494778" cy="295176"/>
+              <a:chOff x="10256729" y="4688597"/>
+              <a:chExt cx="494778" cy="295176"/>
+            </a:xfrm>
+          </p:grpSpPr>
+          <p:sp>
+            <p:nvSpPr>
+              <p:cNvPr id="8" name="Rounded Rectangle 7">
+                <a:extLst>
+                  <a:ext uri="{FF2B5EF4-FFF2-40B4-BE49-F238E27FC236}">
+                    <a16:creationId xmlns:a16="http://schemas.microsoft.com/office/drawing/2014/main" id="{F7EC5FCA-F743-374C-BC2E-F249C222A328}"/>
+                  </a:ext>
+                </a:extLst>
+              </p:cNvPr>
+              <p:cNvSpPr/>
+              <p:nvPr/>
+            </p:nvSpPr>
+            <p:spPr>
+              <a:xfrm>
+                <a:off x="10256729" y="4688597"/>
+                <a:ext cx="494778" cy="295176"/>
+              </a:xfrm>
+              <a:prstGeom prst="roundRect">
+                <a:avLst/>
+              </a:prstGeom>
+              <a:solidFill>
+                <a:srgbClr val="07C2A1"/>
+              </a:solidFill>
+            </p:spPr>
+            <p:style>
+              <a:lnRef idx="2">
+                <a:schemeClr val="accent1">
+                  <a:shade val="50000"/>
+                </a:schemeClr>
+              </a:lnRef>
+              <a:fillRef idx="1">
+                <a:schemeClr val="accent1"/>
+              </a:fillRef>
+              <a:effectRef idx="0">
+                <a:schemeClr val="accent1"/>
+              </a:effectRef>
+              <a:fontRef idx="minor">
+                <a:schemeClr val="lt1"/>
+              </a:fontRef>
+            </p:style>
+            <p:txBody>
+              <a:bodyPr rtlCol="0" anchor="ctr"/>
+              <a:lstStyle/>
+              <a:p>
+                <a:pPr algn="ctr"/>
+                <a:endParaRPr lang="en-GB"/>
+              </a:p>
+            </p:txBody>
+          </p:sp>
+          <p:pic>
+            <p:nvPicPr>
+              <p:cNvPr id="16" name="Graphic 15">
+                <a:extLst>
+                  <a:ext uri="{FF2B5EF4-FFF2-40B4-BE49-F238E27FC236}">
+                    <a16:creationId xmlns:a16="http://schemas.microsoft.com/office/drawing/2014/main" id="{1C7636F9-16FA-8A43-9FFE-C9E21DBAD6A7}"/>
+                  </a:ext>
+                </a:extLst>
+              </p:cNvPr>
+              <p:cNvPicPr>
+                <a:picLocks noChangeAspect="1"/>
+              </p:cNvPicPr>
+              <p:nvPr/>
+            </p:nvPicPr>
+            <p:blipFill>
+              <a:blip r:embed="rId4">
+                <a:extLst>
+                  <a:ext uri="{96DAC541-7B7A-43D3-8B79-37D633B846F1}">
+                    <asvg:svgBlip xmlns:asvg="http://schemas.microsoft.com/office/drawing/2016/SVG/main" r:embed="rId5"/>
+                  </a:ext>
+                </a:extLst>
+              </a:blip>
+              <a:stretch>
+                <a:fillRect/>
+              </a:stretch>
+            </p:blipFill>
+            <p:spPr>
+              <a:xfrm>
+                <a:off x="10386962" y="4726383"/>
+                <a:ext cx="234311" cy="234311"/>
+              </a:xfrm>
+              <a:prstGeom prst="rect">
+                <a:avLst/>
+              </a:prstGeom>
+            </p:spPr>
+          </p:pic>
+        </p:grpSp>
+        <p:grpSp>
+          <p:nvGrpSpPr>
+            <p:cNvPr id="19" name="Group 18">
+              <a:extLst>
+                <a:ext uri="{FF2B5EF4-FFF2-40B4-BE49-F238E27FC236}">
+                  <a16:creationId xmlns:a16="http://schemas.microsoft.com/office/drawing/2014/main" id="{6AE86527-E93C-ED4E-BF7D-7842D8D56345}"/>
+                </a:ext>
+              </a:extLst>
+            </p:cNvPr>
+            <p:cNvGrpSpPr/>
+            <p:nvPr/>
+          </p:nvGrpSpPr>
+          <p:grpSpPr>
+            <a:xfrm>
+              <a:off x="10256729" y="5062088"/>
+              <a:ext cx="494778" cy="295176"/>
+              <a:chOff x="10256729" y="5062088"/>
+              <a:chExt cx="494778" cy="295176"/>
+            </a:xfrm>
+          </p:grpSpPr>
+          <p:sp>
+            <p:nvSpPr>
+              <p:cNvPr id="11" name="Rounded Rectangle 10">
+                <a:extLst>
+                  <a:ext uri="{FF2B5EF4-FFF2-40B4-BE49-F238E27FC236}">
+                    <a16:creationId xmlns:a16="http://schemas.microsoft.com/office/drawing/2014/main" id="{CDED5D3F-E7D8-5041-89F0-69A8918080F3}"/>
+                  </a:ext>
+                </a:extLst>
+              </p:cNvPr>
+              <p:cNvSpPr/>
+              <p:nvPr/>
+            </p:nvSpPr>
+            <p:spPr>
+              <a:xfrm>
+                <a:off x="10256729" y="5062088"/>
+                <a:ext cx="494778" cy="295176"/>
+              </a:xfrm>
+              <a:prstGeom prst="roundRect">
+                <a:avLst/>
+              </a:prstGeom>
+              <a:solidFill>
+                <a:srgbClr val="07C2A1"/>
+              </a:solidFill>
+            </p:spPr>
+            <p:style>
+              <a:lnRef idx="2">
+                <a:schemeClr val="accent1">
+                  <a:shade val="50000"/>
+                </a:schemeClr>
+              </a:lnRef>
+              <a:fillRef idx="1">
+                <a:schemeClr val="accent1"/>
+              </a:fillRef>
+              <a:effectRef idx="0">
+                <a:schemeClr val="accent1"/>
+              </a:effectRef>
+              <a:fontRef idx="minor">
+                <a:schemeClr val="lt1"/>
+              </a:fontRef>
+            </p:style>
+            <p:txBody>
+              <a:bodyPr rtlCol="0" anchor="ctr"/>
+              <a:lstStyle/>
+              <a:p>
+                <a:pPr algn="ctr"/>
+                <a:endParaRPr lang="en-GB"/>
+              </a:p>
+            </p:txBody>
+          </p:sp>
+          <p:pic>
+            <p:nvPicPr>
+              <p:cNvPr id="18" name="Graphic 17">
+                <a:extLst>
+                  <a:ext uri="{FF2B5EF4-FFF2-40B4-BE49-F238E27FC236}">
+                    <a16:creationId xmlns:a16="http://schemas.microsoft.com/office/drawing/2014/main" id="{6A71FEC6-2A97-D743-AD0F-6F64CE775C6E}"/>
+                  </a:ext>
+                </a:extLst>
+              </p:cNvPr>
+              <p:cNvPicPr>
+                <a:picLocks noChangeAspect="1"/>
+              </p:cNvPicPr>
+              <p:nvPr/>
+            </p:nvPicPr>
+            <p:blipFill>
+              <a:blip r:embed="rId6">
+                <a:extLst>
+                  <a:ext uri="{96DAC541-7B7A-43D3-8B79-37D633B846F1}">
+                    <asvg:svgBlip xmlns:asvg="http://schemas.microsoft.com/office/drawing/2016/SVG/main" r:embed="rId7"/>
+                  </a:ext>
+                </a:extLst>
+              </a:blip>
+              <a:stretch>
+                <a:fillRect/>
+              </a:stretch>
+            </p:blipFill>
+            <p:spPr>
+              <a:xfrm>
+                <a:off x="10392750" y="5095290"/>
+                <a:ext cx="222733" cy="222733"/>
+              </a:xfrm>
+              <a:prstGeom prst="rect">
+                <a:avLst/>
+              </a:prstGeom>
+            </p:spPr>
+          </p:pic>
+        </p:grpSp>
+      </p:grpSp>
     </p:spTree>
     <p:extLst>
       <p:ext uri="{BB962C8B-B14F-4D97-AF65-F5344CB8AC3E}">
-        <p14:creationId xmlns:p14="http://schemas.microsoft.com/office/powerpoint/2010/main" val="1559509527"/>
+        <p14:creationId xmlns:p14="http://schemas.microsoft.com/office/powerpoint/2010/main" val="4262892557"/>
       </p:ext>
     </p:extLst>
   </p:cSld>
@@ -4319,6 +4618,435 @@
           <p:cNvPr id="2" name="Title 1">
             <a:extLst>
               <a:ext uri="{FF2B5EF4-FFF2-40B4-BE49-F238E27FC236}">
+                <a16:creationId xmlns:a16="http://schemas.microsoft.com/office/drawing/2014/main" id="{F41F7F4C-C6E2-2449-AE06-87EB9C5D2977}"/>
+              </a:ext>
+            </a:extLst>
+          </p:cNvPr>
+          <p:cNvSpPr>
+            <a:spLocks noGrp="1"/>
+          </p:cNvSpPr>
+          <p:nvPr>
+            <p:ph type="title"/>
+          </p:nvPr>
+        </p:nvSpPr>
+        <p:spPr/>
+        <p:txBody>
+          <a:bodyPr/>
+          <a:lstStyle/>
+          <a:p>
+            <a:r>
+              <a:rPr lang="en-US" dirty="0"/>
+              <a:t>Awards Screen (Gamification Badges)</a:t>
+            </a:r>
+          </a:p>
+        </p:txBody>
+      </p:sp>
+      <p:sp>
+        <p:nvSpPr>
+          <p:cNvPr id="4" name="Rectangle 3">
+            <a:extLst>
+              <a:ext uri="{FF2B5EF4-FFF2-40B4-BE49-F238E27FC236}">
+                <a16:creationId xmlns:a16="http://schemas.microsoft.com/office/drawing/2014/main" id="{38BAC55F-C9F4-D54E-8DB1-60EF3A6725B2}"/>
+              </a:ext>
+            </a:extLst>
+          </p:cNvPr>
+          <p:cNvSpPr/>
+          <p:nvPr/>
+        </p:nvSpPr>
+        <p:spPr>
+          <a:xfrm>
+            <a:off x="1233054" y="1738108"/>
+            <a:ext cx="9725891" cy="4833258"/>
+          </a:xfrm>
+          <a:prstGeom prst="rect">
+            <a:avLst/>
+          </a:prstGeom>
+          <a:solidFill>
+            <a:schemeClr val="accent1">
+              <a:lumMod val="75000"/>
+            </a:schemeClr>
+          </a:solidFill>
+        </p:spPr>
+        <p:style>
+          <a:lnRef idx="2">
+            <a:schemeClr val="accent1">
+              <a:shade val="50000"/>
+            </a:schemeClr>
+          </a:lnRef>
+          <a:fillRef idx="1">
+            <a:schemeClr val="accent1"/>
+          </a:fillRef>
+          <a:effectRef idx="0">
+            <a:schemeClr val="accent1"/>
+          </a:effectRef>
+          <a:fontRef idx="minor">
+            <a:schemeClr val="lt1"/>
+          </a:fontRef>
+        </p:style>
+        <p:txBody>
+          <a:bodyPr rtlCol="0" anchor="ctr"/>
+          <a:lstStyle/>
+          <a:p>
+            <a:pPr algn="ctr"/>
+            <a:endParaRPr lang="en-GB" b="1">
+              <a:ln w="22225">
+                <a:solidFill>
+                  <a:schemeClr val="accent2"/>
+                </a:solidFill>
+                <a:prstDash val="solid"/>
+              </a:ln>
+              <a:solidFill>
+                <a:schemeClr val="accent2">
+                  <a:lumMod val="40000"/>
+                  <a:lumOff val="60000"/>
+                </a:schemeClr>
+              </a:solidFill>
+            </a:endParaRPr>
+          </a:p>
+        </p:txBody>
+      </p:sp>
+      <p:sp>
+        <p:nvSpPr>
+          <p:cNvPr id="5" name="Rectangle 4">
+            <a:extLst>
+              <a:ext uri="{FF2B5EF4-FFF2-40B4-BE49-F238E27FC236}">
+                <a16:creationId xmlns:a16="http://schemas.microsoft.com/office/drawing/2014/main" id="{F0F52900-A732-2243-A848-75CE77613AD8}"/>
+              </a:ext>
+            </a:extLst>
+          </p:cNvPr>
+          <p:cNvSpPr/>
+          <p:nvPr/>
+        </p:nvSpPr>
+        <p:spPr>
+          <a:xfrm rot="20576065">
+            <a:off x="3384964" y="1888853"/>
+            <a:ext cx="2329916" cy="923330"/>
+          </a:xfrm>
+          <a:prstGeom prst="rect">
+            <a:avLst/>
+          </a:prstGeom>
+          <a:noFill/>
+        </p:spPr>
+        <p:txBody>
+          <a:bodyPr wrap="square" lIns="91440" tIns="45720" rIns="91440" bIns="45720">
+            <a:spAutoFit/>
+          </a:bodyPr>
+          <a:lstStyle/>
+          <a:p>
+            <a:pPr algn="ctr"/>
+            <a:r>
+              <a:rPr lang="en-GB" sz="5400" b="1" dirty="0">
+                <a:ln w="12700" cmpd="sng">
+                  <a:solidFill>
+                    <a:srgbClr val="C4623E"/>
+                  </a:solidFill>
+                  <a:prstDash val="solid"/>
+                </a:ln>
+                <a:solidFill>
+                  <a:srgbClr val="C3C02C"/>
+                </a:solidFill>
+              </a:rPr>
+              <a:t>Awards</a:t>
+            </a:r>
+          </a:p>
+        </p:txBody>
+      </p:sp>
+      <p:sp>
+        <p:nvSpPr>
+          <p:cNvPr id="6" name="Rectangle 5">
+            <a:extLst>
+              <a:ext uri="{FF2B5EF4-FFF2-40B4-BE49-F238E27FC236}">
+                <a16:creationId xmlns:a16="http://schemas.microsoft.com/office/drawing/2014/main" id="{6BF916E9-FF5C-7B49-BC31-9D6E35AFDF71}"/>
+              </a:ext>
+            </a:extLst>
+          </p:cNvPr>
+          <p:cNvSpPr/>
+          <p:nvPr/>
+        </p:nvSpPr>
+        <p:spPr>
+          <a:xfrm rot="534280">
+            <a:off x="5298619" y="2251572"/>
+            <a:ext cx="1825371" cy="923330"/>
+          </a:xfrm>
+          <a:prstGeom prst="rect">
+            <a:avLst/>
+          </a:prstGeom>
+          <a:noFill/>
+        </p:spPr>
+        <p:txBody>
+          <a:bodyPr wrap="none" lIns="91440" tIns="45720" rIns="91440" bIns="45720">
+            <a:spAutoFit/>
+          </a:bodyPr>
+          <a:lstStyle/>
+          <a:p>
+            <a:pPr algn="ctr"/>
+            <a:r>
+              <a:rPr lang="en-GB" sz="5400" b="1" cap="none" spc="0" dirty="0">
+                <a:ln w="12700" cmpd="sng">
+                  <a:solidFill>
+                    <a:srgbClr val="6214C4"/>
+                  </a:solidFill>
+                  <a:prstDash val="solid"/>
+                </a:ln>
+                <a:solidFill>
+                  <a:srgbClr val="03C1A1"/>
+                </a:solidFill>
+                <a:effectLst/>
+              </a:rPr>
+              <a:t>Zone!</a:t>
+            </a:r>
+          </a:p>
+        </p:txBody>
+      </p:sp>
+      <p:sp>
+        <p:nvSpPr>
+          <p:cNvPr id="7" name="Rectangle 6">
+            <a:extLst>
+              <a:ext uri="{FF2B5EF4-FFF2-40B4-BE49-F238E27FC236}">
+                <a16:creationId xmlns:a16="http://schemas.microsoft.com/office/drawing/2014/main" id="{1A761DC7-809D-974F-8D69-B45CA5FEC1DA}"/>
+              </a:ext>
+            </a:extLst>
+          </p:cNvPr>
+          <p:cNvSpPr/>
+          <p:nvPr/>
+        </p:nvSpPr>
+        <p:spPr>
+          <a:xfrm>
+            <a:off x="1490597" y="3356975"/>
+            <a:ext cx="4744523" cy="3135900"/>
+          </a:xfrm>
+          <a:prstGeom prst="rect">
+            <a:avLst/>
+          </a:prstGeom>
+        </p:spPr>
+        <p:style>
+          <a:lnRef idx="2">
+            <a:schemeClr val="accent3">
+              <a:shade val="50000"/>
+            </a:schemeClr>
+          </a:lnRef>
+          <a:fillRef idx="1">
+            <a:schemeClr val="accent3"/>
+          </a:fillRef>
+          <a:effectRef idx="0">
+            <a:schemeClr val="accent3"/>
+          </a:effectRef>
+          <a:fontRef idx="minor">
+            <a:schemeClr val="lt1"/>
+          </a:fontRef>
+        </p:style>
+        <p:txBody>
+          <a:bodyPr rtlCol="0" anchor="ctr"/>
+          <a:lstStyle/>
+          <a:p>
+            <a:pPr algn="ctr"/>
+            <a:r>
+              <a:rPr lang="en-GB" dirty="0"/>
+              <a:t>List of all the available awards.</a:t>
+            </a:r>
+          </a:p>
+          <a:p>
+            <a:pPr algn="ctr"/>
+            <a:endParaRPr lang="en-GB" dirty="0"/>
+          </a:p>
+          <a:p>
+            <a:pPr algn="ctr"/>
+            <a:endParaRPr lang="en-GB" dirty="0"/>
+          </a:p>
+          <a:p>
+            <a:pPr algn="ctr"/>
+            <a:endParaRPr lang="en-GB" dirty="0"/>
+          </a:p>
+          <a:p>
+            <a:pPr algn="ctr"/>
+            <a:endParaRPr lang="en-GB" dirty="0"/>
+          </a:p>
+          <a:p>
+            <a:pPr algn="ctr"/>
+            <a:endParaRPr lang="en-GB" dirty="0"/>
+          </a:p>
+          <a:p>
+            <a:pPr algn="ctr"/>
+            <a:endParaRPr lang="en-GB" dirty="0"/>
+          </a:p>
+          <a:p>
+            <a:pPr algn="ctr"/>
+            <a:endParaRPr lang="en-GB" dirty="0"/>
+          </a:p>
+          <a:p>
+            <a:pPr algn="ctr"/>
+            <a:endParaRPr lang="en-GB" dirty="0"/>
+          </a:p>
+        </p:txBody>
+      </p:sp>
+      <p:sp>
+        <p:nvSpPr>
+          <p:cNvPr id="8" name="Rectangle 7">
+            <a:extLst>
+              <a:ext uri="{FF2B5EF4-FFF2-40B4-BE49-F238E27FC236}">
+                <a16:creationId xmlns:a16="http://schemas.microsoft.com/office/drawing/2014/main" id="{4CF69489-887D-5A44-BA91-CFA0B5CC1C79}"/>
+              </a:ext>
+            </a:extLst>
+          </p:cNvPr>
+          <p:cNvSpPr/>
+          <p:nvPr/>
+        </p:nvSpPr>
+        <p:spPr>
+          <a:xfrm>
+            <a:off x="6492660" y="3356975"/>
+            <a:ext cx="4208745" cy="3135900"/>
+          </a:xfrm>
+          <a:prstGeom prst="rect">
+            <a:avLst/>
+          </a:prstGeom>
+        </p:spPr>
+        <p:style>
+          <a:lnRef idx="2">
+            <a:schemeClr val="accent3">
+              <a:shade val="50000"/>
+            </a:schemeClr>
+          </a:lnRef>
+          <a:fillRef idx="1">
+            <a:schemeClr val="accent3"/>
+          </a:fillRef>
+          <a:effectRef idx="0">
+            <a:schemeClr val="accent3"/>
+          </a:effectRef>
+          <a:fontRef idx="minor">
+            <a:schemeClr val="lt1"/>
+          </a:fontRef>
+        </p:style>
+        <p:txBody>
+          <a:bodyPr rtlCol="0" anchor="ctr"/>
+          <a:lstStyle/>
+          <a:p>
+            <a:pPr algn="ctr"/>
+            <a:r>
+              <a:rPr lang="en-GB" dirty="0"/>
+              <a:t>Leader board/ High score area</a:t>
+            </a:r>
+          </a:p>
+          <a:p>
+            <a:pPr algn="ctr"/>
+            <a:endParaRPr lang="en-GB" dirty="0"/>
+          </a:p>
+          <a:p>
+            <a:pPr algn="ctr"/>
+            <a:endParaRPr lang="en-GB" dirty="0"/>
+          </a:p>
+          <a:p>
+            <a:pPr algn="ctr"/>
+            <a:endParaRPr lang="en-GB" dirty="0"/>
+          </a:p>
+          <a:p>
+            <a:pPr algn="ctr"/>
+            <a:endParaRPr lang="en-GB" dirty="0"/>
+          </a:p>
+          <a:p>
+            <a:pPr algn="ctr"/>
+            <a:endParaRPr lang="en-GB" dirty="0"/>
+          </a:p>
+          <a:p>
+            <a:pPr algn="ctr"/>
+            <a:endParaRPr lang="en-GB" dirty="0"/>
+          </a:p>
+          <a:p>
+            <a:pPr algn="ctr"/>
+            <a:endParaRPr lang="en-GB" dirty="0"/>
+          </a:p>
+        </p:txBody>
+      </p:sp>
+      <p:sp>
+        <p:nvSpPr>
+          <p:cNvPr id="9" name="Rectangle 8">
+            <a:extLst>
+              <a:ext uri="{FF2B5EF4-FFF2-40B4-BE49-F238E27FC236}">
+                <a16:creationId xmlns:a16="http://schemas.microsoft.com/office/drawing/2014/main" id="{F6190546-2D56-AD4D-84D4-7911CF46105A}"/>
+              </a:ext>
+            </a:extLst>
+          </p:cNvPr>
+          <p:cNvSpPr/>
+          <p:nvPr/>
+        </p:nvSpPr>
+        <p:spPr>
+          <a:xfrm>
+            <a:off x="4595631" y="3995600"/>
+            <a:ext cx="2588821" cy="1691014"/>
+          </a:xfrm>
+          <a:prstGeom prst="rect">
+            <a:avLst/>
+          </a:prstGeom>
+        </p:spPr>
+        <p:style>
+          <a:lnRef idx="2">
+            <a:schemeClr val="accent4">
+              <a:shade val="50000"/>
+            </a:schemeClr>
+          </a:lnRef>
+          <a:fillRef idx="1">
+            <a:schemeClr val="accent4"/>
+          </a:fillRef>
+          <a:effectRef idx="0">
+            <a:schemeClr val="accent4"/>
+          </a:effectRef>
+          <a:fontRef idx="minor">
+            <a:schemeClr val="lt1"/>
+          </a:fontRef>
+        </p:style>
+        <p:txBody>
+          <a:bodyPr rtlCol="0" anchor="ctr"/>
+          <a:lstStyle/>
+          <a:p>
+            <a:pPr algn="ctr"/>
+            <a:r>
+              <a:rPr lang="en-GB" dirty="0"/>
+              <a:t>*Pop-up window*</a:t>
+            </a:r>
+          </a:p>
+          <a:p>
+            <a:pPr algn="ctr"/>
+            <a:r>
+              <a:rPr lang="en-GB" dirty="0"/>
+              <a:t>Explanation of how to get them/ a snippet of the award if won</a:t>
+            </a:r>
+          </a:p>
+        </p:txBody>
+      </p:sp>
+    </p:spTree>
+    <p:extLst>
+      <p:ext uri="{BB962C8B-B14F-4D97-AF65-F5344CB8AC3E}">
+        <p14:creationId xmlns:p14="http://schemas.microsoft.com/office/powerpoint/2010/main" val="1559509527"/>
+      </p:ext>
+    </p:extLst>
+  </p:cSld>
+  <p:clrMapOvr>
+    <a:masterClrMapping/>
+  </p:clrMapOvr>
+</p:sld>
+</file>
+
+<file path=ppt/slides/slide12.xml><?xml version="1.0" encoding="utf-8"?>
+<p:sld xmlns:a="http://schemas.openxmlformats.org/drawingml/2006/main" xmlns:r="http://schemas.openxmlformats.org/officeDocument/2006/relationships" xmlns:p="http://schemas.openxmlformats.org/presentationml/2006/main">
+  <p:cSld>
+    <p:spTree>
+      <p:nvGrpSpPr>
+        <p:cNvPr id="1" name=""/>
+        <p:cNvGrpSpPr/>
+        <p:nvPr/>
+      </p:nvGrpSpPr>
+      <p:grpSpPr>
+        <a:xfrm>
+          <a:off x="0" y="0"/>
+          <a:ext cx="0" cy="0"/>
+          <a:chOff x="0" y="0"/>
+          <a:chExt cx="0" cy="0"/>
+        </a:xfrm>
+      </p:grpSpPr>
+      <p:sp>
+        <p:nvSpPr>
+          <p:cNvPr id="2" name="Title 1">
+            <a:extLst>
+              <a:ext uri="{FF2B5EF4-FFF2-40B4-BE49-F238E27FC236}">
                 <a16:creationId xmlns:a16="http://schemas.microsoft.com/office/drawing/2014/main" id="{1F28CD39-B901-0649-9CC0-AC3A85A22AA8}"/>
               </a:ext>
             </a:extLst>
@@ -4363,7 +5091,9 @@
             <a:avLst/>
           </a:prstGeom>
           <a:solidFill>
-            <a:srgbClr val="0C4EC2"/>
+            <a:schemeClr val="accent1">
+              <a:lumMod val="75000"/>
+            </a:schemeClr>
           </a:solidFill>
         </p:spPr>
         <p:style>
@@ -5880,9 +6610,7 @@
             <a:avLst/>
           </a:prstGeom>
           <a:solidFill>
-            <a:schemeClr val="accent1">
-              <a:lumMod val="75000"/>
-            </a:schemeClr>
+            <a:srgbClr val="2F5597"/>
           </a:solidFill>
         </p:spPr>
         <p:style>
@@ -5943,6 +6671,9 @@
           <a:prstGeom prst="rect">
             <a:avLst/>
           </a:prstGeom>
+          <a:solidFill>
+            <a:srgbClr val="A5A5A5"/>
+          </a:solidFill>
         </p:spPr>
         <p:style>
           <a:lnRef idx="2">
@@ -6362,6 +7093,554 @@
 </file>
 
 <file path=ppt/slides/slide7.xml><?xml version="1.0" encoding="utf-8"?>
+<p:sld xmlns:a="http://schemas.openxmlformats.org/drawingml/2006/main" xmlns:r="http://schemas.openxmlformats.org/officeDocument/2006/relationships" xmlns:p="http://schemas.openxmlformats.org/presentationml/2006/main">
+  <p:cSld>
+    <p:spTree>
+      <p:nvGrpSpPr>
+        <p:cNvPr id="1" name=""/>
+        <p:cNvGrpSpPr/>
+        <p:nvPr/>
+      </p:nvGrpSpPr>
+      <p:grpSpPr>
+        <a:xfrm>
+          <a:off x="0" y="0"/>
+          <a:ext cx="0" cy="0"/>
+          <a:chOff x="0" y="0"/>
+          <a:chExt cx="0" cy="0"/>
+        </a:xfrm>
+      </p:grpSpPr>
+      <p:sp>
+        <p:nvSpPr>
+          <p:cNvPr id="2" name="Title 1">
+            <a:extLst>
+              <a:ext uri="{FF2B5EF4-FFF2-40B4-BE49-F238E27FC236}">
+                <a16:creationId xmlns:a16="http://schemas.microsoft.com/office/drawing/2014/main" id="{A3FDB8DA-7CB7-F441-A79C-0F19916E2479}"/>
+              </a:ext>
+            </a:extLst>
+          </p:cNvPr>
+          <p:cNvSpPr>
+            <a:spLocks noGrp="1"/>
+          </p:cNvSpPr>
+          <p:nvPr>
+            <p:ph type="title"/>
+          </p:nvPr>
+        </p:nvSpPr>
+        <p:spPr/>
+        <p:txBody>
+          <a:bodyPr/>
+          <a:lstStyle/>
+          <a:p>
+            <a:r>
+              <a:rPr lang="en-US" dirty="0"/>
+              <a:t>Game Screen</a:t>
+            </a:r>
+          </a:p>
+        </p:txBody>
+      </p:sp>
+      <p:sp>
+        <p:nvSpPr>
+          <p:cNvPr id="4" name="Rectangle 3">
+            <a:extLst>
+              <a:ext uri="{FF2B5EF4-FFF2-40B4-BE49-F238E27FC236}">
+                <a16:creationId xmlns:a16="http://schemas.microsoft.com/office/drawing/2014/main" id="{31CA961E-1293-A34C-B1E7-95744AF0B446}"/>
+              </a:ext>
+            </a:extLst>
+          </p:cNvPr>
+          <p:cNvSpPr/>
+          <p:nvPr/>
+        </p:nvSpPr>
+        <p:spPr>
+          <a:xfrm>
+            <a:off x="1233054" y="1690688"/>
+            <a:ext cx="9725891" cy="4833258"/>
+          </a:xfrm>
+          <a:prstGeom prst="rect">
+            <a:avLst/>
+          </a:prstGeom>
+          <a:solidFill>
+            <a:srgbClr val="2F5597"/>
+          </a:solidFill>
+        </p:spPr>
+        <p:style>
+          <a:lnRef idx="2">
+            <a:schemeClr val="accent1">
+              <a:shade val="50000"/>
+            </a:schemeClr>
+          </a:lnRef>
+          <a:fillRef idx="1">
+            <a:schemeClr val="accent1"/>
+          </a:fillRef>
+          <a:effectRef idx="0">
+            <a:schemeClr val="accent1"/>
+          </a:effectRef>
+          <a:fontRef idx="minor">
+            <a:schemeClr val="lt1"/>
+          </a:fontRef>
+        </p:style>
+        <p:txBody>
+          <a:bodyPr rtlCol="0" anchor="ctr"/>
+          <a:lstStyle/>
+          <a:p>
+            <a:pPr algn="ctr"/>
+            <a:endParaRPr lang="en-GB" b="1">
+              <a:ln w="22225">
+                <a:solidFill>
+                  <a:schemeClr val="accent2"/>
+                </a:solidFill>
+                <a:prstDash val="solid"/>
+              </a:ln>
+              <a:solidFill>
+                <a:schemeClr val="accent2">
+                  <a:lumMod val="40000"/>
+                  <a:lumOff val="60000"/>
+                </a:schemeClr>
+              </a:solidFill>
+            </a:endParaRPr>
+          </a:p>
+        </p:txBody>
+      </p:sp>
+      <p:sp>
+        <p:nvSpPr>
+          <p:cNvPr id="3" name="Rectangle 2">
+            <a:extLst>
+              <a:ext uri="{FF2B5EF4-FFF2-40B4-BE49-F238E27FC236}">
+                <a16:creationId xmlns:a16="http://schemas.microsoft.com/office/drawing/2014/main" id="{3E4BDA3D-0EA3-A742-89D8-E93A6FEED745}"/>
+              </a:ext>
+            </a:extLst>
+          </p:cNvPr>
+          <p:cNvSpPr/>
+          <p:nvPr/>
+        </p:nvSpPr>
+        <p:spPr>
+          <a:xfrm>
+            <a:off x="1318161" y="1775361"/>
+            <a:ext cx="9547761" cy="801584"/>
+          </a:xfrm>
+          <a:prstGeom prst="rect">
+            <a:avLst/>
+          </a:prstGeom>
+          <a:solidFill>
+            <a:srgbClr val="A5A5A5"/>
+          </a:solidFill>
+        </p:spPr>
+        <p:style>
+          <a:lnRef idx="2">
+            <a:schemeClr val="accent3">
+              <a:shade val="50000"/>
+            </a:schemeClr>
+          </a:lnRef>
+          <a:fillRef idx="1">
+            <a:schemeClr val="accent3"/>
+          </a:fillRef>
+          <a:effectRef idx="0">
+            <a:schemeClr val="accent3"/>
+          </a:effectRef>
+          <a:fontRef idx="minor">
+            <a:schemeClr val="lt1"/>
+          </a:fontRef>
+        </p:style>
+        <p:txBody>
+          <a:bodyPr rtlCol="0" anchor="ctr"/>
+          <a:lstStyle/>
+          <a:p>
+            <a:pPr algn="ctr"/>
+            <a:endParaRPr lang="en-GB"/>
+          </a:p>
+        </p:txBody>
+      </p:sp>
+      <p:sp>
+        <p:nvSpPr>
+          <p:cNvPr id="5" name="Rectangle 4">
+            <a:extLst>
+              <a:ext uri="{FF2B5EF4-FFF2-40B4-BE49-F238E27FC236}">
+                <a16:creationId xmlns:a16="http://schemas.microsoft.com/office/drawing/2014/main" id="{FC59767B-29C7-D84F-8909-8296DAE67931}"/>
+              </a:ext>
+            </a:extLst>
+          </p:cNvPr>
+          <p:cNvSpPr/>
+          <p:nvPr/>
+        </p:nvSpPr>
+        <p:spPr>
+          <a:xfrm>
+            <a:off x="5007901" y="1643762"/>
+            <a:ext cx="1992270" cy="923330"/>
+          </a:xfrm>
+          <a:prstGeom prst="rect">
+            <a:avLst/>
+          </a:prstGeom>
+          <a:noFill/>
+        </p:spPr>
+        <p:txBody>
+          <a:bodyPr wrap="square" lIns="91440" tIns="45720" rIns="91440" bIns="45720">
+            <a:spAutoFit/>
+          </a:bodyPr>
+          <a:lstStyle/>
+          <a:p>
+            <a:pPr algn="ctr"/>
+            <a:r>
+              <a:rPr lang="en-GB" sz="5400" b="1" dirty="0">
+                <a:ln w="12700" cmpd="sng">
+                  <a:solidFill>
+                    <a:srgbClr val="C4623E"/>
+                  </a:solidFill>
+                  <a:prstDash val="solid"/>
+                </a:ln>
+                <a:solidFill>
+                  <a:srgbClr val="C3C02C"/>
+                </a:solidFill>
+              </a:rPr>
+              <a:t>K-</a:t>
+            </a:r>
+          </a:p>
+        </p:txBody>
+      </p:sp>
+      <p:sp>
+        <p:nvSpPr>
+          <p:cNvPr id="6" name="Rectangle 5">
+            <a:extLst>
+              <a:ext uri="{FF2B5EF4-FFF2-40B4-BE49-F238E27FC236}">
+                <a16:creationId xmlns:a16="http://schemas.microsoft.com/office/drawing/2014/main" id="{43F74CAD-D9B8-9647-87FD-0765A2B43177}"/>
+              </a:ext>
+            </a:extLst>
+          </p:cNvPr>
+          <p:cNvSpPr/>
+          <p:nvPr/>
+        </p:nvSpPr>
+        <p:spPr>
+          <a:xfrm>
+            <a:off x="6150968" y="1653615"/>
+            <a:ext cx="2353529" cy="923330"/>
+          </a:xfrm>
+          <a:prstGeom prst="rect">
+            <a:avLst/>
+          </a:prstGeom>
+          <a:noFill/>
+        </p:spPr>
+        <p:txBody>
+          <a:bodyPr wrap="none" lIns="91440" tIns="45720" rIns="91440" bIns="45720">
+            <a:spAutoFit/>
+          </a:bodyPr>
+          <a:lstStyle/>
+          <a:p>
+            <a:pPr algn="ctr"/>
+            <a:r>
+              <a:rPr lang="en-GB" sz="5400" b="1" cap="none" spc="0" dirty="0">
+                <a:ln w="12700" cmpd="sng">
+                  <a:solidFill>
+                    <a:srgbClr val="6214C4"/>
+                  </a:solidFill>
+                  <a:prstDash val="solid"/>
+                </a:ln>
+                <a:solidFill>
+                  <a:srgbClr val="03C1A1"/>
+                </a:solidFill>
+                <a:effectLst/>
+              </a:rPr>
+              <a:t>Means!</a:t>
+            </a:r>
+          </a:p>
+        </p:txBody>
+      </p:sp>
+      <p:pic>
+        <p:nvPicPr>
+          <p:cNvPr id="8" name="Picture 7" descr="A screenshot of a cell phone&#10;&#10;Description automatically generated">
+            <a:extLst>
+              <a:ext uri="{FF2B5EF4-FFF2-40B4-BE49-F238E27FC236}">
+                <a16:creationId xmlns:a16="http://schemas.microsoft.com/office/drawing/2014/main" id="{D23C3B8A-E956-8745-BBC9-5A104EAB1BE5}"/>
+              </a:ext>
+            </a:extLst>
+          </p:cNvPr>
+          <p:cNvPicPr>
+            <a:picLocks noChangeAspect="1"/>
+          </p:cNvPicPr>
+          <p:nvPr/>
+        </p:nvPicPr>
+        <p:blipFill>
+          <a:blip r:embed="rId3"/>
+          <a:stretch>
+            <a:fillRect/>
+          </a:stretch>
+        </p:blipFill>
+        <p:spPr>
+          <a:xfrm>
+            <a:off x="1318161" y="2709595"/>
+            <a:ext cx="4370626" cy="2586800"/>
+          </a:xfrm>
+          <a:prstGeom prst="rect">
+            <a:avLst/>
+          </a:prstGeom>
+        </p:spPr>
+      </p:pic>
+      <p:sp>
+        <p:nvSpPr>
+          <p:cNvPr id="9" name="Rectangle 8">
+            <a:extLst>
+              <a:ext uri="{FF2B5EF4-FFF2-40B4-BE49-F238E27FC236}">
+                <a16:creationId xmlns:a16="http://schemas.microsoft.com/office/drawing/2014/main" id="{D85EFC7B-B6BF-CC4D-A607-D3D7344DFDCD}"/>
+              </a:ext>
+            </a:extLst>
+          </p:cNvPr>
+          <p:cNvSpPr/>
+          <p:nvPr/>
+        </p:nvSpPr>
+        <p:spPr>
+          <a:xfrm>
+            <a:off x="5830784" y="2709595"/>
+            <a:ext cx="5035138" cy="1203817"/>
+          </a:xfrm>
+          <a:prstGeom prst="rect">
+            <a:avLst/>
+          </a:prstGeom>
+          <a:solidFill>
+            <a:srgbClr val="C3C02C"/>
+          </a:solidFill>
+        </p:spPr>
+        <p:style>
+          <a:lnRef idx="2">
+            <a:schemeClr val="accent4">
+              <a:shade val="50000"/>
+            </a:schemeClr>
+          </a:lnRef>
+          <a:fillRef idx="1">
+            <a:schemeClr val="accent4"/>
+          </a:fillRef>
+          <a:effectRef idx="0">
+            <a:schemeClr val="accent4"/>
+          </a:effectRef>
+          <a:fontRef idx="minor">
+            <a:schemeClr val="lt1"/>
+          </a:fontRef>
+        </p:style>
+        <p:txBody>
+          <a:bodyPr rtlCol="0" anchor="ctr"/>
+          <a:lstStyle/>
+          <a:p>
+            <a:r>
+              <a:rPr lang="en-GB" dirty="0"/>
+              <a:t>Aim:</a:t>
+            </a:r>
+          </a:p>
+          <a:p>
+            <a:r>
+              <a:rPr lang="en-GB" dirty="0"/>
+              <a:t>You must complete the challenge – description here!</a:t>
+            </a:r>
+          </a:p>
+        </p:txBody>
+      </p:sp>
+      <p:sp>
+        <p:nvSpPr>
+          <p:cNvPr id="10" name="Rectangle 9">
+            <a:extLst>
+              <a:ext uri="{FF2B5EF4-FFF2-40B4-BE49-F238E27FC236}">
+                <a16:creationId xmlns:a16="http://schemas.microsoft.com/office/drawing/2014/main" id="{27D3B4CD-C78C-4540-A314-9ABCA26AED39}"/>
+              </a:ext>
+            </a:extLst>
+          </p:cNvPr>
+          <p:cNvSpPr/>
+          <p:nvPr/>
+        </p:nvSpPr>
+        <p:spPr>
+          <a:xfrm>
+            <a:off x="1318161" y="5795158"/>
+            <a:ext cx="4370626" cy="647206"/>
+          </a:xfrm>
+          <a:prstGeom prst="rect">
+            <a:avLst/>
+          </a:prstGeom>
+          <a:solidFill>
+            <a:srgbClr val="07C2A1"/>
+          </a:solidFill>
+        </p:spPr>
+        <p:style>
+          <a:lnRef idx="2">
+            <a:schemeClr val="accent1">
+              <a:shade val="50000"/>
+            </a:schemeClr>
+          </a:lnRef>
+          <a:fillRef idx="1">
+            <a:schemeClr val="accent1"/>
+          </a:fillRef>
+          <a:effectRef idx="0">
+            <a:schemeClr val="accent1"/>
+          </a:effectRef>
+          <a:fontRef idx="minor">
+            <a:schemeClr val="lt1"/>
+          </a:fontRef>
+        </p:style>
+        <p:txBody>
+          <a:bodyPr rtlCol="0" anchor="ctr"/>
+          <a:lstStyle/>
+          <a:p>
+            <a:r>
+              <a:rPr lang="en-GB" dirty="0"/>
+              <a:t>Tip:</a:t>
+            </a:r>
+          </a:p>
+          <a:p>
+            <a:r>
+              <a:rPr lang="en-GB" dirty="0"/>
+              <a:t>Tip of how the algorithm works.</a:t>
+            </a:r>
+          </a:p>
+        </p:txBody>
+      </p:sp>
+      <p:sp>
+        <p:nvSpPr>
+          <p:cNvPr id="11" name="Rectangle 10">
+            <a:extLst>
+              <a:ext uri="{FF2B5EF4-FFF2-40B4-BE49-F238E27FC236}">
+                <a16:creationId xmlns:a16="http://schemas.microsoft.com/office/drawing/2014/main" id="{A599C392-E5C4-8F4E-B9B2-F4EDFCB3FDFE}"/>
+              </a:ext>
+            </a:extLst>
+          </p:cNvPr>
+          <p:cNvSpPr/>
+          <p:nvPr/>
+        </p:nvSpPr>
+        <p:spPr>
+          <a:xfrm>
+            <a:off x="1318161" y="5333468"/>
+            <a:ext cx="4370626" cy="319187"/>
+          </a:xfrm>
+          <a:prstGeom prst="rect">
+            <a:avLst/>
+          </a:prstGeom>
+          <a:solidFill>
+            <a:srgbClr val="C00000"/>
+          </a:solidFill>
+        </p:spPr>
+        <p:style>
+          <a:lnRef idx="2">
+            <a:schemeClr val="accent1">
+              <a:shade val="50000"/>
+            </a:schemeClr>
+          </a:lnRef>
+          <a:fillRef idx="1">
+            <a:schemeClr val="accent1"/>
+          </a:fillRef>
+          <a:effectRef idx="0">
+            <a:schemeClr val="accent1"/>
+          </a:effectRef>
+          <a:fontRef idx="minor">
+            <a:schemeClr val="lt1"/>
+          </a:fontRef>
+        </p:style>
+        <p:txBody>
+          <a:bodyPr rtlCol="0" anchor="ctr"/>
+          <a:lstStyle/>
+          <a:p>
+            <a:pPr algn="ctr"/>
+            <a:r>
+              <a:rPr lang="en-GB" dirty="0"/>
+              <a:t>Player % Turn!</a:t>
+            </a:r>
+          </a:p>
+        </p:txBody>
+      </p:sp>
+      <p:sp>
+        <p:nvSpPr>
+          <p:cNvPr id="12" name="Rectangle 11">
+            <a:extLst>
+              <a:ext uri="{FF2B5EF4-FFF2-40B4-BE49-F238E27FC236}">
+                <a16:creationId xmlns:a16="http://schemas.microsoft.com/office/drawing/2014/main" id="{9E4C4BF7-0226-EC48-B0BE-3E7B762E2547}"/>
+              </a:ext>
+            </a:extLst>
+          </p:cNvPr>
+          <p:cNvSpPr/>
+          <p:nvPr/>
+        </p:nvSpPr>
+        <p:spPr>
+          <a:xfrm>
+            <a:off x="5830784" y="4001984"/>
+            <a:ext cx="5035138" cy="2048494"/>
+          </a:xfrm>
+          <a:prstGeom prst="rect">
+            <a:avLst/>
+          </a:prstGeom>
+        </p:spPr>
+        <p:style>
+          <a:lnRef idx="2">
+            <a:schemeClr val="accent3">
+              <a:shade val="50000"/>
+            </a:schemeClr>
+          </a:lnRef>
+          <a:fillRef idx="1">
+            <a:schemeClr val="accent3"/>
+          </a:fillRef>
+          <a:effectRef idx="0">
+            <a:schemeClr val="accent3"/>
+          </a:effectRef>
+          <a:fontRef idx="minor">
+            <a:schemeClr val="lt1"/>
+          </a:fontRef>
+        </p:style>
+        <p:txBody>
+          <a:bodyPr rtlCol="0" anchor="ctr"/>
+          <a:lstStyle/>
+          <a:p>
+            <a:r>
+              <a:rPr lang="en-GB" dirty="0"/>
+              <a:t>Score: P1 – 200 | P2 – 300</a:t>
+            </a:r>
+          </a:p>
+          <a:p>
+            <a:endParaRPr lang="en-GB" dirty="0"/>
+          </a:p>
+          <a:p>
+            <a:r>
+              <a:rPr lang="en-GB" dirty="0"/>
+              <a:t>Current Moves:</a:t>
+            </a:r>
+          </a:p>
+          <a:p>
+            <a:r>
+              <a:rPr lang="en-GB" dirty="0"/>
+              <a:t>P1:			P2:</a:t>
+            </a:r>
+          </a:p>
+          <a:p>
+            <a:pPr marL="342900" indent="-342900">
+              <a:buAutoNum type="arabicPeriod"/>
+            </a:pPr>
+            <a:r>
+              <a:rPr lang="en-GB" dirty="0"/>
+              <a:t>X, y			1. X, y</a:t>
+            </a:r>
+          </a:p>
+          <a:p>
+            <a:pPr marL="342900" indent="-342900">
+              <a:buAutoNum type="arabicPeriod"/>
+            </a:pPr>
+            <a:r>
+              <a:rPr lang="en-GB" dirty="0"/>
+              <a:t>X, y			2. X, y</a:t>
+            </a:r>
+          </a:p>
+          <a:p>
+            <a:pPr marL="342900" indent="-342900">
+              <a:buAutoNum type="arabicPeriod"/>
+            </a:pPr>
+            <a:r>
+              <a:rPr lang="en-GB" dirty="0"/>
+              <a:t>X, y			3. X, y</a:t>
+            </a:r>
+          </a:p>
+        </p:txBody>
+      </p:sp>
+    </p:spTree>
+    <p:extLst>
+      <p:ext uri="{BB962C8B-B14F-4D97-AF65-F5344CB8AC3E}">
+        <p14:creationId xmlns:p14="http://schemas.microsoft.com/office/powerpoint/2010/main" val="3114707091"/>
+      </p:ext>
+    </p:extLst>
+  </p:cSld>
+  <p:clrMapOvr>
+    <a:masterClrMapping/>
+  </p:clrMapOvr>
+</p:sld>
+</file>
+
+<file path=ppt/slides/slide8.xml><?xml version="1.0" encoding="utf-8"?>
 <p:sld xmlns:a="http://schemas.openxmlformats.org/drawingml/2006/main" xmlns:r="http://schemas.openxmlformats.org/officeDocument/2006/relationships" xmlns:p="http://schemas.openxmlformats.org/presentationml/2006/main">
   <p:cSld>
     <p:spTree>
@@ -6447,7 +7726,9 @@
               <a:avLst/>
             </a:prstGeom>
             <a:solidFill>
-              <a:srgbClr val="0C4EC2"/>
+              <a:schemeClr val="accent1">
+                <a:lumMod val="75000"/>
+              </a:schemeClr>
             </a:solidFill>
           </p:spPr>
           <p:style>
@@ -6856,7 +8137,7 @@
 </p:sld>
 </file>
 
-<file path=ppt/slides/slide8.xml><?xml version="1.0" encoding="utf-8"?>
+<file path=ppt/slides/slide9.xml><?xml version="1.0" encoding="utf-8"?>
 <p:sld xmlns:a="http://schemas.openxmlformats.org/drawingml/2006/main" xmlns:r="http://schemas.openxmlformats.org/officeDocument/2006/relationships" xmlns:p="http://schemas.openxmlformats.org/presentationml/2006/main">
   <p:cSld>
     <p:spTree>
@@ -6922,7 +8203,9 @@
             <a:avLst/>
           </a:prstGeom>
           <a:solidFill>
-            <a:srgbClr val="0C4EC2"/>
+            <a:schemeClr val="accent1">
+              <a:lumMod val="75000"/>
+            </a:schemeClr>
           </a:solidFill>
         </p:spPr>
         <p:style>
@@ -7465,644 +8748,6 @@
     <p:extLst>
       <p:ext uri="{BB962C8B-B14F-4D97-AF65-F5344CB8AC3E}">
         <p14:creationId xmlns:p14="http://schemas.microsoft.com/office/powerpoint/2010/main" val="4273153526"/>
-      </p:ext>
-    </p:extLst>
-  </p:cSld>
-  <p:clrMapOvr>
-    <a:masterClrMapping/>
-  </p:clrMapOvr>
-</p:sld>
-</file>
-
-<file path=ppt/slides/slide9.xml><?xml version="1.0" encoding="utf-8"?>
-<p:sld xmlns:a="http://schemas.openxmlformats.org/drawingml/2006/main" xmlns:r="http://schemas.openxmlformats.org/officeDocument/2006/relationships" xmlns:p="http://schemas.openxmlformats.org/presentationml/2006/main">
-  <p:cSld>
-    <p:spTree>
-      <p:nvGrpSpPr>
-        <p:cNvPr id="1" name=""/>
-        <p:cNvGrpSpPr/>
-        <p:nvPr/>
-      </p:nvGrpSpPr>
-      <p:grpSpPr>
-        <a:xfrm>
-          <a:off x="0" y="0"/>
-          <a:ext cx="0" cy="0"/>
-          <a:chOff x="0" y="0"/>
-          <a:chExt cx="0" cy="0"/>
-        </a:xfrm>
-      </p:grpSpPr>
-      <p:sp>
-        <p:nvSpPr>
-          <p:cNvPr id="2" name="Title 1">
-            <a:extLst>
-              <a:ext uri="{FF2B5EF4-FFF2-40B4-BE49-F238E27FC236}">
-                <a16:creationId xmlns:a16="http://schemas.microsoft.com/office/drawing/2014/main" id="{D990EE0B-FF66-4341-A99A-29C5674D01B1}"/>
-              </a:ext>
-            </a:extLst>
-          </p:cNvPr>
-          <p:cNvSpPr>
-            <a:spLocks noGrp="1"/>
-          </p:cNvSpPr>
-          <p:nvPr>
-            <p:ph type="title"/>
-          </p:nvPr>
-        </p:nvSpPr>
-        <p:spPr/>
-        <p:txBody>
-          <a:bodyPr/>
-          <a:lstStyle/>
-          <a:p>
-            <a:r>
-              <a:rPr lang="en-US" dirty="0"/>
-              <a:t>Free Play Area</a:t>
-            </a:r>
-          </a:p>
-        </p:txBody>
-      </p:sp>
-      <p:sp>
-        <p:nvSpPr>
-          <p:cNvPr id="4" name="Rectangle 3">
-            <a:extLst>
-              <a:ext uri="{FF2B5EF4-FFF2-40B4-BE49-F238E27FC236}">
-                <a16:creationId xmlns:a16="http://schemas.microsoft.com/office/drawing/2014/main" id="{AE699655-BFBD-6B4A-B89D-E5AB7E2DBB4B}"/>
-              </a:ext>
-            </a:extLst>
-          </p:cNvPr>
-          <p:cNvSpPr/>
-          <p:nvPr/>
-        </p:nvSpPr>
-        <p:spPr>
-          <a:xfrm>
-            <a:off x="1233054" y="1690688"/>
-            <a:ext cx="9725891" cy="4833258"/>
-          </a:xfrm>
-          <a:prstGeom prst="rect">
-            <a:avLst/>
-          </a:prstGeom>
-          <a:solidFill>
-            <a:srgbClr val="0C4EC2"/>
-          </a:solidFill>
-        </p:spPr>
-        <p:style>
-          <a:lnRef idx="2">
-            <a:schemeClr val="accent1">
-              <a:shade val="50000"/>
-            </a:schemeClr>
-          </a:lnRef>
-          <a:fillRef idx="1">
-            <a:schemeClr val="accent1"/>
-          </a:fillRef>
-          <a:effectRef idx="0">
-            <a:schemeClr val="accent1"/>
-          </a:effectRef>
-          <a:fontRef idx="minor">
-            <a:schemeClr val="lt1"/>
-          </a:fontRef>
-        </p:style>
-        <p:txBody>
-          <a:bodyPr rtlCol="0" anchor="ctr"/>
-          <a:lstStyle/>
-          <a:p>
-            <a:pPr algn="ctr"/>
-            <a:endParaRPr lang="en-GB" b="1">
-              <a:ln w="22225">
-                <a:solidFill>
-                  <a:schemeClr val="accent2"/>
-                </a:solidFill>
-                <a:prstDash val="solid"/>
-              </a:ln>
-              <a:solidFill>
-                <a:schemeClr val="accent2">
-                  <a:lumMod val="40000"/>
-                  <a:lumOff val="60000"/>
-                </a:schemeClr>
-              </a:solidFill>
-            </a:endParaRPr>
-          </a:p>
-        </p:txBody>
-      </p:sp>
-      <p:sp>
-        <p:nvSpPr>
-          <p:cNvPr id="3" name="Rectangle 2">
-            <a:extLst>
-              <a:ext uri="{FF2B5EF4-FFF2-40B4-BE49-F238E27FC236}">
-                <a16:creationId xmlns:a16="http://schemas.microsoft.com/office/drawing/2014/main" id="{A0D8486E-39F7-9642-8379-ED365262BA53}"/>
-              </a:ext>
-            </a:extLst>
-          </p:cNvPr>
-          <p:cNvSpPr/>
-          <p:nvPr/>
-        </p:nvSpPr>
-        <p:spPr>
-          <a:xfrm>
-            <a:off x="1440493" y="2091847"/>
-            <a:ext cx="4265112" cy="2386208"/>
-          </a:xfrm>
-          <a:prstGeom prst="rect">
-            <a:avLst/>
-          </a:prstGeom>
-          <a:solidFill>
-            <a:schemeClr val="bg2">
-              <a:lumMod val="75000"/>
-            </a:schemeClr>
-          </a:solidFill>
-        </p:spPr>
-        <p:style>
-          <a:lnRef idx="2">
-            <a:schemeClr val="accent1">
-              <a:shade val="50000"/>
-            </a:schemeClr>
-          </a:lnRef>
-          <a:fillRef idx="1">
-            <a:schemeClr val="accent1"/>
-          </a:fillRef>
-          <a:effectRef idx="0">
-            <a:schemeClr val="accent1"/>
-          </a:effectRef>
-          <a:fontRef idx="minor">
-            <a:schemeClr val="lt1"/>
-          </a:fontRef>
-        </p:style>
-        <p:txBody>
-          <a:bodyPr rtlCol="0" anchor="ctr"/>
-          <a:lstStyle/>
-          <a:p>
-            <a:pPr algn="ctr"/>
-            <a:r>
-              <a:rPr lang="en-GB" dirty="0"/>
-              <a:t>Model/ Interaction Area</a:t>
-            </a:r>
-          </a:p>
-        </p:txBody>
-      </p:sp>
-      <p:sp>
-        <p:nvSpPr>
-          <p:cNvPr id="5" name="TextBox 4">
-            <a:extLst>
-              <a:ext uri="{FF2B5EF4-FFF2-40B4-BE49-F238E27FC236}">
-                <a16:creationId xmlns:a16="http://schemas.microsoft.com/office/drawing/2014/main" id="{02680A0B-7899-EA45-8783-6A222BB1B468}"/>
-              </a:ext>
-            </a:extLst>
-          </p:cNvPr>
-          <p:cNvSpPr txBox="1"/>
-          <p:nvPr/>
-        </p:nvSpPr>
-        <p:spPr>
-          <a:xfrm>
-            <a:off x="5987441" y="2116899"/>
-            <a:ext cx="4597052" cy="1477328"/>
-          </a:xfrm>
-          <a:prstGeom prst="rect">
-            <a:avLst/>
-          </a:prstGeom>
-          <a:noFill/>
-        </p:spPr>
-        <p:txBody>
-          <a:bodyPr wrap="square" rtlCol="0">
-            <a:spAutoFit/>
-          </a:bodyPr>
-          <a:lstStyle/>
-          <a:p>
-            <a:r>
-              <a:rPr lang="en-GB" dirty="0">
-                <a:solidFill>
-                  <a:schemeClr val="bg1"/>
-                </a:solidFill>
-              </a:rPr>
-              <a:t>Model: [Name] </a:t>
-            </a:r>
-          </a:p>
-          <a:p>
-            <a:endParaRPr lang="en-GB" dirty="0">
-              <a:solidFill>
-                <a:schemeClr val="bg1"/>
-              </a:solidFill>
-            </a:endParaRPr>
-          </a:p>
-          <a:p>
-            <a:r>
-              <a:rPr lang="en-GB" dirty="0">
-                <a:solidFill>
-                  <a:schemeClr val="bg1"/>
-                </a:solidFill>
-              </a:rPr>
-              <a:t>Learning Type: [Supervised/ Unsupervised]</a:t>
-            </a:r>
-          </a:p>
-          <a:p>
-            <a:endParaRPr lang="en-GB" dirty="0">
-              <a:solidFill>
-                <a:schemeClr val="bg1"/>
-              </a:solidFill>
-            </a:endParaRPr>
-          </a:p>
-          <a:p>
-            <a:r>
-              <a:rPr lang="en-GB" dirty="0">
-                <a:solidFill>
-                  <a:schemeClr val="bg1"/>
-                </a:solidFill>
-              </a:rPr>
-              <a:t>Overview: [Brief overview of the model]</a:t>
-            </a:r>
-          </a:p>
-        </p:txBody>
-      </p:sp>
-      <p:sp>
-        <p:nvSpPr>
-          <p:cNvPr id="6" name="Rectangle 5">
-            <a:extLst>
-              <a:ext uri="{FF2B5EF4-FFF2-40B4-BE49-F238E27FC236}">
-                <a16:creationId xmlns:a16="http://schemas.microsoft.com/office/drawing/2014/main" id="{C68B7AD0-0961-DA41-81F4-5646B8F71C77}"/>
-              </a:ext>
-            </a:extLst>
-          </p:cNvPr>
-          <p:cNvSpPr/>
-          <p:nvPr/>
-        </p:nvSpPr>
-        <p:spPr>
-          <a:xfrm>
-            <a:off x="1440493" y="4603315"/>
-            <a:ext cx="9388258" cy="1841326"/>
-          </a:xfrm>
-          <a:prstGeom prst="rect">
-            <a:avLst/>
-          </a:prstGeom>
-          <a:solidFill>
-            <a:schemeClr val="accent5">
-              <a:lumMod val="60000"/>
-              <a:lumOff val="40000"/>
-            </a:schemeClr>
-          </a:solidFill>
-        </p:spPr>
-        <p:style>
-          <a:lnRef idx="2">
-            <a:schemeClr val="accent1">
-              <a:shade val="50000"/>
-            </a:schemeClr>
-          </a:lnRef>
-          <a:fillRef idx="1">
-            <a:schemeClr val="accent1"/>
-          </a:fillRef>
-          <a:effectRef idx="0">
-            <a:schemeClr val="accent1"/>
-          </a:effectRef>
-          <a:fontRef idx="minor">
-            <a:schemeClr val="lt1"/>
-          </a:fontRef>
-        </p:style>
-        <p:txBody>
-          <a:bodyPr rtlCol="0" anchor="ctr"/>
-          <a:lstStyle/>
-          <a:p>
-            <a:pPr algn="ctr"/>
-            <a:endParaRPr lang="en-GB" dirty="0"/>
-          </a:p>
-        </p:txBody>
-      </p:sp>
-      <p:grpSp>
-        <p:nvGrpSpPr>
-          <p:cNvPr id="21" name="Group 20">
-            <a:extLst>
-              <a:ext uri="{FF2B5EF4-FFF2-40B4-BE49-F238E27FC236}">
-                <a16:creationId xmlns:a16="http://schemas.microsoft.com/office/drawing/2014/main" id="{90C3EB00-BCD7-CB45-85B0-F92D9E2FD51A}"/>
-              </a:ext>
-            </a:extLst>
-          </p:cNvPr>
-          <p:cNvGrpSpPr/>
-          <p:nvPr/>
-        </p:nvGrpSpPr>
-        <p:grpSpPr>
-          <a:xfrm>
-            <a:off x="10256729" y="5339951"/>
-            <a:ext cx="494778" cy="1041385"/>
-            <a:chOff x="10256729" y="4688597"/>
-            <a:chExt cx="494778" cy="1041385"/>
-          </a:xfrm>
-        </p:grpSpPr>
-        <p:grpSp>
-          <p:nvGrpSpPr>
-            <p:cNvPr id="13" name="Group 12">
-              <a:extLst>
-                <a:ext uri="{FF2B5EF4-FFF2-40B4-BE49-F238E27FC236}">
-                  <a16:creationId xmlns:a16="http://schemas.microsoft.com/office/drawing/2014/main" id="{BD9D634E-A2B0-4045-B893-EF1891625EF3}"/>
-                </a:ext>
-              </a:extLst>
-            </p:cNvPr>
-            <p:cNvGrpSpPr/>
-            <p:nvPr/>
-          </p:nvGrpSpPr>
-          <p:grpSpPr>
-            <a:xfrm>
-              <a:off x="10256729" y="5434806"/>
-              <a:ext cx="494778" cy="295176"/>
-              <a:chOff x="5122859" y="6116564"/>
-              <a:chExt cx="494778" cy="295176"/>
-            </a:xfrm>
-          </p:grpSpPr>
-          <p:sp>
-            <p:nvSpPr>
-              <p:cNvPr id="14" name="Rounded Rectangle 13">
-                <a:extLst>
-                  <a:ext uri="{FF2B5EF4-FFF2-40B4-BE49-F238E27FC236}">
-                    <a16:creationId xmlns:a16="http://schemas.microsoft.com/office/drawing/2014/main" id="{8F2E4D8C-2AF9-134E-947B-E79997CF652E}"/>
-                  </a:ext>
-                </a:extLst>
-              </p:cNvPr>
-              <p:cNvSpPr/>
-              <p:nvPr/>
-            </p:nvSpPr>
-            <p:spPr>
-              <a:xfrm>
-                <a:off x="5122859" y="6116564"/>
-                <a:ext cx="494778" cy="295176"/>
-              </a:xfrm>
-              <a:prstGeom prst="roundRect">
-                <a:avLst/>
-              </a:prstGeom>
-              <a:solidFill>
-                <a:srgbClr val="07C2A1"/>
-              </a:solidFill>
-            </p:spPr>
-            <p:style>
-              <a:lnRef idx="2">
-                <a:schemeClr val="accent1">
-                  <a:shade val="50000"/>
-                </a:schemeClr>
-              </a:lnRef>
-              <a:fillRef idx="1">
-                <a:schemeClr val="accent1"/>
-              </a:fillRef>
-              <a:effectRef idx="0">
-                <a:schemeClr val="accent1"/>
-              </a:effectRef>
-              <a:fontRef idx="minor">
-                <a:schemeClr val="lt1"/>
-              </a:fontRef>
-            </p:style>
-            <p:txBody>
-              <a:bodyPr rtlCol="0" anchor="ctr"/>
-              <a:lstStyle/>
-              <a:p>
-                <a:pPr algn="ctr"/>
-                <a:endParaRPr lang="en-GB"/>
-              </a:p>
-            </p:txBody>
-          </p:sp>
-          <p:pic>
-            <p:nvPicPr>
-              <p:cNvPr id="15" name="Graphic 14">
-                <a:extLst>
-                  <a:ext uri="{FF2B5EF4-FFF2-40B4-BE49-F238E27FC236}">
-                    <a16:creationId xmlns:a16="http://schemas.microsoft.com/office/drawing/2014/main" id="{AD931E40-A3F3-6944-8412-C4D1E131D2E0}"/>
-                  </a:ext>
-                </a:extLst>
-              </p:cNvPr>
-              <p:cNvPicPr>
-                <a:picLocks noChangeAspect="1"/>
-              </p:cNvPicPr>
-              <p:nvPr/>
-            </p:nvPicPr>
-            <p:blipFill>
-              <a:blip r:embed="rId2">
-                <a:extLst>
-                  <a:ext uri="{96DAC541-7B7A-43D3-8B79-37D633B846F1}">
-                    <asvg:svgBlip xmlns:asvg="http://schemas.microsoft.com/office/drawing/2016/SVG/main" r:embed="rId3"/>
-                  </a:ext>
-                </a:extLst>
-              </a:blip>
-              <a:stretch>
-                <a:fillRect/>
-              </a:stretch>
-            </p:blipFill>
-            <p:spPr>
-              <a:xfrm>
-                <a:off x="5238448" y="6146996"/>
-                <a:ext cx="263600" cy="234311"/>
-              </a:xfrm>
-              <a:prstGeom prst="rect">
-                <a:avLst/>
-              </a:prstGeom>
-            </p:spPr>
-          </p:pic>
-        </p:grpSp>
-        <p:grpSp>
-          <p:nvGrpSpPr>
-            <p:cNvPr id="20" name="Group 19">
-              <a:extLst>
-                <a:ext uri="{FF2B5EF4-FFF2-40B4-BE49-F238E27FC236}">
-                  <a16:creationId xmlns:a16="http://schemas.microsoft.com/office/drawing/2014/main" id="{501F6700-AEE9-924E-80B7-E39BF9151F9C}"/>
-                </a:ext>
-              </a:extLst>
-            </p:cNvPr>
-            <p:cNvGrpSpPr/>
-            <p:nvPr/>
-          </p:nvGrpSpPr>
-          <p:grpSpPr>
-            <a:xfrm>
-              <a:off x="10256729" y="4688597"/>
-              <a:ext cx="494778" cy="295176"/>
-              <a:chOff x="10256729" y="4688597"/>
-              <a:chExt cx="494778" cy="295176"/>
-            </a:xfrm>
-          </p:grpSpPr>
-          <p:sp>
-            <p:nvSpPr>
-              <p:cNvPr id="8" name="Rounded Rectangle 7">
-                <a:extLst>
-                  <a:ext uri="{FF2B5EF4-FFF2-40B4-BE49-F238E27FC236}">
-                    <a16:creationId xmlns:a16="http://schemas.microsoft.com/office/drawing/2014/main" id="{F7EC5FCA-F743-374C-BC2E-F249C222A328}"/>
-                  </a:ext>
-                </a:extLst>
-              </p:cNvPr>
-              <p:cNvSpPr/>
-              <p:nvPr/>
-            </p:nvSpPr>
-            <p:spPr>
-              <a:xfrm>
-                <a:off x="10256729" y="4688597"/>
-                <a:ext cx="494778" cy="295176"/>
-              </a:xfrm>
-              <a:prstGeom prst="roundRect">
-                <a:avLst/>
-              </a:prstGeom>
-              <a:solidFill>
-                <a:srgbClr val="07C2A1"/>
-              </a:solidFill>
-            </p:spPr>
-            <p:style>
-              <a:lnRef idx="2">
-                <a:schemeClr val="accent1">
-                  <a:shade val="50000"/>
-                </a:schemeClr>
-              </a:lnRef>
-              <a:fillRef idx="1">
-                <a:schemeClr val="accent1"/>
-              </a:fillRef>
-              <a:effectRef idx="0">
-                <a:schemeClr val="accent1"/>
-              </a:effectRef>
-              <a:fontRef idx="minor">
-                <a:schemeClr val="lt1"/>
-              </a:fontRef>
-            </p:style>
-            <p:txBody>
-              <a:bodyPr rtlCol="0" anchor="ctr"/>
-              <a:lstStyle/>
-              <a:p>
-                <a:pPr algn="ctr"/>
-                <a:endParaRPr lang="en-GB"/>
-              </a:p>
-            </p:txBody>
-          </p:sp>
-          <p:pic>
-            <p:nvPicPr>
-              <p:cNvPr id="16" name="Graphic 15">
-                <a:extLst>
-                  <a:ext uri="{FF2B5EF4-FFF2-40B4-BE49-F238E27FC236}">
-                    <a16:creationId xmlns:a16="http://schemas.microsoft.com/office/drawing/2014/main" id="{1C7636F9-16FA-8A43-9FFE-C9E21DBAD6A7}"/>
-                  </a:ext>
-                </a:extLst>
-              </p:cNvPr>
-              <p:cNvPicPr>
-                <a:picLocks noChangeAspect="1"/>
-              </p:cNvPicPr>
-              <p:nvPr/>
-            </p:nvPicPr>
-            <p:blipFill>
-              <a:blip r:embed="rId4">
-                <a:extLst>
-                  <a:ext uri="{96DAC541-7B7A-43D3-8B79-37D633B846F1}">
-                    <asvg:svgBlip xmlns:asvg="http://schemas.microsoft.com/office/drawing/2016/SVG/main" r:embed="rId5"/>
-                  </a:ext>
-                </a:extLst>
-              </a:blip>
-              <a:stretch>
-                <a:fillRect/>
-              </a:stretch>
-            </p:blipFill>
-            <p:spPr>
-              <a:xfrm>
-                <a:off x="10386962" y="4726383"/>
-                <a:ext cx="234311" cy="234311"/>
-              </a:xfrm>
-              <a:prstGeom prst="rect">
-                <a:avLst/>
-              </a:prstGeom>
-            </p:spPr>
-          </p:pic>
-        </p:grpSp>
-        <p:grpSp>
-          <p:nvGrpSpPr>
-            <p:cNvPr id="19" name="Group 18">
-              <a:extLst>
-                <a:ext uri="{FF2B5EF4-FFF2-40B4-BE49-F238E27FC236}">
-                  <a16:creationId xmlns:a16="http://schemas.microsoft.com/office/drawing/2014/main" id="{6AE86527-E93C-ED4E-BF7D-7842D8D56345}"/>
-                </a:ext>
-              </a:extLst>
-            </p:cNvPr>
-            <p:cNvGrpSpPr/>
-            <p:nvPr/>
-          </p:nvGrpSpPr>
-          <p:grpSpPr>
-            <a:xfrm>
-              <a:off x="10256729" y="5062088"/>
-              <a:ext cx="494778" cy="295176"/>
-              <a:chOff x="10256729" y="5062088"/>
-              <a:chExt cx="494778" cy="295176"/>
-            </a:xfrm>
-          </p:grpSpPr>
-          <p:sp>
-            <p:nvSpPr>
-              <p:cNvPr id="11" name="Rounded Rectangle 10">
-                <a:extLst>
-                  <a:ext uri="{FF2B5EF4-FFF2-40B4-BE49-F238E27FC236}">
-                    <a16:creationId xmlns:a16="http://schemas.microsoft.com/office/drawing/2014/main" id="{CDED5D3F-E7D8-5041-89F0-69A8918080F3}"/>
-                  </a:ext>
-                </a:extLst>
-              </p:cNvPr>
-              <p:cNvSpPr/>
-              <p:nvPr/>
-            </p:nvSpPr>
-            <p:spPr>
-              <a:xfrm>
-                <a:off x="10256729" y="5062088"/>
-                <a:ext cx="494778" cy="295176"/>
-              </a:xfrm>
-              <a:prstGeom prst="roundRect">
-                <a:avLst/>
-              </a:prstGeom>
-              <a:solidFill>
-                <a:srgbClr val="07C2A1"/>
-              </a:solidFill>
-            </p:spPr>
-            <p:style>
-              <a:lnRef idx="2">
-                <a:schemeClr val="accent1">
-                  <a:shade val="50000"/>
-                </a:schemeClr>
-              </a:lnRef>
-              <a:fillRef idx="1">
-                <a:schemeClr val="accent1"/>
-              </a:fillRef>
-              <a:effectRef idx="0">
-                <a:schemeClr val="accent1"/>
-              </a:effectRef>
-              <a:fontRef idx="minor">
-                <a:schemeClr val="lt1"/>
-              </a:fontRef>
-            </p:style>
-            <p:txBody>
-              <a:bodyPr rtlCol="0" anchor="ctr"/>
-              <a:lstStyle/>
-              <a:p>
-                <a:pPr algn="ctr"/>
-                <a:endParaRPr lang="en-GB"/>
-              </a:p>
-            </p:txBody>
-          </p:sp>
-          <p:pic>
-            <p:nvPicPr>
-              <p:cNvPr id="18" name="Graphic 17">
-                <a:extLst>
-                  <a:ext uri="{FF2B5EF4-FFF2-40B4-BE49-F238E27FC236}">
-                    <a16:creationId xmlns:a16="http://schemas.microsoft.com/office/drawing/2014/main" id="{6A71FEC6-2A97-D743-AD0F-6F64CE775C6E}"/>
-                  </a:ext>
-                </a:extLst>
-              </p:cNvPr>
-              <p:cNvPicPr>
-                <a:picLocks noChangeAspect="1"/>
-              </p:cNvPicPr>
-              <p:nvPr/>
-            </p:nvPicPr>
-            <p:blipFill>
-              <a:blip r:embed="rId6">
-                <a:extLst>
-                  <a:ext uri="{96DAC541-7B7A-43D3-8B79-37D633B846F1}">
-                    <asvg:svgBlip xmlns:asvg="http://schemas.microsoft.com/office/drawing/2016/SVG/main" r:embed="rId7"/>
-                  </a:ext>
-                </a:extLst>
-              </a:blip>
-              <a:stretch>
-                <a:fillRect/>
-              </a:stretch>
-            </p:blipFill>
-            <p:spPr>
-              <a:xfrm>
-                <a:off x="10392750" y="5095290"/>
-                <a:ext cx="222733" cy="222733"/>
-              </a:xfrm>
-              <a:prstGeom prst="rect">
-                <a:avLst/>
-              </a:prstGeom>
-            </p:spPr>
-          </p:pic>
-        </p:grpSp>
-      </p:grpSp>
-    </p:spTree>
-    <p:extLst>
-      <p:ext uri="{BB962C8B-B14F-4D97-AF65-F5344CB8AC3E}">
-        <p14:creationId xmlns:p14="http://schemas.microsoft.com/office/powerpoint/2010/main" val="4262892557"/>
       </p:ext>
     </p:extLst>
   </p:cSld>

</xml_diff>

<commit_message>
Linear Regression page HTML page start.
</commit_message>
<xml_diff>
--- a/Additional Content/App Storyboard.pptx
+++ b/Additional Content/App Storyboard.pptx
@@ -14,12 +14,12 @@
     <p:sldId id="259" r:id="rId5"/>
     <p:sldId id="265" r:id="rId6"/>
     <p:sldId id="260" r:id="rId7"/>
-    <p:sldId id="268" r:id="rId8"/>
-    <p:sldId id="262" r:id="rId9"/>
-    <p:sldId id="263" r:id="rId10"/>
-    <p:sldId id="267" r:id="rId11"/>
-    <p:sldId id="266" r:id="rId12"/>
-    <p:sldId id="264" r:id="rId13"/>
+    <p:sldId id="262" r:id="rId8"/>
+    <p:sldId id="263" r:id="rId9"/>
+    <p:sldId id="267" r:id="rId10"/>
+    <p:sldId id="266" r:id="rId11"/>
+    <p:sldId id="264" r:id="rId12"/>
+    <p:sldId id="268" r:id="rId13"/>
   </p:sldIdLst>
   <p:sldSz cx="12192000" cy="6858000"/>
   <p:notesSz cx="6858000" cy="9144000"/>
@@ -208,7 +208,7 @@
           <a:p>
             <a:fld id="{DBC94D5E-0C08-6A4E-9EE5-1EAFAD773097}" type="datetimeFigureOut">
               <a:rPr lang="en-GB" smtClean="0"/>
-              <a:t>29/06/2020</a:t>
+              <a:t>01/07/2020</a:t>
             </a:fld>
             <a:endParaRPr lang="en-GB"/>
           </a:p>
@@ -630,7 +630,7 @@
           <a:p>
             <a:fld id="{4862C66E-3D74-BF49-9522-41AEEA025E37}" type="slidenum">
               <a:rPr lang="en-GB" smtClean="0"/>
-              <a:t>7</a:t>
+              <a:t>12</a:t>
             </a:fld>
             <a:endParaRPr lang="en-GB"/>
           </a:p>
@@ -798,7 +798,7 @@
           <a:p>
             <a:fld id="{FE643DE3-4F0B-9F47-9FDB-A8115BD25AA4}" type="datetimeFigureOut">
               <a:rPr lang="en-US" smtClean="0"/>
-              <a:t>6/29/20</a:t>
+              <a:t>7/1/20</a:t>
             </a:fld>
             <a:endParaRPr lang="en-US"/>
           </a:p>
@@ -998,7 +998,7 @@
           <a:p>
             <a:fld id="{FE643DE3-4F0B-9F47-9FDB-A8115BD25AA4}" type="datetimeFigureOut">
               <a:rPr lang="en-US" smtClean="0"/>
-              <a:t>6/29/20</a:t>
+              <a:t>7/1/20</a:t>
             </a:fld>
             <a:endParaRPr lang="en-US"/>
           </a:p>
@@ -1208,7 +1208,7 @@
           <a:p>
             <a:fld id="{FE643DE3-4F0B-9F47-9FDB-A8115BD25AA4}" type="datetimeFigureOut">
               <a:rPr lang="en-US" smtClean="0"/>
-              <a:t>6/29/20</a:t>
+              <a:t>7/1/20</a:t>
             </a:fld>
             <a:endParaRPr lang="en-US"/>
           </a:p>
@@ -1408,7 +1408,7 @@
           <a:p>
             <a:fld id="{FE643DE3-4F0B-9F47-9FDB-A8115BD25AA4}" type="datetimeFigureOut">
               <a:rPr lang="en-US" smtClean="0"/>
-              <a:t>6/29/20</a:t>
+              <a:t>7/1/20</a:t>
             </a:fld>
             <a:endParaRPr lang="en-US"/>
           </a:p>
@@ -1684,7 +1684,7 @@
           <a:p>
             <a:fld id="{FE643DE3-4F0B-9F47-9FDB-A8115BD25AA4}" type="datetimeFigureOut">
               <a:rPr lang="en-US" smtClean="0"/>
-              <a:t>6/29/20</a:t>
+              <a:t>7/1/20</a:t>
             </a:fld>
             <a:endParaRPr lang="en-US"/>
           </a:p>
@@ -1952,7 +1952,7 @@
           <a:p>
             <a:fld id="{FE643DE3-4F0B-9F47-9FDB-A8115BD25AA4}" type="datetimeFigureOut">
               <a:rPr lang="en-US" smtClean="0"/>
-              <a:t>6/29/20</a:t>
+              <a:t>7/1/20</a:t>
             </a:fld>
             <a:endParaRPr lang="en-US"/>
           </a:p>
@@ -2367,7 +2367,7 @@
           <a:p>
             <a:fld id="{FE643DE3-4F0B-9F47-9FDB-A8115BD25AA4}" type="datetimeFigureOut">
               <a:rPr lang="en-US" smtClean="0"/>
-              <a:t>6/29/20</a:t>
+              <a:t>7/1/20</a:t>
             </a:fld>
             <a:endParaRPr lang="en-US"/>
           </a:p>
@@ -2509,7 +2509,7 @@
           <a:p>
             <a:fld id="{FE643DE3-4F0B-9F47-9FDB-A8115BD25AA4}" type="datetimeFigureOut">
               <a:rPr lang="en-US" smtClean="0"/>
-              <a:t>6/29/20</a:t>
+              <a:t>7/1/20</a:t>
             </a:fld>
             <a:endParaRPr lang="en-US"/>
           </a:p>
@@ -2622,7 +2622,7 @@
           <a:p>
             <a:fld id="{FE643DE3-4F0B-9F47-9FDB-A8115BD25AA4}" type="datetimeFigureOut">
               <a:rPr lang="en-US" smtClean="0"/>
-              <a:t>6/29/20</a:t>
+              <a:t>7/1/20</a:t>
             </a:fld>
             <a:endParaRPr lang="en-US"/>
           </a:p>
@@ -2935,7 +2935,7 @@
           <a:p>
             <a:fld id="{FE643DE3-4F0B-9F47-9FDB-A8115BD25AA4}" type="datetimeFigureOut">
               <a:rPr lang="en-US" smtClean="0"/>
-              <a:t>6/29/20</a:t>
+              <a:t>7/1/20</a:t>
             </a:fld>
             <a:endParaRPr lang="en-US"/>
           </a:p>
@@ -3224,7 +3224,7 @@
           <a:p>
             <a:fld id="{FE643DE3-4F0B-9F47-9FDB-A8115BD25AA4}" type="datetimeFigureOut">
               <a:rPr lang="en-US" smtClean="0"/>
-              <a:t>6/29/20</a:t>
+              <a:t>7/1/20</a:t>
             </a:fld>
             <a:endParaRPr lang="en-US"/>
           </a:p>
@@ -3467,7 +3467,7 @@
           <a:p>
             <a:fld id="{FE643DE3-4F0B-9F47-9FDB-A8115BD25AA4}" type="datetimeFigureOut">
               <a:rPr lang="en-US" smtClean="0"/>
-              <a:t>6/29/20</a:t>
+              <a:t>7/1/20</a:t>
             </a:fld>
             <a:endParaRPr lang="en-US"/>
           </a:p>
@@ -3980,644 +3980,6 @@
           <p:cNvPr id="2" name="Title 1">
             <a:extLst>
               <a:ext uri="{FF2B5EF4-FFF2-40B4-BE49-F238E27FC236}">
-                <a16:creationId xmlns:a16="http://schemas.microsoft.com/office/drawing/2014/main" id="{D990EE0B-FF66-4341-A99A-29C5674D01B1}"/>
-              </a:ext>
-            </a:extLst>
-          </p:cNvPr>
-          <p:cNvSpPr>
-            <a:spLocks noGrp="1"/>
-          </p:cNvSpPr>
-          <p:nvPr>
-            <p:ph type="title"/>
-          </p:nvPr>
-        </p:nvSpPr>
-        <p:spPr/>
-        <p:txBody>
-          <a:bodyPr/>
-          <a:lstStyle/>
-          <a:p>
-            <a:r>
-              <a:rPr lang="en-US" dirty="0"/>
-              <a:t>Free Play Area</a:t>
-            </a:r>
-          </a:p>
-        </p:txBody>
-      </p:sp>
-      <p:sp>
-        <p:nvSpPr>
-          <p:cNvPr id="4" name="Rectangle 3">
-            <a:extLst>
-              <a:ext uri="{FF2B5EF4-FFF2-40B4-BE49-F238E27FC236}">
-                <a16:creationId xmlns:a16="http://schemas.microsoft.com/office/drawing/2014/main" id="{AE699655-BFBD-6B4A-B89D-E5AB7E2DBB4B}"/>
-              </a:ext>
-            </a:extLst>
-          </p:cNvPr>
-          <p:cNvSpPr/>
-          <p:nvPr/>
-        </p:nvSpPr>
-        <p:spPr>
-          <a:xfrm>
-            <a:off x="1233054" y="1690688"/>
-            <a:ext cx="9725891" cy="4833258"/>
-          </a:xfrm>
-          <a:prstGeom prst="rect">
-            <a:avLst/>
-          </a:prstGeom>
-          <a:solidFill>
-            <a:srgbClr val="0C4EC2"/>
-          </a:solidFill>
-        </p:spPr>
-        <p:style>
-          <a:lnRef idx="2">
-            <a:schemeClr val="accent1">
-              <a:shade val="50000"/>
-            </a:schemeClr>
-          </a:lnRef>
-          <a:fillRef idx="1">
-            <a:schemeClr val="accent1"/>
-          </a:fillRef>
-          <a:effectRef idx="0">
-            <a:schemeClr val="accent1"/>
-          </a:effectRef>
-          <a:fontRef idx="minor">
-            <a:schemeClr val="lt1"/>
-          </a:fontRef>
-        </p:style>
-        <p:txBody>
-          <a:bodyPr rtlCol="0" anchor="ctr"/>
-          <a:lstStyle/>
-          <a:p>
-            <a:pPr algn="ctr"/>
-            <a:endParaRPr lang="en-GB" b="1">
-              <a:ln w="22225">
-                <a:solidFill>
-                  <a:schemeClr val="accent2"/>
-                </a:solidFill>
-                <a:prstDash val="solid"/>
-              </a:ln>
-              <a:solidFill>
-                <a:schemeClr val="accent2">
-                  <a:lumMod val="40000"/>
-                  <a:lumOff val="60000"/>
-                </a:schemeClr>
-              </a:solidFill>
-            </a:endParaRPr>
-          </a:p>
-        </p:txBody>
-      </p:sp>
-      <p:sp>
-        <p:nvSpPr>
-          <p:cNvPr id="3" name="Rectangle 2">
-            <a:extLst>
-              <a:ext uri="{FF2B5EF4-FFF2-40B4-BE49-F238E27FC236}">
-                <a16:creationId xmlns:a16="http://schemas.microsoft.com/office/drawing/2014/main" id="{A0D8486E-39F7-9642-8379-ED365262BA53}"/>
-              </a:ext>
-            </a:extLst>
-          </p:cNvPr>
-          <p:cNvSpPr/>
-          <p:nvPr/>
-        </p:nvSpPr>
-        <p:spPr>
-          <a:xfrm>
-            <a:off x="1440493" y="2091847"/>
-            <a:ext cx="4265112" cy="2386208"/>
-          </a:xfrm>
-          <a:prstGeom prst="rect">
-            <a:avLst/>
-          </a:prstGeom>
-          <a:solidFill>
-            <a:schemeClr val="bg2">
-              <a:lumMod val="75000"/>
-            </a:schemeClr>
-          </a:solidFill>
-        </p:spPr>
-        <p:style>
-          <a:lnRef idx="2">
-            <a:schemeClr val="accent1">
-              <a:shade val="50000"/>
-            </a:schemeClr>
-          </a:lnRef>
-          <a:fillRef idx="1">
-            <a:schemeClr val="accent1"/>
-          </a:fillRef>
-          <a:effectRef idx="0">
-            <a:schemeClr val="accent1"/>
-          </a:effectRef>
-          <a:fontRef idx="minor">
-            <a:schemeClr val="lt1"/>
-          </a:fontRef>
-        </p:style>
-        <p:txBody>
-          <a:bodyPr rtlCol="0" anchor="ctr"/>
-          <a:lstStyle/>
-          <a:p>
-            <a:pPr algn="ctr"/>
-            <a:r>
-              <a:rPr lang="en-GB" dirty="0"/>
-              <a:t>Model/ Interaction Area</a:t>
-            </a:r>
-          </a:p>
-        </p:txBody>
-      </p:sp>
-      <p:sp>
-        <p:nvSpPr>
-          <p:cNvPr id="5" name="TextBox 4">
-            <a:extLst>
-              <a:ext uri="{FF2B5EF4-FFF2-40B4-BE49-F238E27FC236}">
-                <a16:creationId xmlns:a16="http://schemas.microsoft.com/office/drawing/2014/main" id="{02680A0B-7899-EA45-8783-6A222BB1B468}"/>
-              </a:ext>
-            </a:extLst>
-          </p:cNvPr>
-          <p:cNvSpPr txBox="1"/>
-          <p:nvPr/>
-        </p:nvSpPr>
-        <p:spPr>
-          <a:xfrm>
-            <a:off x="5987441" y="2116899"/>
-            <a:ext cx="4597052" cy="1477328"/>
-          </a:xfrm>
-          <a:prstGeom prst="rect">
-            <a:avLst/>
-          </a:prstGeom>
-          <a:noFill/>
-        </p:spPr>
-        <p:txBody>
-          <a:bodyPr wrap="square" rtlCol="0">
-            <a:spAutoFit/>
-          </a:bodyPr>
-          <a:lstStyle/>
-          <a:p>
-            <a:r>
-              <a:rPr lang="en-GB" dirty="0">
-                <a:solidFill>
-                  <a:schemeClr val="bg1"/>
-                </a:solidFill>
-              </a:rPr>
-              <a:t>Model: [Name] </a:t>
-            </a:r>
-          </a:p>
-          <a:p>
-            <a:endParaRPr lang="en-GB" dirty="0">
-              <a:solidFill>
-                <a:schemeClr val="bg1"/>
-              </a:solidFill>
-            </a:endParaRPr>
-          </a:p>
-          <a:p>
-            <a:r>
-              <a:rPr lang="en-GB" dirty="0">
-                <a:solidFill>
-                  <a:schemeClr val="bg1"/>
-                </a:solidFill>
-              </a:rPr>
-              <a:t>Learning Type: [Supervised/ Unsupervised]</a:t>
-            </a:r>
-          </a:p>
-          <a:p>
-            <a:endParaRPr lang="en-GB" dirty="0">
-              <a:solidFill>
-                <a:schemeClr val="bg1"/>
-              </a:solidFill>
-            </a:endParaRPr>
-          </a:p>
-          <a:p>
-            <a:r>
-              <a:rPr lang="en-GB" dirty="0">
-                <a:solidFill>
-                  <a:schemeClr val="bg1"/>
-                </a:solidFill>
-              </a:rPr>
-              <a:t>Overview: [Brief overview of the model]</a:t>
-            </a:r>
-          </a:p>
-        </p:txBody>
-      </p:sp>
-      <p:sp>
-        <p:nvSpPr>
-          <p:cNvPr id="6" name="Rectangle 5">
-            <a:extLst>
-              <a:ext uri="{FF2B5EF4-FFF2-40B4-BE49-F238E27FC236}">
-                <a16:creationId xmlns:a16="http://schemas.microsoft.com/office/drawing/2014/main" id="{C68B7AD0-0961-DA41-81F4-5646B8F71C77}"/>
-              </a:ext>
-            </a:extLst>
-          </p:cNvPr>
-          <p:cNvSpPr/>
-          <p:nvPr/>
-        </p:nvSpPr>
-        <p:spPr>
-          <a:xfrm>
-            <a:off x="1440493" y="4603315"/>
-            <a:ext cx="9388258" cy="1841326"/>
-          </a:xfrm>
-          <a:prstGeom prst="rect">
-            <a:avLst/>
-          </a:prstGeom>
-          <a:solidFill>
-            <a:schemeClr val="accent5">
-              <a:lumMod val="60000"/>
-              <a:lumOff val="40000"/>
-            </a:schemeClr>
-          </a:solidFill>
-        </p:spPr>
-        <p:style>
-          <a:lnRef idx="2">
-            <a:schemeClr val="accent1">
-              <a:shade val="50000"/>
-            </a:schemeClr>
-          </a:lnRef>
-          <a:fillRef idx="1">
-            <a:schemeClr val="accent1"/>
-          </a:fillRef>
-          <a:effectRef idx="0">
-            <a:schemeClr val="accent1"/>
-          </a:effectRef>
-          <a:fontRef idx="minor">
-            <a:schemeClr val="lt1"/>
-          </a:fontRef>
-        </p:style>
-        <p:txBody>
-          <a:bodyPr rtlCol="0" anchor="ctr"/>
-          <a:lstStyle/>
-          <a:p>
-            <a:pPr algn="ctr"/>
-            <a:endParaRPr lang="en-GB" dirty="0"/>
-          </a:p>
-        </p:txBody>
-      </p:sp>
-      <p:grpSp>
-        <p:nvGrpSpPr>
-          <p:cNvPr id="21" name="Group 20">
-            <a:extLst>
-              <a:ext uri="{FF2B5EF4-FFF2-40B4-BE49-F238E27FC236}">
-                <a16:creationId xmlns:a16="http://schemas.microsoft.com/office/drawing/2014/main" id="{90C3EB00-BCD7-CB45-85B0-F92D9E2FD51A}"/>
-              </a:ext>
-            </a:extLst>
-          </p:cNvPr>
-          <p:cNvGrpSpPr/>
-          <p:nvPr/>
-        </p:nvGrpSpPr>
-        <p:grpSpPr>
-          <a:xfrm>
-            <a:off x="10256729" y="5339951"/>
-            <a:ext cx="494778" cy="1041385"/>
-            <a:chOff x="10256729" y="4688597"/>
-            <a:chExt cx="494778" cy="1041385"/>
-          </a:xfrm>
-        </p:grpSpPr>
-        <p:grpSp>
-          <p:nvGrpSpPr>
-            <p:cNvPr id="13" name="Group 12">
-              <a:extLst>
-                <a:ext uri="{FF2B5EF4-FFF2-40B4-BE49-F238E27FC236}">
-                  <a16:creationId xmlns:a16="http://schemas.microsoft.com/office/drawing/2014/main" id="{BD9D634E-A2B0-4045-B893-EF1891625EF3}"/>
-                </a:ext>
-              </a:extLst>
-            </p:cNvPr>
-            <p:cNvGrpSpPr/>
-            <p:nvPr/>
-          </p:nvGrpSpPr>
-          <p:grpSpPr>
-            <a:xfrm>
-              <a:off x="10256729" y="5434806"/>
-              <a:ext cx="494778" cy="295176"/>
-              <a:chOff x="5122859" y="6116564"/>
-              <a:chExt cx="494778" cy="295176"/>
-            </a:xfrm>
-          </p:grpSpPr>
-          <p:sp>
-            <p:nvSpPr>
-              <p:cNvPr id="14" name="Rounded Rectangle 13">
-                <a:extLst>
-                  <a:ext uri="{FF2B5EF4-FFF2-40B4-BE49-F238E27FC236}">
-                    <a16:creationId xmlns:a16="http://schemas.microsoft.com/office/drawing/2014/main" id="{8F2E4D8C-2AF9-134E-947B-E79997CF652E}"/>
-                  </a:ext>
-                </a:extLst>
-              </p:cNvPr>
-              <p:cNvSpPr/>
-              <p:nvPr/>
-            </p:nvSpPr>
-            <p:spPr>
-              <a:xfrm>
-                <a:off x="5122859" y="6116564"/>
-                <a:ext cx="494778" cy="295176"/>
-              </a:xfrm>
-              <a:prstGeom prst="roundRect">
-                <a:avLst/>
-              </a:prstGeom>
-              <a:solidFill>
-                <a:srgbClr val="07C2A1"/>
-              </a:solidFill>
-            </p:spPr>
-            <p:style>
-              <a:lnRef idx="2">
-                <a:schemeClr val="accent1">
-                  <a:shade val="50000"/>
-                </a:schemeClr>
-              </a:lnRef>
-              <a:fillRef idx="1">
-                <a:schemeClr val="accent1"/>
-              </a:fillRef>
-              <a:effectRef idx="0">
-                <a:schemeClr val="accent1"/>
-              </a:effectRef>
-              <a:fontRef idx="minor">
-                <a:schemeClr val="lt1"/>
-              </a:fontRef>
-            </p:style>
-            <p:txBody>
-              <a:bodyPr rtlCol="0" anchor="ctr"/>
-              <a:lstStyle/>
-              <a:p>
-                <a:pPr algn="ctr"/>
-                <a:endParaRPr lang="en-GB"/>
-              </a:p>
-            </p:txBody>
-          </p:sp>
-          <p:pic>
-            <p:nvPicPr>
-              <p:cNvPr id="15" name="Graphic 14">
-                <a:extLst>
-                  <a:ext uri="{FF2B5EF4-FFF2-40B4-BE49-F238E27FC236}">
-                    <a16:creationId xmlns:a16="http://schemas.microsoft.com/office/drawing/2014/main" id="{AD931E40-A3F3-6944-8412-C4D1E131D2E0}"/>
-                  </a:ext>
-                </a:extLst>
-              </p:cNvPr>
-              <p:cNvPicPr>
-                <a:picLocks noChangeAspect="1"/>
-              </p:cNvPicPr>
-              <p:nvPr/>
-            </p:nvPicPr>
-            <p:blipFill>
-              <a:blip r:embed="rId2">
-                <a:extLst>
-                  <a:ext uri="{96DAC541-7B7A-43D3-8B79-37D633B846F1}">
-                    <asvg:svgBlip xmlns:asvg="http://schemas.microsoft.com/office/drawing/2016/SVG/main" r:embed="rId3"/>
-                  </a:ext>
-                </a:extLst>
-              </a:blip>
-              <a:stretch>
-                <a:fillRect/>
-              </a:stretch>
-            </p:blipFill>
-            <p:spPr>
-              <a:xfrm>
-                <a:off x="5238448" y="6146996"/>
-                <a:ext cx="263600" cy="234311"/>
-              </a:xfrm>
-              <a:prstGeom prst="rect">
-                <a:avLst/>
-              </a:prstGeom>
-            </p:spPr>
-          </p:pic>
-        </p:grpSp>
-        <p:grpSp>
-          <p:nvGrpSpPr>
-            <p:cNvPr id="20" name="Group 19">
-              <a:extLst>
-                <a:ext uri="{FF2B5EF4-FFF2-40B4-BE49-F238E27FC236}">
-                  <a16:creationId xmlns:a16="http://schemas.microsoft.com/office/drawing/2014/main" id="{501F6700-AEE9-924E-80B7-E39BF9151F9C}"/>
-                </a:ext>
-              </a:extLst>
-            </p:cNvPr>
-            <p:cNvGrpSpPr/>
-            <p:nvPr/>
-          </p:nvGrpSpPr>
-          <p:grpSpPr>
-            <a:xfrm>
-              <a:off x="10256729" y="4688597"/>
-              <a:ext cx="494778" cy="295176"/>
-              <a:chOff x="10256729" y="4688597"/>
-              <a:chExt cx="494778" cy="295176"/>
-            </a:xfrm>
-          </p:grpSpPr>
-          <p:sp>
-            <p:nvSpPr>
-              <p:cNvPr id="8" name="Rounded Rectangle 7">
-                <a:extLst>
-                  <a:ext uri="{FF2B5EF4-FFF2-40B4-BE49-F238E27FC236}">
-                    <a16:creationId xmlns:a16="http://schemas.microsoft.com/office/drawing/2014/main" id="{F7EC5FCA-F743-374C-BC2E-F249C222A328}"/>
-                  </a:ext>
-                </a:extLst>
-              </p:cNvPr>
-              <p:cNvSpPr/>
-              <p:nvPr/>
-            </p:nvSpPr>
-            <p:spPr>
-              <a:xfrm>
-                <a:off x="10256729" y="4688597"/>
-                <a:ext cx="494778" cy="295176"/>
-              </a:xfrm>
-              <a:prstGeom prst="roundRect">
-                <a:avLst/>
-              </a:prstGeom>
-              <a:solidFill>
-                <a:srgbClr val="07C2A1"/>
-              </a:solidFill>
-            </p:spPr>
-            <p:style>
-              <a:lnRef idx="2">
-                <a:schemeClr val="accent1">
-                  <a:shade val="50000"/>
-                </a:schemeClr>
-              </a:lnRef>
-              <a:fillRef idx="1">
-                <a:schemeClr val="accent1"/>
-              </a:fillRef>
-              <a:effectRef idx="0">
-                <a:schemeClr val="accent1"/>
-              </a:effectRef>
-              <a:fontRef idx="minor">
-                <a:schemeClr val="lt1"/>
-              </a:fontRef>
-            </p:style>
-            <p:txBody>
-              <a:bodyPr rtlCol="0" anchor="ctr"/>
-              <a:lstStyle/>
-              <a:p>
-                <a:pPr algn="ctr"/>
-                <a:endParaRPr lang="en-GB"/>
-              </a:p>
-            </p:txBody>
-          </p:sp>
-          <p:pic>
-            <p:nvPicPr>
-              <p:cNvPr id="16" name="Graphic 15">
-                <a:extLst>
-                  <a:ext uri="{FF2B5EF4-FFF2-40B4-BE49-F238E27FC236}">
-                    <a16:creationId xmlns:a16="http://schemas.microsoft.com/office/drawing/2014/main" id="{1C7636F9-16FA-8A43-9FFE-C9E21DBAD6A7}"/>
-                  </a:ext>
-                </a:extLst>
-              </p:cNvPr>
-              <p:cNvPicPr>
-                <a:picLocks noChangeAspect="1"/>
-              </p:cNvPicPr>
-              <p:nvPr/>
-            </p:nvPicPr>
-            <p:blipFill>
-              <a:blip r:embed="rId4">
-                <a:extLst>
-                  <a:ext uri="{96DAC541-7B7A-43D3-8B79-37D633B846F1}">
-                    <asvg:svgBlip xmlns:asvg="http://schemas.microsoft.com/office/drawing/2016/SVG/main" r:embed="rId5"/>
-                  </a:ext>
-                </a:extLst>
-              </a:blip>
-              <a:stretch>
-                <a:fillRect/>
-              </a:stretch>
-            </p:blipFill>
-            <p:spPr>
-              <a:xfrm>
-                <a:off x="10386962" y="4726383"/>
-                <a:ext cx="234311" cy="234311"/>
-              </a:xfrm>
-              <a:prstGeom prst="rect">
-                <a:avLst/>
-              </a:prstGeom>
-            </p:spPr>
-          </p:pic>
-        </p:grpSp>
-        <p:grpSp>
-          <p:nvGrpSpPr>
-            <p:cNvPr id="19" name="Group 18">
-              <a:extLst>
-                <a:ext uri="{FF2B5EF4-FFF2-40B4-BE49-F238E27FC236}">
-                  <a16:creationId xmlns:a16="http://schemas.microsoft.com/office/drawing/2014/main" id="{6AE86527-E93C-ED4E-BF7D-7842D8D56345}"/>
-                </a:ext>
-              </a:extLst>
-            </p:cNvPr>
-            <p:cNvGrpSpPr/>
-            <p:nvPr/>
-          </p:nvGrpSpPr>
-          <p:grpSpPr>
-            <a:xfrm>
-              <a:off x="10256729" y="5062088"/>
-              <a:ext cx="494778" cy="295176"/>
-              <a:chOff x="10256729" y="5062088"/>
-              <a:chExt cx="494778" cy="295176"/>
-            </a:xfrm>
-          </p:grpSpPr>
-          <p:sp>
-            <p:nvSpPr>
-              <p:cNvPr id="11" name="Rounded Rectangle 10">
-                <a:extLst>
-                  <a:ext uri="{FF2B5EF4-FFF2-40B4-BE49-F238E27FC236}">
-                    <a16:creationId xmlns:a16="http://schemas.microsoft.com/office/drawing/2014/main" id="{CDED5D3F-E7D8-5041-89F0-69A8918080F3}"/>
-                  </a:ext>
-                </a:extLst>
-              </p:cNvPr>
-              <p:cNvSpPr/>
-              <p:nvPr/>
-            </p:nvSpPr>
-            <p:spPr>
-              <a:xfrm>
-                <a:off x="10256729" y="5062088"/>
-                <a:ext cx="494778" cy="295176"/>
-              </a:xfrm>
-              <a:prstGeom prst="roundRect">
-                <a:avLst/>
-              </a:prstGeom>
-              <a:solidFill>
-                <a:srgbClr val="07C2A1"/>
-              </a:solidFill>
-            </p:spPr>
-            <p:style>
-              <a:lnRef idx="2">
-                <a:schemeClr val="accent1">
-                  <a:shade val="50000"/>
-                </a:schemeClr>
-              </a:lnRef>
-              <a:fillRef idx="1">
-                <a:schemeClr val="accent1"/>
-              </a:fillRef>
-              <a:effectRef idx="0">
-                <a:schemeClr val="accent1"/>
-              </a:effectRef>
-              <a:fontRef idx="minor">
-                <a:schemeClr val="lt1"/>
-              </a:fontRef>
-            </p:style>
-            <p:txBody>
-              <a:bodyPr rtlCol="0" anchor="ctr"/>
-              <a:lstStyle/>
-              <a:p>
-                <a:pPr algn="ctr"/>
-                <a:endParaRPr lang="en-GB"/>
-              </a:p>
-            </p:txBody>
-          </p:sp>
-          <p:pic>
-            <p:nvPicPr>
-              <p:cNvPr id="18" name="Graphic 17">
-                <a:extLst>
-                  <a:ext uri="{FF2B5EF4-FFF2-40B4-BE49-F238E27FC236}">
-                    <a16:creationId xmlns:a16="http://schemas.microsoft.com/office/drawing/2014/main" id="{6A71FEC6-2A97-D743-AD0F-6F64CE775C6E}"/>
-                  </a:ext>
-                </a:extLst>
-              </p:cNvPr>
-              <p:cNvPicPr>
-                <a:picLocks noChangeAspect="1"/>
-              </p:cNvPicPr>
-              <p:nvPr/>
-            </p:nvPicPr>
-            <p:blipFill>
-              <a:blip r:embed="rId6">
-                <a:extLst>
-                  <a:ext uri="{96DAC541-7B7A-43D3-8B79-37D633B846F1}">
-                    <asvg:svgBlip xmlns:asvg="http://schemas.microsoft.com/office/drawing/2016/SVG/main" r:embed="rId7"/>
-                  </a:ext>
-                </a:extLst>
-              </a:blip>
-              <a:stretch>
-                <a:fillRect/>
-              </a:stretch>
-            </p:blipFill>
-            <p:spPr>
-              <a:xfrm>
-                <a:off x="10392750" y="5095290"/>
-                <a:ext cx="222733" cy="222733"/>
-              </a:xfrm>
-              <a:prstGeom prst="rect">
-                <a:avLst/>
-              </a:prstGeom>
-            </p:spPr>
-          </p:pic>
-        </p:grpSp>
-      </p:grpSp>
-    </p:spTree>
-    <p:extLst>
-      <p:ext uri="{BB962C8B-B14F-4D97-AF65-F5344CB8AC3E}">
-        <p14:creationId xmlns:p14="http://schemas.microsoft.com/office/powerpoint/2010/main" val="4262892557"/>
-      </p:ext>
-    </p:extLst>
-  </p:cSld>
-  <p:clrMapOvr>
-    <a:masterClrMapping/>
-  </p:clrMapOvr>
-</p:sld>
-</file>
-
-<file path=ppt/slides/slide11.xml><?xml version="1.0" encoding="utf-8"?>
-<p:sld xmlns:a="http://schemas.openxmlformats.org/drawingml/2006/main" xmlns:r="http://schemas.openxmlformats.org/officeDocument/2006/relationships" xmlns:p="http://schemas.openxmlformats.org/presentationml/2006/main">
-  <p:cSld>
-    <p:spTree>
-      <p:nvGrpSpPr>
-        <p:cNvPr id="1" name=""/>
-        <p:cNvGrpSpPr/>
-        <p:nvPr/>
-      </p:nvGrpSpPr>
-      <p:grpSpPr>
-        <a:xfrm>
-          <a:off x="0" y="0"/>
-          <a:ext cx="0" cy="0"/>
-          <a:chOff x="0" y="0"/>
-          <a:chExt cx="0" cy="0"/>
-        </a:xfrm>
-      </p:grpSpPr>
-      <p:sp>
-        <p:nvSpPr>
-          <p:cNvPr id="2" name="Title 1">
-            <a:extLst>
-              <a:ext uri="{FF2B5EF4-FFF2-40B4-BE49-F238E27FC236}">
                 <a16:creationId xmlns:a16="http://schemas.microsoft.com/office/drawing/2014/main" id="{F41F7F4C-C6E2-2449-AE06-87EB9C5D2977}"/>
               </a:ext>
             </a:extLst>
@@ -5025,7 +4387,7 @@
 </p:sld>
 </file>
 
-<file path=ppt/slides/slide12.xml><?xml version="1.0" encoding="utf-8"?>
+<file path=ppt/slides/slide11.xml><?xml version="1.0" encoding="utf-8"?>
 <p:sld xmlns:a="http://schemas.openxmlformats.org/drawingml/2006/main" xmlns:r="http://schemas.openxmlformats.org/officeDocument/2006/relationships" xmlns:p="http://schemas.openxmlformats.org/presentationml/2006/main">
   <p:cSld>
     <p:spTree>
@@ -5173,6 +4535,554 @@
     <p:extLst>
       <p:ext uri="{BB962C8B-B14F-4D97-AF65-F5344CB8AC3E}">
         <p14:creationId xmlns:p14="http://schemas.microsoft.com/office/powerpoint/2010/main" val="3095460487"/>
+      </p:ext>
+    </p:extLst>
+  </p:cSld>
+  <p:clrMapOvr>
+    <a:masterClrMapping/>
+  </p:clrMapOvr>
+</p:sld>
+</file>
+
+<file path=ppt/slides/slide12.xml><?xml version="1.0" encoding="utf-8"?>
+<p:sld xmlns:a="http://schemas.openxmlformats.org/drawingml/2006/main" xmlns:r="http://schemas.openxmlformats.org/officeDocument/2006/relationships" xmlns:p="http://schemas.openxmlformats.org/presentationml/2006/main">
+  <p:cSld>
+    <p:spTree>
+      <p:nvGrpSpPr>
+        <p:cNvPr id="1" name=""/>
+        <p:cNvGrpSpPr/>
+        <p:nvPr/>
+      </p:nvGrpSpPr>
+      <p:grpSpPr>
+        <a:xfrm>
+          <a:off x="0" y="0"/>
+          <a:ext cx="0" cy="0"/>
+          <a:chOff x="0" y="0"/>
+          <a:chExt cx="0" cy="0"/>
+        </a:xfrm>
+      </p:grpSpPr>
+      <p:sp>
+        <p:nvSpPr>
+          <p:cNvPr id="2" name="Title 1">
+            <a:extLst>
+              <a:ext uri="{FF2B5EF4-FFF2-40B4-BE49-F238E27FC236}">
+                <a16:creationId xmlns:a16="http://schemas.microsoft.com/office/drawing/2014/main" id="{A3FDB8DA-7CB7-F441-A79C-0F19916E2479}"/>
+              </a:ext>
+            </a:extLst>
+          </p:cNvPr>
+          <p:cNvSpPr>
+            <a:spLocks noGrp="1"/>
+          </p:cNvSpPr>
+          <p:nvPr>
+            <p:ph type="title"/>
+          </p:nvPr>
+        </p:nvSpPr>
+        <p:spPr/>
+        <p:txBody>
+          <a:bodyPr/>
+          <a:lstStyle/>
+          <a:p>
+            <a:r>
+              <a:rPr lang="en-US" dirty="0"/>
+              <a:t>Game Screen</a:t>
+            </a:r>
+          </a:p>
+        </p:txBody>
+      </p:sp>
+      <p:sp>
+        <p:nvSpPr>
+          <p:cNvPr id="4" name="Rectangle 3">
+            <a:extLst>
+              <a:ext uri="{FF2B5EF4-FFF2-40B4-BE49-F238E27FC236}">
+                <a16:creationId xmlns:a16="http://schemas.microsoft.com/office/drawing/2014/main" id="{31CA961E-1293-A34C-B1E7-95744AF0B446}"/>
+              </a:ext>
+            </a:extLst>
+          </p:cNvPr>
+          <p:cNvSpPr/>
+          <p:nvPr/>
+        </p:nvSpPr>
+        <p:spPr>
+          <a:xfrm>
+            <a:off x="1233054" y="1690688"/>
+            <a:ext cx="9725891" cy="4833258"/>
+          </a:xfrm>
+          <a:prstGeom prst="rect">
+            <a:avLst/>
+          </a:prstGeom>
+          <a:solidFill>
+            <a:srgbClr val="2F5597"/>
+          </a:solidFill>
+        </p:spPr>
+        <p:style>
+          <a:lnRef idx="2">
+            <a:schemeClr val="accent1">
+              <a:shade val="50000"/>
+            </a:schemeClr>
+          </a:lnRef>
+          <a:fillRef idx="1">
+            <a:schemeClr val="accent1"/>
+          </a:fillRef>
+          <a:effectRef idx="0">
+            <a:schemeClr val="accent1"/>
+          </a:effectRef>
+          <a:fontRef idx="minor">
+            <a:schemeClr val="lt1"/>
+          </a:fontRef>
+        </p:style>
+        <p:txBody>
+          <a:bodyPr rtlCol="0" anchor="ctr"/>
+          <a:lstStyle/>
+          <a:p>
+            <a:pPr algn="ctr"/>
+            <a:endParaRPr lang="en-GB" b="1">
+              <a:ln w="22225">
+                <a:solidFill>
+                  <a:schemeClr val="accent2"/>
+                </a:solidFill>
+                <a:prstDash val="solid"/>
+              </a:ln>
+              <a:solidFill>
+                <a:schemeClr val="accent2">
+                  <a:lumMod val="40000"/>
+                  <a:lumOff val="60000"/>
+                </a:schemeClr>
+              </a:solidFill>
+            </a:endParaRPr>
+          </a:p>
+        </p:txBody>
+      </p:sp>
+      <p:sp>
+        <p:nvSpPr>
+          <p:cNvPr id="3" name="Rectangle 2">
+            <a:extLst>
+              <a:ext uri="{FF2B5EF4-FFF2-40B4-BE49-F238E27FC236}">
+                <a16:creationId xmlns:a16="http://schemas.microsoft.com/office/drawing/2014/main" id="{3E4BDA3D-0EA3-A742-89D8-E93A6FEED745}"/>
+              </a:ext>
+            </a:extLst>
+          </p:cNvPr>
+          <p:cNvSpPr/>
+          <p:nvPr/>
+        </p:nvSpPr>
+        <p:spPr>
+          <a:xfrm>
+            <a:off x="1318161" y="1775361"/>
+            <a:ext cx="9547761" cy="801584"/>
+          </a:xfrm>
+          <a:prstGeom prst="rect">
+            <a:avLst/>
+          </a:prstGeom>
+          <a:solidFill>
+            <a:srgbClr val="A5A5A5"/>
+          </a:solidFill>
+        </p:spPr>
+        <p:style>
+          <a:lnRef idx="2">
+            <a:schemeClr val="accent3">
+              <a:shade val="50000"/>
+            </a:schemeClr>
+          </a:lnRef>
+          <a:fillRef idx="1">
+            <a:schemeClr val="accent3"/>
+          </a:fillRef>
+          <a:effectRef idx="0">
+            <a:schemeClr val="accent3"/>
+          </a:effectRef>
+          <a:fontRef idx="minor">
+            <a:schemeClr val="lt1"/>
+          </a:fontRef>
+        </p:style>
+        <p:txBody>
+          <a:bodyPr rtlCol="0" anchor="ctr"/>
+          <a:lstStyle/>
+          <a:p>
+            <a:pPr algn="ctr"/>
+            <a:endParaRPr lang="en-GB"/>
+          </a:p>
+        </p:txBody>
+      </p:sp>
+      <p:sp>
+        <p:nvSpPr>
+          <p:cNvPr id="5" name="Rectangle 4">
+            <a:extLst>
+              <a:ext uri="{FF2B5EF4-FFF2-40B4-BE49-F238E27FC236}">
+                <a16:creationId xmlns:a16="http://schemas.microsoft.com/office/drawing/2014/main" id="{FC59767B-29C7-D84F-8909-8296DAE67931}"/>
+              </a:ext>
+            </a:extLst>
+          </p:cNvPr>
+          <p:cNvSpPr/>
+          <p:nvPr/>
+        </p:nvSpPr>
+        <p:spPr>
+          <a:xfrm>
+            <a:off x="5007901" y="1643762"/>
+            <a:ext cx="1992270" cy="923330"/>
+          </a:xfrm>
+          <a:prstGeom prst="rect">
+            <a:avLst/>
+          </a:prstGeom>
+          <a:noFill/>
+        </p:spPr>
+        <p:txBody>
+          <a:bodyPr wrap="square" lIns="91440" tIns="45720" rIns="91440" bIns="45720">
+            <a:spAutoFit/>
+          </a:bodyPr>
+          <a:lstStyle/>
+          <a:p>
+            <a:pPr algn="ctr"/>
+            <a:r>
+              <a:rPr lang="en-GB" sz="5400" b="1" dirty="0">
+                <a:ln w="12700" cmpd="sng">
+                  <a:solidFill>
+                    <a:srgbClr val="C4623E"/>
+                  </a:solidFill>
+                  <a:prstDash val="solid"/>
+                </a:ln>
+                <a:solidFill>
+                  <a:srgbClr val="C3C02C"/>
+                </a:solidFill>
+              </a:rPr>
+              <a:t>K-</a:t>
+            </a:r>
+          </a:p>
+        </p:txBody>
+      </p:sp>
+      <p:sp>
+        <p:nvSpPr>
+          <p:cNvPr id="6" name="Rectangle 5">
+            <a:extLst>
+              <a:ext uri="{FF2B5EF4-FFF2-40B4-BE49-F238E27FC236}">
+                <a16:creationId xmlns:a16="http://schemas.microsoft.com/office/drawing/2014/main" id="{43F74CAD-D9B8-9647-87FD-0765A2B43177}"/>
+              </a:ext>
+            </a:extLst>
+          </p:cNvPr>
+          <p:cNvSpPr/>
+          <p:nvPr/>
+        </p:nvSpPr>
+        <p:spPr>
+          <a:xfrm>
+            <a:off x="6150968" y="1653615"/>
+            <a:ext cx="2353529" cy="923330"/>
+          </a:xfrm>
+          <a:prstGeom prst="rect">
+            <a:avLst/>
+          </a:prstGeom>
+          <a:noFill/>
+        </p:spPr>
+        <p:txBody>
+          <a:bodyPr wrap="none" lIns="91440" tIns="45720" rIns="91440" bIns="45720">
+            <a:spAutoFit/>
+          </a:bodyPr>
+          <a:lstStyle/>
+          <a:p>
+            <a:pPr algn="ctr"/>
+            <a:r>
+              <a:rPr lang="en-GB" sz="5400" b="1" cap="none" spc="0" dirty="0">
+                <a:ln w="12700" cmpd="sng">
+                  <a:solidFill>
+                    <a:srgbClr val="6214C4"/>
+                  </a:solidFill>
+                  <a:prstDash val="solid"/>
+                </a:ln>
+                <a:solidFill>
+                  <a:srgbClr val="03C1A1"/>
+                </a:solidFill>
+                <a:effectLst/>
+              </a:rPr>
+              <a:t>Means!</a:t>
+            </a:r>
+          </a:p>
+        </p:txBody>
+      </p:sp>
+      <p:pic>
+        <p:nvPicPr>
+          <p:cNvPr id="8" name="Picture 7" descr="A screenshot of a cell phone&#10;&#10;Description automatically generated">
+            <a:extLst>
+              <a:ext uri="{FF2B5EF4-FFF2-40B4-BE49-F238E27FC236}">
+                <a16:creationId xmlns:a16="http://schemas.microsoft.com/office/drawing/2014/main" id="{D23C3B8A-E956-8745-BBC9-5A104EAB1BE5}"/>
+              </a:ext>
+            </a:extLst>
+          </p:cNvPr>
+          <p:cNvPicPr>
+            <a:picLocks noChangeAspect="1"/>
+          </p:cNvPicPr>
+          <p:nvPr/>
+        </p:nvPicPr>
+        <p:blipFill>
+          <a:blip r:embed="rId3"/>
+          <a:stretch>
+            <a:fillRect/>
+          </a:stretch>
+        </p:blipFill>
+        <p:spPr>
+          <a:xfrm>
+            <a:off x="1318161" y="2709595"/>
+            <a:ext cx="4370626" cy="2586800"/>
+          </a:xfrm>
+          <a:prstGeom prst="rect">
+            <a:avLst/>
+          </a:prstGeom>
+        </p:spPr>
+      </p:pic>
+      <p:sp>
+        <p:nvSpPr>
+          <p:cNvPr id="9" name="Rectangle 8">
+            <a:extLst>
+              <a:ext uri="{FF2B5EF4-FFF2-40B4-BE49-F238E27FC236}">
+                <a16:creationId xmlns:a16="http://schemas.microsoft.com/office/drawing/2014/main" id="{D85EFC7B-B6BF-CC4D-A607-D3D7344DFDCD}"/>
+              </a:ext>
+            </a:extLst>
+          </p:cNvPr>
+          <p:cNvSpPr/>
+          <p:nvPr/>
+        </p:nvSpPr>
+        <p:spPr>
+          <a:xfrm>
+            <a:off x="5830784" y="2709595"/>
+            <a:ext cx="5035138" cy="1203817"/>
+          </a:xfrm>
+          <a:prstGeom prst="rect">
+            <a:avLst/>
+          </a:prstGeom>
+          <a:solidFill>
+            <a:srgbClr val="C3C02C"/>
+          </a:solidFill>
+        </p:spPr>
+        <p:style>
+          <a:lnRef idx="2">
+            <a:schemeClr val="accent4">
+              <a:shade val="50000"/>
+            </a:schemeClr>
+          </a:lnRef>
+          <a:fillRef idx="1">
+            <a:schemeClr val="accent4"/>
+          </a:fillRef>
+          <a:effectRef idx="0">
+            <a:schemeClr val="accent4"/>
+          </a:effectRef>
+          <a:fontRef idx="minor">
+            <a:schemeClr val="lt1"/>
+          </a:fontRef>
+        </p:style>
+        <p:txBody>
+          <a:bodyPr rtlCol="0" anchor="ctr"/>
+          <a:lstStyle/>
+          <a:p>
+            <a:r>
+              <a:rPr lang="en-GB" dirty="0"/>
+              <a:t>Aim:</a:t>
+            </a:r>
+          </a:p>
+          <a:p>
+            <a:r>
+              <a:rPr lang="en-GB" dirty="0"/>
+              <a:t>You must complete the challenge – description here!</a:t>
+            </a:r>
+          </a:p>
+        </p:txBody>
+      </p:sp>
+      <p:sp>
+        <p:nvSpPr>
+          <p:cNvPr id="10" name="Rectangle 9">
+            <a:extLst>
+              <a:ext uri="{FF2B5EF4-FFF2-40B4-BE49-F238E27FC236}">
+                <a16:creationId xmlns:a16="http://schemas.microsoft.com/office/drawing/2014/main" id="{27D3B4CD-C78C-4540-A314-9ABCA26AED39}"/>
+              </a:ext>
+            </a:extLst>
+          </p:cNvPr>
+          <p:cNvSpPr/>
+          <p:nvPr/>
+        </p:nvSpPr>
+        <p:spPr>
+          <a:xfrm>
+            <a:off x="1318161" y="5795158"/>
+            <a:ext cx="4370626" cy="647206"/>
+          </a:xfrm>
+          <a:prstGeom prst="rect">
+            <a:avLst/>
+          </a:prstGeom>
+          <a:solidFill>
+            <a:srgbClr val="07C2A1"/>
+          </a:solidFill>
+        </p:spPr>
+        <p:style>
+          <a:lnRef idx="2">
+            <a:schemeClr val="accent1">
+              <a:shade val="50000"/>
+            </a:schemeClr>
+          </a:lnRef>
+          <a:fillRef idx="1">
+            <a:schemeClr val="accent1"/>
+          </a:fillRef>
+          <a:effectRef idx="0">
+            <a:schemeClr val="accent1"/>
+          </a:effectRef>
+          <a:fontRef idx="minor">
+            <a:schemeClr val="lt1"/>
+          </a:fontRef>
+        </p:style>
+        <p:txBody>
+          <a:bodyPr rtlCol="0" anchor="ctr"/>
+          <a:lstStyle/>
+          <a:p>
+            <a:r>
+              <a:rPr lang="en-GB" dirty="0"/>
+              <a:t>Tip:</a:t>
+            </a:r>
+          </a:p>
+          <a:p>
+            <a:r>
+              <a:rPr lang="en-GB" dirty="0"/>
+              <a:t>Tip of how the algorithm works.</a:t>
+            </a:r>
+          </a:p>
+        </p:txBody>
+      </p:sp>
+      <p:sp>
+        <p:nvSpPr>
+          <p:cNvPr id="11" name="Rectangle 10">
+            <a:extLst>
+              <a:ext uri="{FF2B5EF4-FFF2-40B4-BE49-F238E27FC236}">
+                <a16:creationId xmlns:a16="http://schemas.microsoft.com/office/drawing/2014/main" id="{A599C392-E5C4-8F4E-B9B2-F4EDFCB3FDFE}"/>
+              </a:ext>
+            </a:extLst>
+          </p:cNvPr>
+          <p:cNvSpPr/>
+          <p:nvPr/>
+        </p:nvSpPr>
+        <p:spPr>
+          <a:xfrm>
+            <a:off x="1318161" y="5333468"/>
+            <a:ext cx="4370626" cy="319187"/>
+          </a:xfrm>
+          <a:prstGeom prst="rect">
+            <a:avLst/>
+          </a:prstGeom>
+          <a:solidFill>
+            <a:srgbClr val="C00000"/>
+          </a:solidFill>
+        </p:spPr>
+        <p:style>
+          <a:lnRef idx="2">
+            <a:schemeClr val="accent1">
+              <a:shade val="50000"/>
+            </a:schemeClr>
+          </a:lnRef>
+          <a:fillRef idx="1">
+            <a:schemeClr val="accent1"/>
+          </a:fillRef>
+          <a:effectRef idx="0">
+            <a:schemeClr val="accent1"/>
+          </a:effectRef>
+          <a:fontRef idx="minor">
+            <a:schemeClr val="lt1"/>
+          </a:fontRef>
+        </p:style>
+        <p:txBody>
+          <a:bodyPr rtlCol="0" anchor="ctr"/>
+          <a:lstStyle/>
+          <a:p>
+            <a:pPr algn="ctr"/>
+            <a:r>
+              <a:rPr lang="en-GB" dirty="0"/>
+              <a:t>Player % Turn!</a:t>
+            </a:r>
+          </a:p>
+        </p:txBody>
+      </p:sp>
+      <p:sp>
+        <p:nvSpPr>
+          <p:cNvPr id="12" name="Rectangle 11">
+            <a:extLst>
+              <a:ext uri="{FF2B5EF4-FFF2-40B4-BE49-F238E27FC236}">
+                <a16:creationId xmlns:a16="http://schemas.microsoft.com/office/drawing/2014/main" id="{9E4C4BF7-0226-EC48-B0BE-3E7B762E2547}"/>
+              </a:ext>
+            </a:extLst>
+          </p:cNvPr>
+          <p:cNvSpPr/>
+          <p:nvPr/>
+        </p:nvSpPr>
+        <p:spPr>
+          <a:xfrm>
+            <a:off x="5830784" y="4001984"/>
+            <a:ext cx="5035138" cy="2048494"/>
+          </a:xfrm>
+          <a:prstGeom prst="rect">
+            <a:avLst/>
+          </a:prstGeom>
+        </p:spPr>
+        <p:style>
+          <a:lnRef idx="2">
+            <a:schemeClr val="accent3">
+              <a:shade val="50000"/>
+            </a:schemeClr>
+          </a:lnRef>
+          <a:fillRef idx="1">
+            <a:schemeClr val="accent3"/>
+          </a:fillRef>
+          <a:effectRef idx="0">
+            <a:schemeClr val="accent3"/>
+          </a:effectRef>
+          <a:fontRef idx="minor">
+            <a:schemeClr val="lt1"/>
+          </a:fontRef>
+        </p:style>
+        <p:txBody>
+          <a:bodyPr rtlCol="0" anchor="ctr"/>
+          <a:lstStyle/>
+          <a:p>
+            <a:r>
+              <a:rPr lang="en-GB" dirty="0"/>
+              <a:t>Score: P1 – 200 | P2 – 300</a:t>
+            </a:r>
+          </a:p>
+          <a:p>
+            <a:endParaRPr lang="en-GB" dirty="0"/>
+          </a:p>
+          <a:p>
+            <a:r>
+              <a:rPr lang="en-GB" dirty="0"/>
+              <a:t>Current Moves:</a:t>
+            </a:r>
+          </a:p>
+          <a:p>
+            <a:r>
+              <a:rPr lang="en-GB" dirty="0"/>
+              <a:t>P1:			P2:</a:t>
+            </a:r>
+          </a:p>
+          <a:p>
+            <a:pPr marL="342900" indent="-342900">
+              <a:buAutoNum type="arabicPeriod"/>
+            </a:pPr>
+            <a:r>
+              <a:rPr lang="en-GB" dirty="0"/>
+              <a:t>X, y			1. X, y</a:t>
+            </a:r>
+          </a:p>
+          <a:p>
+            <a:pPr marL="342900" indent="-342900">
+              <a:buAutoNum type="arabicPeriod"/>
+            </a:pPr>
+            <a:r>
+              <a:rPr lang="en-GB" dirty="0"/>
+              <a:t>X, y			2. X, y</a:t>
+            </a:r>
+          </a:p>
+          <a:p>
+            <a:pPr marL="342900" indent="-342900">
+              <a:buAutoNum type="arabicPeriod"/>
+            </a:pPr>
+            <a:r>
+              <a:rPr lang="en-GB" dirty="0"/>
+              <a:t>X, y			3. X, y</a:t>
+            </a:r>
+          </a:p>
+        </p:txBody>
+      </p:sp>
+    </p:spTree>
+    <p:extLst>
+      <p:ext uri="{BB962C8B-B14F-4D97-AF65-F5344CB8AC3E}">
+        <p14:creationId xmlns:p14="http://schemas.microsoft.com/office/powerpoint/2010/main" val="3114707091"/>
       </p:ext>
     </p:extLst>
   </p:cSld>
@@ -7114,554 +7024,6 @@
           <p:cNvPr id="2" name="Title 1">
             <a:extLst>
               <a:ext uri="{FF2B5EF4-FFF2-40B4-BE49-F238E27FC236}">
-                <a16:creationId xmlns:a16="http://schemas.microsoft.com/office/drawing/2014/main" id="{A3FDB8DA-7CB7-F441-A79C-0F19916E2479}"/>
-              </a:ext>
-            </a:extLst>
-          </p:cNvPr>
-          <p:cNvSpPr>
-            <a:spLocks noGrp="1"/>
-          </p:cNvSpPr>
-          <p:nvPr>
-            <p:ph type="title"/>
-          </p:nvPr>
-        </p:nvSpPr>
-        <p:spPr/>
-        <p:txBody>
-          <a:bodyPr/>
-          <a:lstStyle/>
-          <a:p>
-            <a:r>
-              <a:rPr lang="en-US" dirty="0"/>
-              <a:t>Game Screen</a:t>
-            </a:r>
-          </a:p>
-        </p:txBody>
-      </p:sp>
-      <p:sp>
-        <p:nvSpPr>
-          <p:cNvPr id="4" name="Rectangle 3">
-            <a:extLst>
-              <a:ext uri="{FF2B5EF4-FFF2-40B4-BE49-F238E27FC236}">
-                <a16:creationId xmlns:a16="http://schemas.microsoft.com/office/drawing/2014/main" id="{31CA961E-1293-A34C-B1E7-95744AF0B446}"/>
-              </a:ext>
-            </a:extLst>
-          </p:cNvPr>
-          <p:cNvSpPr/>
-          <p:nvPr/>
-        </p:nvSpPr>
-        <p:spPr>
-          <a:xfrm>
-            <a:off x="1233054" y="1690688"/>
-            <a:ext cx="9725891" cy="4833258"/>
-          </a:xfrm>
-          <a:prstGeom prst="rect">
-            <a:avLst/>
-          </a:prstGeom>
-          <a:solidFill>
-            <a:srgbClr val="2F5597"/>
-          </a:solidFill>
-        </p:spPr>
-        <p:style>
-          <a:lnRef idx="2">
-            <a:schemeClr val="accent1">
-              <a:shade val="50000"/>
-            </a:schemeClr>
-          </a:lnRef>
-          <a:fillRef idx="1">
-            <a:schemeClr val="accent1"/>
-          </a:fillRef>
-          <a:effectRef idx="0">
-            <a:schemeClr val="accent1"/>
-          </a:effectRef>
-          <a:fontRef idx="minor">
-            <a:schemeClr val="lt1"/>
-          </a:fontRef>
-        </p:style>
-        <p:txBody>
-          <a:bodyPr rtlCol="0" anchor="ctr"/>
-          <a:lstStyle/>
-          <a:p>
-            <a:pPr algn="ctr"/>
-            <a:endParaRPr lang="en-GB" b="1">
-              <a:ln w="22225">
-                <a:solidFill>
-                  <a:schemeClr val="accent2"/>
-                </a:solidFill>
-                <a:prstDash val="solid"/>
-              </a:ln>
-              <a:solidFill>
-                <a:schemeClr val="accent2">
-                  <a:lumMod val="40000"/>
-                  <a:lumOff val="60000"/>
-                </a:schemeClr>
-              </a:solidFill>
-            </a:endParaRPr>
-          </a:p>
-        </p:txBody>
-      </p:sp>
-      <p:sp>
-        <p:nvSpPr>
-          <p:cNvPr id="3" name="Rectangle 2">
-            <a:extLst>
-              <a:ext uri="{FF2B5EF4-FFF2-40B4-BE49-F238E27FC236}">
-                <a16:creationId xmlns:a16="http://schemas.microsoft.com/office/drawing/2014/main" id="{3E4BDA3D-0EA3-A742-89D8-E93A6FEED745}"/>
-              </a:ext>
-            </a:extLst>
-          </p:cNvPr>
-          <p:cNvSpPr/>
-          <p:nvPr/>
-        </p:nvSpPr>
-        <p:spPr>
-          <a:xfrm>
-            <a:off x="1318161" y="1775361"/>
-            <a:ext cx="9547761" cy="801584"/>
-          </a:xfrm>
-          <a:prstGeom prst="rect">
-            <a:avLst/>
-          </a:prstGeom>
-          <a:solidFill>
-            <a:srgbClr val="A5A5A5"/>
-          </a:solidFill>
-        </p:spPr>
-        <p:style>
-          <a:lnRef idx="2">
-            <a:schemeClr val="accent3">
-              <a:shade val="50000"/>
-            </a:schemeClr>
-          </a:lnRef>
-          <a:fillRef idx="1">
-            <a:schemeClr val="accent3"/>
-          </a:fillRef>
-          <a:effectRef idx="0">
-            <a:schemeClr val="accent3"/>
-          </a:effectRef>
-          <a:fontRef idx="minor">
-            <a:schemeClr val="lt1"/>
-          </a:fontRef>
-        </p:style>
-        <p:txBody>
-          <a:bodyPr rtlCol="0" anchor="ctr"/>
-          <a:lstStyle/>
-          <a:p>
-            <a:pPr algn="ctr"/>
-            <a:endParaRPr lang="en-GB"/>
-          </a:p>
-        </p:txBody>
-      </p:sp>
-      <p:sp>
-        <p:nvSpPr>
-          <p:cNvPr id="5" name="Rectangle 4">
-            <a:extLst>
-              <a:ext uri="{FF2B5EF4-FFF2-40B4-BE49-F238E27FC236}">
-                <a16:creationId xmlns:a16="http://schemas.microsoft.com/office/drawing/2014/main" id="{FC59767B-29C7-D84F-8909-8296DAE67931}"/>
-              </a:ext>
-            </a:extLst>
-          </p:cNvPr>
-          <p:cNvSpPr/>
-          <p:nvPr/>
-        </p:nvSpPr>
-        <p:spPr>
-          <a:xfrm>
-            <a:off x="5007901" y="1643762"/>
-            <a:ext cx="1992270" cy="923330"/>
-          </a:xfrm>
-          <a:prstGeom prst="rect">
-            <a:avLst/>
-          </a:prstGeom>
-          <a:noFill/>
-        </p:spPr>
-        <p:txBody>
-          <a:bodyPr wrap="square" lIns="91440" tIns="45720" rIns="91440" bIns="45720">
-            <a:spAutoFit/>
-          </a:bodyPr>
-          <a:lstStyle/>
-          <a:p>
-            <a:pPr algn="ctr"/>
-            <a:r>
-              <a:rPr lang="en-GB" sz="5400" b="1" dirty="0">
-                <a:ln w="12700" cmpd="sng">
-                  <a:solidFill>
-                    <a:srgbClr val="C4623E"/>
-                  </a:solidFill>
-                  <a:prstDash val="solid"/>
-                </a:ln>
-                <a:solidFill>
-                  <a:srgbClr val="C3C02C"/>
-                </a:solidFill>
-              </a:rPr>
-              <a:t>K-</a:t>
-            </a:r>
-          </a:p>
-        </p:txBody>
-      </p:sp>
-      <p:sp>
-        <p:nvSpPr>
-          <p:cNvPr id="6" name="Rectangle 5">
-            <a:extLst>
-              <a:ext uri="{FF2B5EF4-FFF2-40B4-BE49-F238E27FC236}">
-                <a16:creationId xmlns:a16="http://schemas.microsoft.com/office/drawing/2014/main" id="{43F74CAD-D9B8-9647-87FD-0765A2B43177}"/>
-              </a:ext>
-            </a:extLst>
-          </p:cNvPr>
-          <p:cNvSpPr/>
-          <p:nvPr/>
-        </p:nvSpPr>
-        <p:spPr>
-          <a:xfrm>
-            <a:off x="6150968" y="1653615"/>
-            <a:ext cx="2353529" cy="923330"/>
-          </a:xfrm>
-          <a:prstGeom prst="rect">
-            <a:avLst/>
-          </a:prstGeom>
-          <a:noFill/>
-        </p:spPr>
-        <p:txBody>
-          <a:bodyPr wrap="none" lIns="91440" tIns="45720" rIns="91440" bIns="45720">
-            <a:spAutoFit/>
-          </a:bodyPr>
-          <a:lstStyle/>
-          <a:p>
-            <a:pPr algn="ctr"/>
-            <a:r>
-              <a:rPr lang="en-GB" sz="5400" b="1" cap="none" spc="0" dirty="0">
-                <a:ln w="12700" cmpd="sng">
-                  <a:solidFill>
-                    <a:srgbClr val="6214C4"/>
-                  </a:solidFill>
-                  <a:prstDash val="solid"/>
-                </a:ln>
-                <a:solidFill>
-                  <a:srgbClr val="03C1A1"/>
-                </a:solidFill>
-                <a:effectLst/>
-              </a:rPr>
-              <a:t>Means!</a:t>
-            </a:r>
-          </a:p>
-        </p:txBody>
-      </p:sp>
-      <p:pic>
-        <p:nvPicPr>
-          <p:cNvPr id="8" name="Picture 7" descr="A screenshot of a cell phone&#10;&#10;Description automatically generated">
-            <a:extLst>
-              <a:ext uri="{FF2B5EF4-FFF2-40B4-BE49-F238E27FC236}">
-                <a16:creationId xmlns:a16="http://schemas.microsoft.com/office/drawing/2014/main" id="{D23C3B8A-E956-8745-BBC9-5A104EAB1BE5}"/>
-              </a:ext>
-            </a:extLst>
-          </p:cNvPr>
-          <p:cNvPicPr>
-            <a:picLocks noChangeAspect="1"/>
-          </p:cNvPicPr>
-          <p:nvPr/>
-        </p:nvPicPr>
-        <p:blipFill>
-          <a:blip r:embed="rId3"/>
-          <a:stretch>
-            <a:fillRect/>
-          </a:stretch>
-        </p:blipFill>
-        <p:spPr>
-          <a:xfrm>
-            <a:off x="1318161" y="2709595"/>
-            <a:ext cx="4370626" cy="2586800"/>
-          </a:xfrm>
-          <a:prstGeom prst="rect">
-            <a:avLst/>
-          </a:prstGeom>
-        </p:spPr>
-      </p:pic>
-      <p:sp>
-        <p:nvSpPr>
-          <p:cNvPr id="9" name="Rectangle 8">
-            <a:extLst>
-              <a:ext uri="{FF2B5EF4-FFF2-40B4-BE49-F238E27FC236}">
-                <a16:creationId xmlns:a16="http://schemas.microsoft.com/office/drawing/2014/main" id="{D85EFC7B-B6BF-CC4D-A607-D3D7344DFDCD}"/>
-              </a:ext>
-            </a:extLst>
-          </p:cNvPr>
-          <p:cNvSpPr/>
-          <p:nvPr/>
-        </p:nvSpPr>
-        <p:spPr>
-          <a:xfrm>
-            <a:off x="5830784" y="2709595"/>
-            <a:ext cx="5035138" cy="1203817"/>
-          </a:xfrm>
-          <a:prstGeom prst="rect">
-            <a:avLst/>
-          </a:prstGeom>
-          <a:solidFill>
-            <a:srgbClr val="C3C02C"/>
-          </a:solidFill>
-        </p:spPr>
-        <p:style>
-          <a:lnRef idx="2">
-            <a:schemeClr val="accent4">
-              <a:shade val="50000"/>
-            </a:schemeClr>
-          </a:lnRef>
-          <a:fillRef idx="1">
-            <a:schemeClr val="accent4"/>
-          </a:fillRef>
-          <a:effectRef idx="0">
-            <a:schemeClr val="accent4"/>
-          </a:effectRef>
-          <a:fontRef idx="minor">
-            <a:schemeClr val="lt1"/>
-          </a:fontRef>
-        </p:style>
-        <p:txBody>
-          <a:bodyPr rtlCol="0" anchor="ctr"/>
-          <a:lstStyle/>
-          <a:p>
-            <a:r>
-              <a:rPr lang="en-GB" dirty="0"/>
-              <a:t>Aim:</a:t>
-            </a:r>
-          </a:p>
-          <a:p>
-            <a:r>
-              <a:rPr lang="en-GB" dirty="0"/>
-              <a:t>You must complete the challenge – description here!</a:t>
-            </a:r>
-          </a:p>
-        </p:txBody>
-      </p:sp>
-      <p:sp>
-        <p:nvSpPr>
-          <p:cNvPr id="10" name="Rectangle 9">
-            <a:extLst>
-              <a:ext uri="{FF2B5EF4-FFF2-40B4-BE49-F238E27FC236}">
-                <a16:creationId xmlns:a16="http://schemas.microsoft.com/office/drawing/2014/main" id="{27D3B4CD-C78C-4540-A314-9ABCA26AED39}"/>
-              </a:ext>
-            </a:extLst>
-          </p:cNvPr>
-          <p:cNvSpPr/>
-          <p:nvPr/>
-        </p:nvSpPr>
-        <p:spPr>
-          <a:xfrm>
-            <a:off x="1318161" y="5795158"/>
-            <a:ext cx="4370626" cy="647206"/>
-          </a:xfrm>
-          <a:prstGeom prst="rect">
-            <a:avLst/>
-          </a:prstGeom>
-          <a:solidFill>
-            <a:srgbClr val="07C2A1"/>
-          </a:solidFill>
-        </p:spPr>
-        <p:style>
-          <a:lnRef idx="2">
-            <a:schemeClr val="accent1">
-              <a:shade val="50000"/>
-            </a:schemeClr>
-          </a:lnRef>
-          <a:fillRef idx="1">
-            <a:schemeClr val="accent1"/>
-          </a:fillRef>
-          <a:effectRef idx="0">
-            <a:schemeClr val="accent1"/>
-          </a:effectRef>
-          <a:fontRef idx="minor">
-            <a:schemeClr val="lt1"/>
-          </a:fontRef>
-        </p:style>
-        <p:txBody>
-          <a:bodyPr rtlCol="0" anchor="ctr"/>
-          <a:lstStyle/>
-          <a:p>
-            <a:r>
-              <a:rPr lang="en-GB" dirty="0"/>
-              <a:t>Tip:</a:t>
-            </a:r>
-          </a:p>
-          <a:p>
-            <a:r>
-              <a:rPr lang="en-GB" dirty="0"/>
-              <a:t>Tip of how the algorithm works.</a:t>
-            </a:r>
-          </a:p>
-        </p:txBody>
-      </p:sp>
-      <p:sp>
-        <p:nvSpPr>
-          <p:cNvPr id="11" name="Rectangle 10">
-            <a:extLst>
-              <a:ext uri="{FF2B5EF4-FFF2-40B4-BE49-F238E27FC236}">
-                <a16:creationId xmlns:a16="http://schemas.microsoft.com/office/drawing/2014/main" id="{A599C392-E5C4-8F4E-B9B2-F4EDFCB3FDFE}"/>
-              </a:ext>
-            </a:extLst>
-          </p:cNvPr>
-          <p:cNvSpPr/>
-          <p:nvPr/>
-        </p:nvSpPr>
-        <p:spPr>
-          <a:xfrm>
-            <a:off x="1318161" y="5333468"/>
-            <a:ext cx="4370626" cy="319187"/>
-          </a:xfrm>
-          <a:prstGeom prst="rect">
-            <a:avLst/>
-          </a:prstGeom>
-          <a:solidFill>
-            <a:srgbClr val="C00000"/>
-          </a:solidFill>
-        </p:spPr>
-        <p:style>
-          <a:lnRef idx="2">
-            <a:schemeClr val="accent1">
-              <a:shade val="50000"/>
-            </a:schemeClr>
-          </a:lnRef>
-          <a:fillRef idx="1">
-            <a:schemeClr val="accent1"/>
-          </a:fillRef>
-          <a:effectRef idx="0">
-            <a:schemeClr val="accent1"/>
-          </a:effectRef>
-          <a:fontRef idx="minor">
-            <a:schemeClr val="lt1"/>
-          </a:fontRef>
-        </p:style>
-        <p:txBody>
-          <a:bodyPr rtlCol="0" anchor="ctr"/>
-          <a:lstStyle/>
-          <a:p>
-            <a:pPr algn="ctr"/>
-            <a:r>
-              <a:rPr lang="en-GB" dirty="0"/>
-              <a:t>Player % Turn!</a:t>
-            </a:r>
-          </a:p>
-        </p:txBody>
-      </p:sp>
-      <p:sp>
-        <p:nvSpPr>
-          <p:cNvPr id="12" name="Rectangle 11">
-            <a:extLst>
-              <a:ext uri="{FF2B5EF4-FFF2-40B4-BE49-F238E27FC236}">
-                <a16:creationId xmlns:a16="http://schemas.microsoft.com/office/drawing/2014/main" id="{9E4C4BF7-0226-EC48-B0BE-3E7B762E2547}"/>
-              </a:ext>
-            </a:extLst>
-          </p:cNvPr>
-          <p:cNvSpPr/>
-          <p:nvPr/>
-        </p:nvSpPr>
-        <p:spPr>
-          <a:xfrm>
-            <a:off x="5830784" y="4001984"/>
-            <a:ext cx="5035138" cy="2048494"/>
-          </a:xfrm>
-          <a:prstGeom prst="rect">
-            <a:avLst/>
-          </a:prstGeom>
-        </p:spPr>
-        <p:style>
-          <a:lnRef idx="2">
-            <a:schemeClr val="accent3">
-              <a:shade val="50000"/>
-            </a:schemeClr>
-          </a:lnRef>
-          <a:fillRef idx="1">
-            <a:schemeClr val="accent3"/>
-          </a:fillRef>
-          <a:effectRef idx="0">
-            <a:schemeClr val="accent3"/>
-          </a:effectRef>
-          <a:fontRef idx="minor">
-            <a:schemeClr val="lt1"/>
-          </a:fontRef>
-        </p:style>
-        <p:txBody>
-          <a:bodyPr rtlCol="0" anchor="ctr"/>
-          <a:lstStyle/>
-          <a:p>
-            <a:r>
-              <a:rPr lang="en-GB" dirty="0"/>
-              <a:t>Score: P1 – 200 | P2 – 300</a:t>
-            </a:r>
-          </a:p>
-          <a:p>
-            <a:endParaRPr lang="en-GB" dirty="0"/>
-          </a:p>
-          <a:p>
-            <a:r>
-              <a:rPr lang="en-GB" dirty="0"/>
-              <a:t>Current Moves:</a:t>
-            </a:r>
-          </a:p>
-          <a:p>
-            <a:r>
-              <a:rPr lang="en-GB" dirty="0"/>
-              <a:t>P1:			P2:</a:t>
-            </a:r>
-          </a:p>
-          <a:p>
-            <a:pPr marL="342900" indent="-342900">
-              <a:buAutoNum type="arabicPeriod"/>
-            </a:pPr>
-            <a:r>
-              <a:rPr lang="en-GB" dirty="0"/>
-              <a:t>X, y			1. X, y</a:t>
-            </a:r>
-          </a:p>
-          <a:p>
-            <a:pPr marL="342900" indent="-342900">
-              <a:buAutoNum type="arabicPeriod"/>
-            </a:pPr>
-            <a:r>
-              <a:rPr lang="en-GB" dirty="0"/>
-              <a:t>X, y			2. X, y</a:t>
-            </a:r>
-          </a:p>
-          <a:p>
-            <a:pPr marL="342900" indent="-342900">
-              <a:buAutoNum type="arabicPeriod"/>
-            </a:pPr>
-            <a:r>
-              <a:rPr lang="en-GB" dirty="0"/>
-              <a:t>X, y			3. X, y</a:t>
-            </a:r>
-          </a:p>
-        </p:txBody>
-      </p:sp>
-    </p:spTree>
-    <p:extLst>
-      <p:ext uri="{BB962C8B-B14F-4D97-AF65-F5344CB8AC3E}">
-        <p14:creationId xmlns:p14="http://schemas.microsoft.com/office/powerpoint/2010/main" val="3114707091"/>
-      </p:ext>
-    </p:extLst>
-  </p:cSld>
-  <p:clrMapOvr>
-    <a:masterClrMapping/>
-  </p:clrMapOvr>
-</p:sld>
-</file>
-
-<file path=ppt/slides/slide8.xml><?xml version="1.0" encoding="utf-8"?>
-<p:sld xmlns:a="http://schemas.openxmlformats.org/drawingml/2006/main" xmlns:r="http://schemas.openxmlformats.org/officeDocument/2006/relationships" xmlns:p="http://schemas.openxmlformats.org/presentationml/2006/main">
-  <p:cSld>
-    <p:spTree>
-      <p:nvGrpSpPr>
-        <p:cNvPr id="1" name=""/>
-        <p:cNvGrpSpPr/>
-        <p:nvPr/>
-      </p:nvGrpSpPr>
-      <p:grpSpPr>
-        <a:xfrm>
-          <a:off x="0" y="0"/>
-          <a:ext cx="0" cy="0"/>
-          <a:chOff x="0" y="0"/>
-          <a:chExt cx="0" cy="0"/>
-        </a:xfrm>
-      </p:grpSpPr>
-      <p:sp>
-        <p:nvSpPr>
-          <p:cNvPr id="2" name="Title 1">
-            <a:extLst>
-              <a:ext uri="{FF2B5EF4-FFF2-40B4-BE49-F238E27FC236}">
                 <a16:creationId xmlns:a16="http://schemas.microsoft.com/office/drawing/2014/main" id="{7AC84AB0-860E-9248-AE86-4F7DF3735220}"/>
               </a:ext>
             </a:extLst>
@@ -8137,7 +7499,7 @@
 </p:sld>
 </file>
 
-<file path=ppt/slides/slide9.xml><?xml version="1.0" encoding="utf-8"?>
+<file path=ppt/slides/slide8.xml><?xml version="1.0" encoding="utf-8"?>
 <p:sld xmlns:a="http://schemas.openxmlformats.org/drawingml/2006/main" xmlns:r="http://schemas.openxmlformats.org/officeDocument/2006/relationships" xmlns:p="http://schemas.openxmlformats.org/presentationml/2006/main">
   <p:cSld>
     <p:spTree>
@@ -8748,6 +8110,653 @@
     <p:extLst>
       <p:ext uri="{BB962C8B-B14F-4D97-AF65-F5344CB8AC3E}">
         <p14:creationId xmlns:p14="http://schemas.microsoft.com/office/powerpoint/2010/main" val="4273153526"/>
+      </p:ext>
+    </p:extLst>
+  </p:cSld>
+  <p:clrMapOvr>
+    <a:masterClrMapping/>
+  </p:clrMapOvr>
+</p:sld>
+</file>
+
+<file path=ppt/slides/slide9.xml><?xml version="1.0" encoding="utf-8"?>
+<p:sld xmlns:a="http://schemas.openxmlformats.org/drawingml/2006/main" xmlns:r="http://schemas.openxmlformats.org/officeDocument/2006/relationships" xmlns:p="http://schemas.openxmlformats.org/presentationml/2006/main">
+  <p:cSld>
+    <p:spTree>
+      <p:nvGrpSpPr>
+        <p:cNvPr id="1" name=""/>
+        <p:cNvGrpSpPr/>
+        <p:nvPr/>
+      </p:nvGrpSpPr>
+      <p:grpSpPr>
+        <a:xfrm>
+          <a:off x="0" y="0"/>
+          <a:ext cx="0" cy="0"/>
+          <a:chOff x="0" y="0"/>
+          <a:chExt cx="0" cy="0"/>
+        </a:xfrm>
+      </p:grpSpPr>
+      <p:sp>
+        <p:nvSpPr>
+          <p:cNvPr id="2" name="Title 1">
+            <a:extLst>
+              <a:ext uri="{FF2B5EF4-FFF2-40B4-BE49-F238E27FC236}">
+                <a16:creationId xmlns:a16="http://schemas.microsoft.com/office/drawing/2014/main" id="{D990EE0B-FF66-4341-A99A-29C5674D01B1}"/>
+              </a:ext>
+            </a:extLst>
+          </p:cNvPr>
+          <p:cNvSpPr>
+            <a:spLocks noGrp="1"/>
+          </p:cNvSpPr>
+          <p:nvPr>
+            <p:ph type="title"/>
+          </p:nvPr>
+        </p:nvSpPr>
+        <p:spPr/>
+        <p:txBody>
+          <a:bodyPr/>
+          <a:lstStyle/>
+          <a:p>
+            <a:r>
+              <a:rPr lang="en-US" dirty="0"/>
+              <a:t>Free Play Area</a:t>
+            </a:r>
+          </a:p>
+        </p:txBody>
+      </p:sp>
+      <p:sp>
+        <p:nvSpPr>
+          <p:cNvPr id="4" name="Rectangle 3">
+            <a:extLst>
+              <a:ext uri="{FF2B5EF4-FFF2-40B4-BE49-F238E27FC236}">
+                <a16:creationId xmlns:a16="http://schemas.microsoft.com/office/drawing/2014/main" id="{AE699655-BFBD-6B4A-B89D-E5AB7E2DBB4B}"/>
+              </a:ext>
+            </a:extLst>
+          </p:cNvPr>
+          <p:cNvSpPr/>
+          <p:nvPr/>
+        </p:nvSpPr>
+        <p:spPr>
+          <a:xfrm>
+            <a:off x="1233054" y="1690688"/>
+            <a:ext cx="9725891" cy="4833258"/>
+          </a:xfrm>
+          <a:prstGeom prst="rect">
+            <a:avLst/>
+          </a:prstGeom>
+          <a:solidFill>
+            <a:schemeClr val="accent1">
+              <a:lumMod val="75000"/>
+            </a:schemeClr>
+          </a:solidFill>
+          <a:ln>
+            <a:solidFill>
+              <a:schemeClr val="accent1">
+                <a:lumMod val="75000"/>
+              </a:schemeClr>
+            </a:solidFill>
+          </a:ln>
+        </p:spPr>
+        <p:style>
+          <a:lnRef idx="2">
+            <a:schemeClr val="accent1">
+              <a:shade val="50000"/>
+            </a:schemeClr>
+          </a:lnRef>
+          <a:fillRef idx="1">
+            <a:schemeClr val="accent1"/>
+          </a:fillRef>
+          <a:effectRef idx="0">
+            <a:schemeClr val="accent1"/>
+          </a:effectRef>
+          <a:fontRef idx="minor">
+            <a:schemeClr val="lt1"/>
+          </a:fontRef>
+        </p:style>
+        <p:txBody>
+          <a:bodyPr rtlCol="0" anchor="ctr"/>
+          <a:lstStyle/>
+          <a:p>
+            <a:pPr algn="ctr"/>
+            <a:endParaRPr lang="en-GB" b="1">
+              <a:ln w="22225">
+                <a:solidFill>
+                  <a:schemeClr val="accent2"/>
+                </a:solidFill>
+                <a:prstDash val="solid"/>
+              </a:ln>
+              <a:solidFill>
+                <a:schemeClr val="accent2">
+                  <a:lumMod val="40000"/>
+                  <a:lumOff val="60000"/>
+                </a:schemeClr>
+              </a:solidFill>
+            </a:endParaRPr>
+          </a:p>
+        </p:txBody>
+      </p:sp>
+      <p:sp>
+        <p:nvSpPr>
+          <p:cNvPr id="3" name="Rectangle 2">
+            <a:extLst>
+              <a:ext uri="{FF2B5EF4-FFF2-40B4-BE49-F238E27FC236}">
+                <a16:creationId xmlns:a16="http://schemas.microsoft.com/office/drawing/2014/main" id="{A0D8486E-39F7-9642-8379-ED365262BA53}"/>
+              </a:ext>
+            </a:extLst>
+          </p:cNvPr>
+          <p:cNvSpPr/>
+          <p:nvPr/>
+        </p:nvSpPr>
+        <p:spPr>
+          <a:xfrm>
+            <a:off x="1440493" y="2091847"/>
+            <a:ext cx="4265112" cy="2386208"/>
+          </a:xfrm>
+          <a:prstGeom prst="rect">
+            <a:avLst/>
+          </a:prstGeom>
+          <a:solidFill>
+            <a:schemeClr val="bg2">
+              <a:lumMod val="75000"/>
+            </a:schemeClr>
+          </a:solidFill>
+        </p:spPr>
+        <p:style>
+          <a:lnRef idx="2">
+            <a:schemeClr val="accent1">
+              <a:shade val="50000"/>
+            </a:schemeClr>
+          </a:lnRef>
+          <a:fillRef idx="1">
+            <a:schemeClr val="accent1"/>
+          </a:fillRef>
+          <a:effectRef idx="0">
+            <a:schemeClr val="accent1"/>
+          </a:effectRef>
+          <a:fontRef idx="minor">
+            <a:schemeClr val="lt1"/>
+          </a:fontRef>
+        </p:style>
+        <p:txBody>
+          <a:bodyPr rtlCol="0" anchor="ctr"/>
+          <a:lstStyle/>
+          <a:p>
+            <a:pPr algn="ctr"/>
+            <a:r>
+              <a:rPr lang="en-GB" dirty="0"/>
+              <a:t>Model/ Interaction Area</a:t>
+            </a:r>
+          </a:p>
+        </p:txBody>
+      </p:sp>
+      <p:sp>
+        <p:nvSpPr>
+          <p:cNvPr id="5" name="TextBox 4">
+            <a:extLst>
+              <a:ext uri="{FF2B5EF4-FFF2-40B4-BE49-F238E27FC236}">
+                <a16:creationId xmlns:a16="http://schemas.microsoft.com/office/drawing/2014/main" id="{02680A0B-7899-EA45-8783-6A222BB1B468}"/>
+              </a:ext>
+            </a:extLst>
+          </p:cNvPr>
+          <p:cNvSpPr txBox="1"/>
+          <p:nvPr/>
+        </p:nvSpPr>
+        <p:spPr>
+          <a:xfrm>
+            <a:off x="5987441" y="2116899"/>
+            <a:ext cx="4597052" cy="1477328"/>
+          </a:xfrm>
+          <a:prstGeom prst="rect">
+            <a:avLst/>
+          </a:prstGeom>
+          <a:noFill/>
+        </p:spPr>
+        <p:txBody>
+          <a:bodyPr wrap="square" rtlCol="0">
+            <a:spAutoFit/>
+          </a:bodyPr>
+          <a:lstStyle/>
+          <a:p>
+            <a:r>
+              <a:rPr lang="en-GB" dirty="0">
+                <a:solidFill>
+                  <a:schemeClr val="bg1"/>
+                </a:solidFill>
+              </a:rPr>
+              <a:t>Model: [Name] </a:t>
+            </a:r>
+          </a:p>
+          <a:p>
+            <a:endParaRPr lang="en-GB" dirty="0">
+              <a:solidFill>
+                <a:schemeClr val="bg1"/>
+              </a:solidFill>
+            </a:endParaRPr>
+          </a:p>
+          <a:p>
+            <a:r>
+              <a:rPr lang="en-GB" dirty="0">
+                <a:solidFill>
+                  <a:schemeClr val="bg1"/>
+                </a:solidFill>
+              </a:rPr>
+              <a:t>Learning Type: [Supervised/ Unsupervised]</a:t>
+            </a:r>
+          </a:p>
+          <a:p>
+            <a:endParaRPr lang="en-GB" dirty="0">
+              <a:solidFill>
+                <a:schemeClr val="bg1"/>
+              </a:solidFill>
+            </a:endParaRPr>
+          </a:p>
+          <a:p>
+            <a:r>
+              <a:rPr lang="en-GB" dirty="0">
+                <a:solidFill>
+                  <a:schemeClr val="bg1"/>
+                </a:solidFill>
+              </a:rPr>
+              <a:t>Overview: [Brief overview of the model]</a:t>
+            </a:r>
+          </a:p>
+        </p:txBody>
+      </p:sp>
+      <p:sp>
+        <p:nvSpPr>
+          <p:cNvPr id="6" name="Rectangle 5">
+            <a:extLst>
+              <a:ext uri="{FF2B5EF4-FFF2-40B4-BE49-F238E27FC236}">
+                <a16:creationId xmlns:a16="http://schemas.microsoft.com/office/drawing/2014/main" id="{C68B7AD0-0961-DA41-81F4-5646B8F71C77}"/>
+              </a:ext>
+            </a:extLst>
+          </p:cNvPr>
+          <p:cNvSpPr/>
+          <p:nvPr/>
+        </p:nvSpPr>
+        <p:spPr>
+          <a:xfrm>
+            <a:off x="1440493" y="4603315"/>
+            <a:ext cx="9388258" cy="1841326"/>
+          </a:xfrm>
+          <a:prstGeom prst="rect">
+            <a:avLst/>
+          </a:prstGeom>
+          <a:solidFill>
+            <a:schemeClr val="accent5">
+              <a:lumMod val="60000"/>
+              <a:lumOff val="40000"/>
+            </a:schemeClr>
+          </a:solidFill>
+        </p:spPr>
+        <p:style>
+          <a:lnRef idx="2">
+            <a:schemeClr val="accent1">
+              <a:shade val="50000"/>
+            </a:schemeClr>
+          </a:lnRef>
+          <a:fillRef idx="1">
+            <a:schemeClr val="accent1"/>
+          </a:fillRef>
+          <a:effectRef idx="0">
+            <a:schemeClr val="accent1"/>
+          </a:effectRef>
+          <a:fontRef idx="minor">
+            <a:schemeClr val="lt1"/>
+          </a:fontRef>
+        </p:style>
+        <p:txBody>
+          <a:bodyPr rtlCol="0" anchor="ctr"/>
+          <a:lstStyle/>
+          <a:p>
+            <a:pPr algn="ctr"/>
+            <a:endParaRPr lang="en-GB" dirty="0"/>
+          </a:p>
+        </p:txBody>
+      </p:sp>
+      <p:grpSp>
+        <p:nvGrpSpPr>
+          <p:cNvPr id="21" name="Group 20">
+            <a:extLst>
+              <a:ext uri="{FF2B5EF4-FFF2-40B4-BE49-F238E27FC236}">
+                <a16:creationId xmlns:a16="http://schemas.microsoft.com/office/drawing/2014/main" id="{90C3EB00-BCD7-CB45-85B0-F92D9E2FD51A}"/>
+              </a:ext>
+            </a:extLst>
+          </p:cNvPr>
+          <p:cNvGrpSpPr/>
+          <p:nvPr/>
+        </p:nvGrpSpPr>
+        <p:grpSpPr>
+          <a:xfrm>
+            <a:off x="10256729" y="5339951"/>
+            <a:ext cx="494778" cy="1041385"/>
+            <a:chOff x="10256729" y="4688597"/>
+            <a:chExt cx="494778" cy="1041385"/>
+          </a:xfrm>
+        </p:grpSpPr>
+        <p:grpSp>
+          <p:nvGrpSpPr>
+            <p:cNvPr id="13" name="Group 12">
+              <a:extLst>
+                <a:ext uri="{FF2B5EF4-FFF2-40B4-BE49-F238E27FC236}">
+                  <a16:creationId xmlns:a16="http://schemas.microsoft.com/office/drawing/2014/main" id="{BD9D634E-A2B0-4045-B893-EF1891625EF3}"/>
+                </a:ext>
+              </a:extLst>
+            </p:cNvPr>
+            <p:cNvGrpSpPr/>
+            <p:nvPr/>
+          </p:nvGrpSpPr>
+          <p:grpSpPr>
+            <a:xfrm>
+              <a:off x="10256729" y="5434806"/>
+              <a:ext cx="494778" cy="295176"/>
+              <a:chOff x="5122859" y="6116564"/>
+              <a:chExt cx="494778" cy="295176"/>
+            </a:xfrm>
+          </p:grpSpPr>
+          <p:sp>
+            <p:nvSpPr>
+              <p:cNvPr id="14" name="Rounded Rectangle 13">
+                <a:extLst>
+                  <a:ext uri="{FF2B5EF4-FFF2-40B4-BE49-F238E27FC236}">
+                    <a16:creationId xmlns:a16="http://schemas.microsoft.com/office/drawing/2014/main" id="{8F2E4D8C-2AF9-134E-947B-E79997CF652E}"/>
+                  </a:ext>
+                </a:extLst>
+              </p:cNvPr>
+              <p:cNvSpPr/>
+              <p:nvPr/>
+            </p:nvSpPr>
+            <p:spPr>
+              <a:xfrm>
+                <a:off x="5122859" y="6116564"/>
+                <a:ext cx="494778" cy="295176"/>
+              </a:xfrm>
+              <a:prstGeom prst="roundRect">
+                <a:avLst/>
+              </a:prstGeom>
+              <a:solidFill>
+                <a:srgbClr val="07C2A1"/>
+              </a:solidFill>
+            </p:spPr>
+            <p:style>
+              <a:lnRef idx="2">
+                <a:schemeClr val="accent1">
+                  <a:shade val="50000"/>
+                </a:schemeClr>
+              </a:lnRef>
+              <a:fillRef idx="1">
+                <a:schemeClr val="accent1"/>
+              </a:fillRef>
+              <a:effectRef idx="0">
+                <a:schemeClr val="accent1"/>
+              </a:effectRef>
+              <a:fontRef idx="minor">
+                <a:schemeClr val="lt1"/>
+              </a:fontRef>
+            </p:style>
+            <p:txBody>
+              <a:bodyPr rtlCol="0" anchor="ctr"/>
+              <a:lstStyle/>
+              <a:p>
+                <a:pPr algn="ctr"/>
+                <a:endParaRPr lang="en-GB"/>
+              </a:p>
+            </p:txBody>
+          </p:sp>
+          <p:pic>
+            <p:nvPicPr>
+              <p:cNvPr id="15" name="Graphic 14">
+                <a:extLst>
+                  <a:ext uri="{FF2B5EF4-FFF2-40B4-BE49-F238E27FC236}">
+                    <a16:creationId xmlns:a16="http://schemas.microsoft.com/office/drawing/2014/main" id="{AD931E40-A3F3-6944-8412-C4D1E131D2E0}"/>
+                  </a:ext>
+                </a:extLst>
+              </p:cNvPr>
+              <p:cNvPicPr>
+                <a:picLocks noChangeAspect="1"/>
+              </p:cNvPicPr>
+              <p:nvPr/>
+            </p:nvPicPr>
+            <p:blipFill>
+              <a:blip r:embed="rId2">
+                <a:extLst>
+                  <a:ext uri="{96DAC541-7B7A-43D3-8B79-37D633B846F1}">
+                    <asvg:svgBlip xmlns:asvg="http://schemas.microsoft.com/office/drawing/2016/SVG/main" r:embed="rId3"/>
+                  </a:ext>
+                </a:extLst>
+              </a:blip>
+              <a:stretch>
+                <a:fillRect/>
+              </a:stretch>
+            </p:blipFill>
+            <p:spPr>
+              <a:xfrm>
+                <a:off x="5238448" y="6146996"/>
+                <a:ext cx="263600" cy="234311"/>
+              </a:xfrm>
+              <a:prstGeom prst="rect">
+                <a:avLst/>
+              </a:prstGeom>
+            </p:spPr>
+          </p:pic>
+        </p:grpSp>
+        <p:grpSp>
+          <p:nvGrpSpPr>
+            <p:cNvPr id="20" name="Group 19">
+              <a:extLst>
+                <a:ext uri="{FF2B5EF4-FFF2-40B4-BE49-F238E27FC236}">
+                  <a16:creationId xmlns:a16="http://schemas.microsoft.com/office/drawing/2014/main" id="{501F6700-AEE9-924E-80B7-E39BF9151F9C}"/>
+                </a:ext>
+              </a:extLst>
+            </p:cNvPr>
+            <p:cNvGrpSpPr/>
+            <p:nvPr/>
+          </p:nvGrpSpPr>
+          <p:grpSpPr>
+            <a:xfrm>
+              <a:off x="10256729" y="4688597"/>
+              <a:ext cx="494778" cy="295176"/>
+              <a:chOff x="10256729" y="4688597"/>
+              <a:chExt cx="494778" cy="295176"/>
+            </a:xfrm>
+          </p:grpSpPr>
+          <p:sp>
+            <p:nvSpPr>
+              <p:cNvPr id="8" name="Rounded Rectangle 7">
+                <a:extLst>
+                  <a:ext uri="{FF2B5EF4-FFF2-40B4-BE49-F238E27FC236}">
+                    <a16:creationId xmlns:a16="http://schemas.microsoft.com/office/drawing/2014/main" id="{F7EC5FCA-F743-374C-BC2E-F249C222A328}"/>
+                  </a:ext>
+                </a:extLst>
+              </p:cNvPr>
+              <p:cNvSpPr/>
+              <p:nvPr/>
+            </p:nvSpPr>
+            <p:spPr>
+              <a:xfrm>
+                <a:off x="10256729" y="4688597"/>
+                <a:ext cx="494778" cy="295176"/>
+              </a:xfrm>
+              <a:prstGeom prst="roundRect">
+                <a:avLst/>
+              </a:prstGeom>
+              <a:solidFill>
+                <a:srgbClr val="07C2A1"/>
+              </a:solidFill>
+            </p:spPr>
+            <p:style>
+              <a:lnRef idx="2">
+                <a:schemeClr val="accent1">
+                  <a:shade val="50000"/>
+                </a:schemeClr>
+              </a:lnRef>
+              <a:fillRef idx="1">
+                <a:schemeClr val="accent1"/>
+              </a:fillRef>
+              <a:effectRef idx="0">
+                <a:schemeClr val="accent1"/>
+              </a:effectRef>
+              <a:fontRef idx="minor">
+                <a:schemeClr val="lt1"/>
+              </a:fontRef>
+            </p:style>
+            <p:txBody>
+              <a:bodyPr rtlCol="0" anchor="ctr"/>
+              <a:lstStyle/>
+              <a:p>
+                <a:pPr algn="ctr"/>
+                <a:endParaRPr lang="en-GB"/>
+              </a:p>
+            </p:txBody>
+          </p:sp>
+          <p:pic>
+            <p:nvPicPr>
+              <p:cNvPr id="16" name="Graphic 15">
+                <a:extLst>
+                  <a:ext uri="{FF2B5EF4-FFF2-40B4-BE49-F238E27FC236}">
+                    <a16:creationId xmlns:a16="http://schemas.microsoft.com/office/drawing/2014/main" id="{1C7636F9-16FA-8A43-9FFE-C9E21DBAD6A7}"/>
+                  </a:ext>
+                </a:extLst>
+              </p:cNvPr>
+              <p:cNvPicPr>
+                <a:picLocks noChangeAspect="1"/>
+              </p:cNvPicPr>
+              <p:nvPr/>
+            </p:nvPicPr>
+            <p:blipFill>
+              <a:blip r:embed="rId4">
+                <a:extLst>
+                  <a:ext uri="{96DAC541-7B7A-43D3-8B79-37D633B846F1}">
+                    <asvg:svgBlip xmlns:asvg="http://schemas.microsoft.com/office/drawing/2016/SVG/main" r:embed="rId5"/>
+                  </a:ext>
+                </a:extLst>
+              </a:blip>
+              <a:stretch>
+                <a:fillRect/>
+              </a:stretch>
+            </p:blipFill>
+            <p:spPr>
+              <a:xfrm>
+                <a:off x="10386962" y="4726383"/>
+                <a:ext cx="234311" cy="234311"/>
+              </a:xfrm>
+              <a:prstGeom prst="rect">
+                <a:avLst/>
+              </a:prstGeom>
+            </p:spPr>
+          </p:pic>
+        </p:grpSp>
+        <p:grpSp>
+          <p:nvGrpSpPr>
+            <p:cNvPr id="19" name="Group 18">
+              <a:extLst>
+                <a:ext uri="{FF2B5EF4-FFF2-40B4-BE49-F238E27FC236}">
+                  <a16:creationId xmlns:a16="http://schemas.microsoft.com/office/drawing/2014/main" id="{6AE86527-E93C-ED4E-BF7D-7842D8D56345}"/>
+                </a:ext>
+              </a:extLst>
+            </p:cNvPr>
+            <p:cNvGrpSpPr/>
+            <p:nvPr/>
+          </p:nvGrpSpPr>
+          <p:grpSpPr>
+            <a:xfrm>
+              <a:off x="10256729" y="5062088"/>
+              <a:ext cx="494778" cy="295176"/>
+              <a:chOff x="10256729" y="5062088"/>
+              <a:chExt cx="494778" cy="295176"/>
+            </a:xfrm>
+          </p:grpSpPr>
+          <p:sp>
+            <p:nvSpPr>
+              <p:cNvPr id="11" name="Rounded Rectangle 10">
+                <a:extLst>
+                  <a:ext uri="{FF2B5EF4-FFF2-40B4-BE49-F238E27FC236}">
+                    <a16:creationId xmlns:a16="http://schemas.microsoft.com/office/drawing/2014/main" id="{CDED5D3F-E7D8-5041-89F0-69A8918080F3}"/>
+                  </a:ext>
+                </a:extLst>
+              </p:cNvPr>
+              <p:cNvSpPr/>
+              <p:nvPr/>
+            </p:nvSpPr>
+            <p:spPr>
+              <a:xfrm>
+                <a:off x="10256729" y="5062088"/>
+                <a:ext cx="494778" cy="295176"/>
+              </a:xfrm>
+              <a:prstGeom prst="roundRect">
+                <a:avLst/>
+              </a:prstGeom>
+              <a:solidFill>
+                <a:srgbClr val="07C2A1"/>
+              </a:solidFill>
+            </p:spPr>
+            <p:style>
+              <a:lnRef idx="2">
+                <a:schemeClr val="accent1">
+                  <a:shade val="50000"/>
+                </a:schemeClr>
+              </a:lnRef>
+              <a:fillRef idx="1">
+                <a:schemeClr val="accent1"/>
+              </a:fillRef>
+              <a:effectRef idx="0">
+                <a:schemeClr val="accent1"/>
+              </a:effectRef>
+              <a:fontRef idx="minor">
+                <a:schemeClr val="lt1"/>
+              </a:fontRef>
+            </p:style>
+            <p:txBody>
+              <a:bodyPr rtlCol="0" anchor="ctr"/>
+              <a:lstStyle/>
+              <a:p>
+                <a:pPr algn="ctr"/>
+                <a:endParaRPr lang="en-GB"/>
+              </a:p>
+            </p:txBody>
+          </p:sp>
+          <p:pic>
+            <p:nvPicPr>
+              <p:cNvPr id="18" name="Graphic 17">
+                <a:extLst>
+                  <a:ext uri="{FF2B5EF4-FFF2-40B4-BE49-F238E27FC236}">
+                    <a16:creationId xmlns:a16="http://schemas.microsoft.com/office/drawing/2014/main" id="{6A71FEC6-2A97-D743-AD0F-6F64CE775C6E}"/>
+                  </a:ext>
+                </a:extLst>
+              </p:cNvPr>
+              <p:cNvPicPr>
+                <a:picLocks noChangeAspect="1"/>
+              </p:cNvPicPr>
+              <p:nvPr/>
+            </p:nvPicPr>
+            <p:blipFill>
+              <a:blip r:embed="rId6">
+                <a:extLst>
+                  <a:ext uri="{96DAC541-7B7A-43D3-8B79-37D633B846F1}">
+                    <asvg:svgBlip xmlns:asvg="http://schemas.microsoft.com/office/drawing/2016/SVG/main" r:embed="rId7"/>
+                  </a:ext>
+                </a:extLst>
+              </a:blip>
+              <a:stretch>
+                <a:fillRect/>
+              </a:stretch>
+            </p:blipFill>
+            <p:spPr>
+              <a:xfrm>
+                <a:off x="10392750" y="5095290"/>
+                <a:ext cx="222733" cy="222733"/>
+              </a:xfrm>
+              <a:prstGeom prst="rect">
+                <a:avLst/>
+              </a:prstGeom>
+            </p:spPr>
+          </p:pic>
+        </p:grpSp>
+      </p:grpSp>
+    </p:spTree>
+    <p:extLst>
+      <p:ext uri="{BB962C8B-B14F-4D97-AF65-F5344CB8AC3E}">
+        <p14:creationId xmlns:p14="http://schemas.microsoft.com/office/powerpoint/2010/main" val="4262892557"/>
       </p:ext>
     </p:extLst>
   </p:cSld>

</xml_diff>

<commit_message>
Matplotlib embedded into PYQT5 window.
</commit_message>
<xml_diff>
--- a/Additional Content/App Storyboard.pptx
+++ b/Additional Content/App Storyboard.pptx
@@ -208,7 +208,7 @@
           <a:p>
             <a:fld id="{DBC94D5E-0C08-6A4E-9EE5-1EAFAD773097}" type="datetimeFigureOut">
               <a:rPr lang="en-GB" smtClean="0"/>
-              <a:t>06/07/2020</a:t>
+              <a:t>09/07/2020</a:t>
             </a:fld>
             <a:endParaRPr lang="en-GB"/>
           </a:p>
@@ -798,7 +798,7 @@
           <a:p>
             <a:fld id="{FE643DE3-4F0B-9F47-9FDB-A8115BD25AA4}" type="datetimeFigureOut">
               <a:rPr lang="en-US" smtClean="0"/>
-              <a:t>7/6/20</a:t>
+              <a:t>7/9/20</a:t>
             </a:fld>
             <a:endParaRPr lang="en-US"/>
           </a:p>
@@ -998,7 +998,7 @@
           <a:p>
             <a:fld id="{FE643DE3-4F0B-9F47-9FDB-A8115BD25AA4}" type="datetimeFigureOut">
               <a:rPr lang="en-US" smtClean="0"/>
-              <a:t>7/6/20</a:t>
+              <a:t>7/9/20</a:t>
             </a:fld>
             <a:endParaRPr lang="en-US"/>
           </a:p>
@@ -1208,7 +1208,7 @@
           <a:p>
             <a:fld id="{FE643DE3-4F0B-9F47-9FDB-A8115BD25AA4}" type="datetimeFigureOut">
               <a:rPr lang="en-US" smtClean="0"/>
-              <a:t>7/6/20</a:t>
+              <a:t>7/9/20</a:t>
             </a:fld>
             <a:endParaRPr lang="en-US"/>
           </a:p>
@@ -1408,7 +1408,7 @@
           <a:p>
             <a:fld id="{FE643DE3-4F0B-9F47-9FDB-A8115BD25AA4}" type="datetimeFigureOut">
               <a:rPr lang="en-US" smtClean="0"/>
-              <a:t>7/6/20</a:t>
+              <a:t>7/9/20</a:t>
             </a:fld>
             <a:endParaRPr lang="en-US"/>
           </a:p>
@@ -1684,7 +1684,7 @@
           <a:p>
             <a:fld id="{FE643DE3-4F0B-9F47-9FDB-A8115BD25AA4}" type="datetimeFigureOut">
               <a:rPr lang="en-US" smtClean="0"/>
-              <a:t>7/6/20</a:t>
+              <a:t>7/9/20</a:t>
             </a:fld>
             <a:endParaRPr lang="en-US"/>
           </a:p>
@@ -1952,7 +1952,7 @@
           <a:p>
             <a:fld id="{FE643DE3-4F0B-9F47-9FDB-A8115BD25AA4}" type="datetimeFigureOut">
               <a:rPr lang="en-US" smtClean="0"/>
-              <a:t>7/6/20</a:t>
+              <a:t>7/9/20</a:t>
             </a:fld>
             <a:endParaRPr lang="en-US"/>
           </a:p>
@@ -2367,7 +2367,7 @@
           <a:p>
             <a:fld id="{FE643DE3-4F0B-9F47-9FDB-A8115BD25AA4}" type="datetimeFigureOut">
               <a:rPr lang="en-US" smtClean="0"/>
-              <a:t>7/6/20</a:t>
+              <a:t>7/9/20</a:t>
             </a:fld>
             <a:endParaRPr lang="en-US"/>
           </a:p>
@@ -2509,7 +2509,7 @@
           <a:p>
             <a:fld id="{FE643DE3-4F0B-9F47-9FDB-A8115BD25AA4}" type="datetimeFigureOut">
               <a:rPr lang="en-US" smtClean="0"/>
-              <a:t>7/6/20</a:t>
+              <a:t>7/9/20</a:t>
             </a:fld>
             <a:endParaRPr lang="en-US"/>
           </a:p>
@@ -2622,7 +2622,7 @@
           <a:p>
             <a:fld id="{FE643DE3-4F0B-9F47-9FDB-A8115BD25AA4}" type="datetimeFigureOut">
               <a:rPr lang="en-US" smtClean="0"/>
-              <a:t>7/6/20</a:t>
+              <a:t>7/9/20</a:t>
             </a:fld>
             <a:endParaRPr lang="en-US"/>
           </a:p>
@@ -2935,7 +2935,7 @@
           <a:p>
             <a:fld id="{FE643DE3-4F0B-9F47-9FDB-A8115BD25AA4}" type="datetimeFigureOut">
               <a:rPr lang="en-US" smtClean="0"/>
-              <a:t>7/6/20</a:t>
+              <a:t>7/9/20</a:t>
             </a:fld>
             <a:endParaRPr lang="en-US"/>
           </a:p>
@@ -3224,7 +3224,7 @@
           <a:p>
             <a:fld id="{FE643DE3-4F0B-9F47-9FDB-A8115BD25AA4}" type="datetimeFigureOut">
               <a:rPr lang="en-US" smtClean="0"/>
-              <a:t>7/6/20</a:t>
+              <a:t>7/9/20</a:t>
             </a:fld>
             <a:endParaRPr lang="en-US"/>
           </a:p>
@@ -3467,7 +3467,7 @@
           <a:p>
             <a:fld id="{FE643DE3-4F0B-9F47-9FDB-A8115BD25AA4}" type="datetimeFigureOut">
               <a:rPr lang="en-US" smtClean="0"/>
-              <a:t>7/6/20</a:t>
+              <a:t>7/9/20</a:t>
             </a:fld>
             <a:endParaRPr lang="en-US"/>
           </a:p>
@@ -4665,7 +4665,7 @@
         </p:nvSpPr>
         <p:spPr>
           <a:xfrm>
-            <a:off x="1230155" y="3244478"/>
+            <a:off x="1257789" y="1742644"/>
             <a:ext cx="9547761" cy="801584"/>
           </a:xfrm>
           <a:prstGeom prst="rect">
@@ -4714,7 +4714,7 @@
         </p:nvSpPr>
         <p:spPr>
           <a:xfrm>
-            <a:off x="5007901" y="1643762"/>
+            <a:off x="1707659" y="1638732"/>
             <a:ext cx="1992270" cy="923330"/>
           </a:xfrm>
           <a:prstGeom prst="rect">
@@ -4741,7 +4741,7 @@
                   <a:srgbClr val="C3C02C"/>
                 </a:solidFill>
               </a:rPr>
-              <a:t>Q</a:t>
+              <a:t>What</a:t>
             </a:r>
           </a:p>
         </p:txBody>
@@ -4760,8 +4760,8 @@
         </p:nvSpPr>
         <p:spPr>
           <a:xfrm>
-            <a:off x="6166804" y="1638732"/>
-            <a:ext cx="1228221" cy="923330"/>
+            <a:off x="3503474" y="1638732"/>
+            <a:ext cx="6250430" cy="923330"/>
           </a:xfrm>
           <a:prstGeom prst="rect">
             <a:avLst/>
@@ -4776,7 +4776,7 @@
           <a:p>
             <a:pPr algn="ctr"/>
             <a:r>
-              <a:rPr lang="en-GB" sz="5400" b="1" cap="none" spc="0" dirty="0" err="1">
+              <a:rPr lang="en-GB" sz="5400" b="1" dirty="0">
                 <a:ln w="12700" cmpd="sng">
                   <a:solidFill>
                     <a:srgbClr val="6214C4"/>
@@ -4786,9 +4786,8 @@
                 <a:solidFill>
                   <a:srgbClr val="03C1A1"/>
                 </a:solidFill>
-                <a:effectLst/>
               </a:rPr>
-              <a:t>uiz</a:t>
+              <a:t>i</a:t>
             </a:r>
             <a:r>
               <a:rPr lang="en-GB" sz="5400" b="1" cap="none" spc="0" dirty="0">
@@ -4803,7 +4802,7 @@
                 </a:solidFill>
                 <a:effectLst/>
               </a:rPr>
-              <a:t>!</a:t>
+              <a:t>s Machine Learning?</a:t>
             </a:r>
           </a:p>
         </p:txBody>

</xml_diff>

<commit_message>
coming soon ui created.
</commit_message>
<xml_diff>
--- a/Additional Content/App Storyboard.pptx
+++ b/Additional Content/App Storyboard.pptx
@@ -208,7 +208,7 @@
           <a:p>
             <a:fld id="{DBC94D5E-0C08-6A4E-9EE5-1EAFAD773097}" type="datetimeFigureOut">
               <a:rPr lang="en-GB" smtClean="0"/>
-              <a:t>18/08/2020</a:t>
+              <a:t>19/08/2020</a:t>
             </a:fld>
             <a:endParaRPr lang="en-GB"/>
           </a:p>
@@ -798,7 +798,7 @@
           <a:p>
             <a:fld id="{FE643DE3-4F0B-9F47-9FDB-A8115BD25AA4}" type="datetimeFigureOut">
               <a:rPr lang="en-US" smtClean="0"/>
-              <a:t>8/18/20</a:t>
+              <a:t>8/19/20</a:t>
             </a:fld>
             <a:endParaRPr lang="en-US"/>
           </a:p>
@@ -998,7 +998,7 @@
           <a:p>
             <a:fld id="{FE643DE3-4F0B-9F47-9FDB-A8115BD25AA4}" type="datetimeFigureOut">
               <a:rPr lang="en-US" smtClean="0"/>
-              <a:t>8/18/20</a:t>
+              <a:t>8/19/20</a:t>
             </a:fld>
             <a:endParaRPr lang="en-US"/>
           </a:p>
@@ -1208,7 +1208,7 @@
           <a:p>
             <a:fld id="{FE643DE3-4F0B-9F47-9FDB-A8115BD25AA4}" type="datetimeFigureOut">
               <a:rPr lang="en-US" smtClean="0"/>
-              <a:t>8/18/20</a:t>
+              <a:t>8/19/20</a:t>
             </a:fld>
             <a:endParaRPr lang="en-US"/>
           </a:p>
@@ -1408,7 +1408,7 @@
           <a:p>
             <a:fld id="{FE643DE3-4F0B-9F47-9FDB-A8115BD25AA4}" type="datetimeFigureOut">
               <a:rPr lang="en-US" smtClean="0"/>
-              <a:t>8/18/20</a:t>
+              <a:t>8/19/20</a:t>
             </a:fld>
             <a:endParaRPr lang="en-US"/>
           </a:p>
@@ -1684,7 +1684,7 @@
           <a:p>
             <a:fld id="{FE643DE3-4F0B-9F47-9FDB-A8115BD25AA4}" type="datetimeFigureOut">
               <a:rPr lang="en-US" smtClean="0"/>
-              <a:t>8/18/20</a:t>
+              <a:t>8/19/20</a:t>
             </a:fld>
             <a:endParaRPr lang="en-US"/>
           </a:p>
@@ -1952,7 +1952,7 @@
           <a:p>
             <a:fld id="{FE643DE3-4F0B-9F47-9FDB-A8115BD25AA4}" type="datetimeFigureOut">
               <a:rPr lang="en-US" smtClean="0"/>
-              <a:t>8/18/20</a:t>
+              <a:t>8/19/20</a:t>
             </a:fld>
             <a:endParaRPr lang="en-US"/>
           </a:p>
@@ -2367,7 +2367,7 @@
           <a:p>
             <a:fld id="{FE643DE3-4F0B-9F47-9FDB-A8115BD25AA4}" type="datetimeFigureOut">
               <a:rPr lang="en-US" smtClean="0"/>
-              <a:t>8/18/20</a:t>
+              <a:t>8/19/20</a:t>
             </a:fld>
             <a:endParaRPr lang="en-US"/>
           </a:p>
@@ -2509,7 +2509,7 @@
           <a:p>
             <a:fld id="{FE643DE3-4F0B-9F47-9FDB-A8115BD25AA4}" type="datetimeFigureOut">
               <a:rPr lang="en-US" smtClean="0"/>
-              <a:t>8/18/20</a:t>
+              <a:t>8/19/20</a:t>
             </a:fld>
             <a:endParaRPr lang="en-US"/>
           </a:p>
@@ -2622,7 +2622,7 @@
           <a:p>
             <a:fld id="{FE643DE3-4F0B-9F47-9FDB-A8115BD25AA4}" type="datetimeFigureOut">
               <a:rPr lang="en-US" smtClean="0"/>
-              <a:t>8/18/20</a:t>
+              <a:t>8/19/20</a:t>
             </a:fld>
             <a:endParaRPr lang="en-US"/>
           </a:p>
@@ -2935,7 +2935,7 @@
           <a:p>
             <a:fld id="{FE643DE3-4F0B-9F47-9FDB-A8115BD25AA4}" type="datetimeFigureOut">
               <a:rPr lang="en-US" smtClean="0"/>
-              <a:t>8/18/20</a:t>
+              <a:t>8/19/20</a:t>
             </a:fld>
             <a:endParaRPr lang="en-US"/>
           </a:p>
@@ -3224,7 +3224,7 @@
           <a:p>
             <a:fld id="{FE643DE3-4F0B-9F47-9FDB-A8115BD25AA4}" type="datetimeFigureOut">
               <a:rPr lang="en-US" smtClean="0"/>
-              <a:t>8/18/20</a:t>
+              <a:t>8/19/20</a:t>
             </a:fld>
             <a:endParaRPr lang="en-US"/>
           </a:p>
@@ -3467,7 +3467,7 @@
           <a:p>
             <a:fld id="{FE643DE3-4F0B-9F47-9FDB-A8115BD25AA4}" type="datetimeFigureOut">
               <a:rPr lang="en-US" smtClean="0"/>
-              <a:t>8/18/20</a:t>
+              <a:t>8/19/20</a:t>
             </a:fld>
             <a:endParaRPr lang="en-US"/>
           </a:p>
@@ -4531,6 +4531,253 @@
           </a:p>
         </p:txBody>
       </p:sp>
+      <p:grpSp>
+        <p:nvGrpSpPr>
+          <p:cNvPr id="5" name="Group 4">
+            <a:extLst>
+              <a:ext uri="{FF2B5EF4-FFF2-40B4-BE49-F238E27FC236}">
+                <a16:creationId xmlns:a16="http://schemas.microsoft.com/office/drawing/2014/main" id="{5011827F-9552-AB47-9BA0-0EF467247A88}"/>
+              </a:ext>
+            </a:extLst>
+          </p:cNvPr>
+          <p:cNvGrpSpPr/>
+          <p:nvPr/>
+        </p:nvGrpSpPr>
+        <p:grpSpPr>
+          <a:xfrm>
+            <a:off x="2227224" y="3715641"/>
+            <a:ext cx="5845670" cy="925328"/>
+            <a:chOff x="-299130" y="1613243"/>
+            <a:chExt cx="5845670" cy="925328"/>
+          </a:xfrm>
+        </p:grpSpPr>
+        <p:sp>
+          <p:nvSpPr>
+            <p:cNvPr id="6" name="Rectangle 5">
+              <a:extLst>
+                <a:ext uri="{FF2B5EF4-FFF2-40B4-BE49-F238E27FC236}">
+                  <a16:creationId xmlns:a16="http://schemas.microsoft.com/office/drawing/2014/main" id="{2EE896FB-3F3C-EC48-92BD-6A579AEBA088}"/>
+                </a:ext>
+              </a:extLst>
+            </p:cNvPr>
+            <p:cNvSpPr/>
+            <p:nvPr/>
+          </p:nvSpPr>
+          <p:spPr>
+            <a:xfrm rot="21121741">
+              <a:off x="-299130" y="1615241"/>
+              <a:ext cx="5845670" cy="923330"/>
+            </a:xfrm>
+            <a:prstGeom prst="rect">
+              <a:avLst/>
+            </a:prstGeom>
+            <a:noFill/>
+          </p:spPr>
+          <p:txBody>
+            <a:bodyPr wrap="square" lIns="91440" tIns="45720" rIns="91440" bIns="45720">
+              <a:spAutoFit/>
+            </a:bodyPr>
+            <a:lstStyle/>
+            <a:p>
+              <a:pPr algn="ctr"/>
+              <a:r>
+                <a:rPr lang="en-GB" sz="5400" b="1" dirty="0">
+                  <a:ln w="12700" cmpd="sng">
+                    <a:solidFill>
+                      <a:srgbClr val="C4623E"/>
+                    </a:solidFill>
+                    <a:prstDash val="solid"/>
+                  </a:ln>
+                  <a:solidFill>
+                    <a:srgbClr val="C3C02C"/>
+                  </a:solidFill>
+                </a:rPr>
+                <a:t>Coming</a:t>
+              </a:r>
+            </a:p>
+          </p:txBody>
+        </p:sp>
+        <p:sp>
+          <p:nvSpPr>
+            <p:cNvPr id="7" name="Rectangle 6">
+              <a:extLst>
+                <a:ext uri="{FF2B5EF4-FFF2-40B4-BE49-F238E27FC236}">
+                  <a16:creationId xmlns:a16="http://schemas.microsoft.com/office/drawing/2014/main" id="{B4C52386-73D2-4846-A40A-3246F9D40098}"/>
+                </a:ext>
+              </a:extLst>
+            </p:cNvPr>
+            <p:cNvSpPr/>
+            <p:nvPr/>
+          </p:nvSpPr>
+          <p:spPr>
+            <a:xfrm>
+              <a:off x="3432082" y="1613243"/>
+              <a:ext cx="341760" cy="923330"/>
+            </a:xfrm>
+            <a:prstGeom prst="rect">
+              <a:avLst/>
+            </a:prstGeom>
+            <a:noFill/>
+          </p:spPr>
+          <p:txBody>
+            <a:bodyPr wrap="none" lIns="91440" tIns="45720" rIns="91440" bIns="45720">
+              <a:spAutoFit/>
+            </a:bodyPr>
+            <a:lstStyle/>
+            <a:p>
+              <a:pPr algn="ctr"/>
+              <a:r>
+                <a:rPr lang="en-GB" sz="5400" b="1" dirty="0">
+                  <a:ln w="12700" cmpd="sng">
+                    <a:solidFill>
+                      <a:srgbClr val="6214C4"/>
+                    </a:solidFill>
+                    <a:prstDash val="solid"/>
+                  </a:ln>
+                  <a:solidFill>
+                    <a:srgbClr val="03C1A1"/>
+                  </a:solidFill>
+                </a:rPr>
+                <a:t> </a:t>
+              </a:r>
+              <a:endParaRPr lang="en-GB" sz="5400" b="1" cap="none" spc="0" dirty="0">
+                <a:ln w="12700" cmpd="sng">
+                  <a:solidFill>
+                    <a:srgbClr val="6214C4"/>
+                  </a:solidFill>
+                  <a:prstDash val="solid"/>
+                </a:ln>
+                <a:solidFill>
+                  <a:srgbClr val="03C1A1"/>
+                </a:solidFill>
+                <a:effectLst/>
+              </a:endParaRPr>
+            </a:p>
+          </p:txBody>
+        </p:sp>
+      </p:grpSp>
+      <p:grpSp>
+        <p:nvGrpSpPr>
+          <p:cNvPr id="8" name="Group 7">
+            <a:extLst>
+              <a:ext uri="{FF2B5EF4-FFF2-40B4-BE49-F238E27FC236}">
+                <a16:creationId xmlns:a16="http://schemas.microsoft.com/office/drawing/2014/main" id="{E3281AD1-6111-7E43-8B2C-6B4F9EFA5486}"/>
+              </a:ext>
+            </a:extLst>
+          </p:cNvPr>
+          <p:cNvGrpSpPr/>
+          <p:nvPr/>
+        </p:nvGrpSpPr>
+        <p:grpSpPr>
+          <a:xfrm rot="1431449">
+            <a:off x="5285399" y="4304940"/>
+            <a:ext cx="2516391" cy="1132301"/>
+            <a:chOff x="6914531" y="1499836"/>
+            <a:chExt cx="2516391" cy="1132301"/>
+          </a:xfrm>
+        </p:grpSpPr>
+        <p:sp>
+          <p:nvSpPr>
+            <p:cNvPr id="9" name="Rectangle 8">
+              <a:extLst>
+                <a:ext uri="{FF2B5EF4-FFF2-40B4-BE49-F238E27FC236}">
+                  <a16:creationId xmlns:a16="http://schemas.microsoft.com/office/drawing/2014/main" id="{2DA75A99-A89F-B847-92EF-F1C67E191F2F}"/>
+                </a:ext>
+              </a:extLst>
+            </p:cNvPr>
+            <p:cNvSpPr/>
+            <p:nvPr/>
+          </p:nvSpPr>
+          <p:spPr>
+            <a:xfrm>
+              <a:off x="7099323" y="1708807"/>
+              <a:ext cx="1992270" cy="923330"/>
+            </a:xfrm>
+            <a:prstGeom prst="rect">
+              <a:avLst/>
+            </a:prstGeom>
+            <a:noFill/>
+          </p:spPr>
+          <p:txBody>
+            <a:bodyPr wrap="square" lIns="91440" tIns="45720" rIns="91440" bIns="45720">
+              <a:spAutoFit/>
+            </a:bodyPr>
+            <a:lstStyle/>
+            <a:p>
+              <a:pPr algn="ctr"/>
+              <a:endParaRPr lang="en-GB" sz="5400" b="1" dirty="0">
+                <a:ln w="12700" cmpd="sng">
+                  <a:solidFill>
+                    <a:srgbClr val="C4623E"/>
+                  </a:solidFill>
+                  <a:prstDash val="solid"/>
+                </a:ln>
+                <a:solidFill>
+                  <a:srgbClr val="C3C02C"/>
+                </a:solidFill>
+              </a:endParaRPr>
+            </a:p>
+          </p:txBody>
+        </p:sp>
+        <p:sp>
+          <p:nvSpPr>
+            <p:cNvPr id="10" name="Rectangle 9">
+              <a:extLst>
+                <a:ext uri="{FF2B5EF4-FFF2-40B4-BE49-F238E27FC236}">
+                  <a16:creationId xmlns:a16="http://schemas.microsoft.com/office/drawing/2014/main" id="{ADB0AB24-2951-9C4C-8F2D-6D02E6809DF2}"/>
+                </a:ext>
+              </a:extLst>
+            </p:cNvPr>
+            <p:cNvSpPr/>
+            <p:nvPr/>
+          </p:nvSpPr>
+          <p:spPr>
+            <a:xfrm rot="20834718">
+              <a:off x="6914531" y="1499836"/>
+              <a:ext cx="2516391" cy="923330"/>
+            </a:xfrm>
+            <a:prstGeom prst="rect">
+              <a:avLst/>
+            </a:prstGeom>
+            <a:noFill/>
+          </p:spPr>
+          <p:txBody>
+            <a:bodyPr wrap="square" lIns="91440" tIns="45720" rIns="91440" bIns="45720">
+              <a:spAutoFit/>
+            </a:bodyPr>
+            <a:lstStyle/>
+            <a:p>
+              <a:pPr algn="ctr"/>
+              <a:r>
+                <a:rPr lang="en-GB" sz="5400" b="1" dirty="0">
+                  <a:ln w="12700" cmpd="sng">
+                    <a:solidFill>
+                      <a:srgbClr val="6214C4"/>
+                    </a:solidFill>
+                    <a:prstDash val="solid"/>
+                  </a:ln>
+                  <a:solidFill>
+                    <a:srgbClr val="03C1A1"/>
+                  </a:solidFill>
+                </a:rPr>
+                <a:t>Soon!</a:t>
+              </a:r>
+              <a:endParaRPr lang="en-GB" sz="5400" b="1" cap="none" spc="0" dirty="0">
+                <a:ln w="12700" cmpd="sng">
+                  <a:solidFill>
+                    <a:srgbClr val="6214C4"/>
+                  </a:solidFill>
+                  <a:prstDash val="solid"/>
+                </a:ln>
+                <a:solidFill>
+                  <a:srgbClr val="03C1A1"/>
+                </a:solidFill>
+                <a:effectLst/>
+              </a:endParaRPr>
+            </a:p>
+          </p:txBody>
+        </p:sp>
+      </p:grpSp>
     </p:spTree>
     <p:extLst>
       <p:ext uri="{BB962C8B-B14F-4D97-AF65-F5344CB8AC3E}">
@@ -4665,7 +4912,7 @@
         </p:nvSpPr>
         <p:spPr>
           <a:xfrm>
-            <a:off x="1257789" y="1742644"/>
+            <a:off x="1161837" y="3854153"/>
             <a:ext cx="9547761" cy="801584"/>
           </a:xfrm>
           <a:prstGeom prst="rect">
@@ -4761,7 +5008,7 @@
                     <a:srgbClr val="C3C02C"/>
                   </a:solidFill>
                 </a:rPr>
-                <a:t>Principal</a:t>
+                <a:t>Coming</a:t>
               </a:r>
             </a:p>
           </p:txBody>
@@ -5251,10 +5498,10 @@
         </p:nvGrpSpPr>
         <p:grpSpPr>
           <a:xfrm>
-            <a:off x="3970810" y="1652186"/>
-            <a:ext cx="6287683" cy="937251"/>
-            <a:chOff x="5616433" y="1708807"/>
-            <a:chExt cx="6287683" cy="937251"/>
+            <a:off x="5453700" y="1652186"/>
+            <a:ext cx="2335410" cy="937251"/>
+            <a:chOff x="7099323" y="1708807"/>
+            <a:chExt cx="2335410" cy="937251"/>
           </a:xfrm>
         </p:grpSpPr>
         <p:sp>
@@ -5314,8 +5561,8 @@
           </p:nvSpPr>
           <p:spPr>
             <a:xfrm>
-              <a:off x="5616433" y="1722728"/>
-              <a:ext cx="6287683" cy="923330"/>
+              <a:off x="7581341" y="1722728"/>
+              <a:ext cx="1853392" cy="923330"/>
             </a:xfrm>
             <a:prstGeom prst="rect">
               <a:avLst/>
@@ -5341,7 +5588,7 @@
                     <a:srgbClr val="03C1A1"/>
                   </a:solidFill>
                 </a:rPr>
-                <a:t>Component Analysis!</a:t>
+                <a:t>Soon!</a:t>
               </a:r>
               <a:endParaRPr lang="en-GB" sz="5400" b="1" cap="none" spc="0" dirty="0">
                 <a:ln w="12700" cmpd="sng">

</xml_diff>

<commit_message>
Data Options Place holder added.
</commit_message>
<xml_diff>
--- a/Additional Content/App Storyboard.pptx
+++ b/Additional Content/App Storyboard.pptx
@@ -208,7 +208,7 @@
           <a:p>
             <a:fld id="{DBC94D5E-0C08-6A4E-9EE5-1EAFAD773097}" type="datetimeFigureOut">
               <a:rPr lang="en-GB" smtClean="0"/>
-              <a:t>19/08/2020</a:t>
+              <a:t>20/08/2020</a:t>
             </a:fld>
             <a:endParaRPr lang="en-GB"/>
           </a:p>
@@ -798,7 +798,7 @@
           <a:p>
             <a:fld id="{FE643DE3-4F0B-9F47-9FDB-A8115BD25AA4}" type="datetimeFigureOut">
               <a:rPr lang="en-US" smtClean="0"/>
-              <a:t>8/19/20</a:t>
+              <a:t>8/20/20</a:t>
             </a:fld>
             <a:endParaRPr lang="en-US"/>
           </a:p>
@@ -998,7 +998,7 @@
           <a:p>
             <a:fld id="{FE643DE3-4F0B-9F47-9FDB-A8115BD25AA4}" type="datetimeFigureOut">
               <a:rPr lang="en-US" smtClean="0"/>
-              <a:t>8/19/20</a:t>
+              <a:t>8/20/20</a:t>
             </a:fld>
             <a:endParaRPr lang="en-US"/>
           </a:p>
@@ -1208,7 +1208,7 @@
           <a:p>
             <a:fld id="{FE643DE3-4F0B-9F47-9FDB-A8115BD25AA4}" type="datetimeFigureOut">
               <a:rPr lang="en-US" smtClean="0"/>
-              <a:t>8/19/20</a:t>
+              <a:t>8/20/20</a:t>
             </a:fld>
             <a:endParaRPr lang="en-US"/>
           </a:p>
@@ -1408,7 +1408,7 @@
           <a:p>
             <a:fld id="{FE643DE3-4F0B-9F47-9FDB-A8115BD25AA4}" type="datetimeFigureOut">
               <a:rPr lang="en-US" smtClean="0"/>
-              <a:t>8/19/20</a:t>
+              <a:t>8/20/20</a:t>
             </a:fld>
             <a:endParaRPr lang="en-US"/>
           </a:p>
@@ -1684,7 +1684,7 @@
           <a:p>
             <a:fld id="{FE643DE3-4F0B-9F47-9FDB-A8115BD25AA4}" type="datetimeFigureOut">
               <a:rPr lang="en-US" smtClean="0"/>
-              <a:t>8/19/20</a:t>
+              <a:t>8/20/20</a:t>
             </a:fld>
             <a:endParaRPr lang="en-US"/>
           </a:p>
@@ -1952,7 +1952,7 @@
           <a:p>
             <a:fld id="{FE643DE3-4F0B-9F47-9FDB-A8115BD25AA4}" type="datetimeFigureOut">
               <a:rPr lang="en-US" smtClean="0"/>
-              <a:t>8/19/20</a:t>
+              <a:t>8/20/20</a:t>
             </a:fld>
             <a:endParaRPr lang="en-US"/>
           </a:p>
@@ -2367,7 +2367,7 @@
           <a:p>
             <a:fld id="{FE643DE3-4F0B-9F47-9FDB-A8115BD25AA4}" type="datetimeFigureOut">
               <a:rPr lang="en-US" smtClean="0"/>
-              <a:t>8/19/20</a:t>
+              <a:t>8/20/20</a:t>
             </a:fld>
             <a:endParaRPr lang="en-US"/>
           </a:p>
@@ -2509,7 +2509,7 @@
           <a:p>
             <a:fld id="{FE643DE3-4F0B-9F47-9FDB-A8115BD25AA4}" type="datetimeFigureOut">
               <a:rPr lang="en-US" smtClean="0"/>
-              <a:t>8/19/20</a:t>
+              <a:t>8/20/20</a:t>
             </a:fld>
             <a:endParaRPr lang="en-US"/>
           </a:p>
@@ -2622,7 +2622,7 @@
           <a:p>
             <a:fld id="{FE643DE3-4F0B-9F47-9FDB-A8115BD25AA4}" type="datetimeFigureOut">
               <a:rPr lang="en-US" smtClean="0"/>
-              <a:t>8/19/20</a:t>
+              <a:t>8/20/20</a:t>
             </a:fld>
             <a:endParaRPr lang="en-US"/>
           </a:p>
@@ -2935,7 +2935,7 @@
           <a:p>
             <a:fld id="{FE643DE3-4F0B-9F47-9FDB-A8115BD25AA4}" type="datetimeFigureOut">
               <a:rPr lang="en-US" smtClean="0"/>
-              <a:t>8/19/20</a:t>
+              <a:t>8/20/20</a:t>
             </a:fld>
             <a:endParaRPr lang="en-US"/>
           </a:p>
@@ -3224,7 +3224,7 @@
           <a:p>
             <a:fld id="{FE643DE3-4F0B-9F47-9FDB-A8115BD25AA4}" type="datetimeFigureOut">
               <a:rPr lang="en-US" smtClean="0"/>
-              <a:t>8/19/20</a:t>
+              <a:t>8/20/20</a:t>
             </a:fld>
             <a:endParaRPr lang="en-US"/>
           </a:p>
@@ -3467,7 +3467,7 @@
           <a:p>
             <a:fld id="{FE643DE3-4F0B-9F47-9FDB-A8115BD25AA4}" type="datetimeFigureOut">
               <a:rPr lang="en-US" smtClean="0"/>
-              <a:t>8/19/20</a:t>
+              <a:t>8/20/20</a:t>
             </a:fld>
             <a:endParaRPr lang="en-US"/>
           </a:p>
@@ -4912,7 +4912,7 @@
         </p:nvSpPr>
         <p:spPr>
           <a:xfrm>
-            <a:off x="1161837" y="3854153"/>
+            <a:off x="1322118" y="1792469"/>
             <a:ext cx="9547761" cy="801584"/>
           </a:xfrm>
           <a:prstGeom prst="rect">
@@ -4947,131 +4947,52 @@
           </a:p>
         </p:txBody>
       </p:sp>
-      <p:grpSp>
-        <p:nvGrpSpPr>
-          <p:cNvPr id="18" name="Group 17">
-            <a:extLst>
-              <a:ext uri="{FF2B5EF4-FFF2-40B4-BE49-F238E27FC236}">
-                <a16:creationId xmlns:a16="http://schemas.microsoft.com/office/drawing/2014/main" id="{B0E80098-713B-C242-B07F-BA4DC5998962}"/>
-              </a:ext>
-            </a:extLst>
-          </p:cNvPr>
-          <p:cNvGrpSpPr/>
+      <p:sp>
+        <p:nvSpPr>
+          <p:cNvPr id="5" name="Rectangle 4">
+            <a:extLst>
+              <a:ext uri="{FF2B5EF4-FFF2-40B4-BE49-F238E27FC236}">
+                <a16:creationId xmlns:a16="http://schemas.microsoft.com/office/drawing/2014/main" id="{FC59767B-29C7-D84F-8909-8296DAE67931}"/>
+              </a:ext>
+            </a:extLst>
+          </p:cNvPr>
+          <p:cNvSpPr/>
           <p:nvPr/>
-        </p:nvGrpSpPr>
-        <p:grpSpPr>
+        </p:nvSpPr>
+        <p:spPr>
           <a:xfrm>
-            <a:off x="325537" y="1643762"/>
-            <a:ext cx="4811335" cy="931982"/>
-            <a:chOff x="217351" y="1604591"/>
-            <a:chExt cx="4811335" cy="931982"/>
+            <a:off x="1390271" y="1654272"/>
+            <a:ext cx="4811335" cy="923330"/>
           </a:xfrm>
-        </p:grpSpPr>
-        <p:sp>
-          <p:nvSpPr>
-            <p:cNvPr id="5" name="Rectangle 4">
-              <a:extLst>
-                <a:ext uri="{FF2B5EF4-FFF2-40B4-BE49-F238E27FC236}">
-                  <a16:creationId xmlns:a16="http://schemas.microsoft.com/office/drawing/2014/main" id="{FC59767B-29C7-D84F-8909-8296DAE67931}"/>
-                </a:ext>
-              </a:extLst>
-            </p:cNvPr>
-            <p:cNvSpPr/>
-            <p:nvPr/>
-          </p:nvSpPr>
-          <p:spPr>
-            <a:xfrm>
-              <a:off x="217351" y="1604591"/>
-              <a:ext cx="4811335" cy="923330"/>
-            </a:xfrm>
-            <a:prstGeom prst="rect">
-              <a:avLst/>
-            </a:prstGeom>
-            <a:noFill/>
-          </p:spPr>
-          <p:txBody>
-            <a:bodyPr wrap="square" lIns="91440" tIns="45720" rIns="91440" bIns="45720">
-              <a:spAutoFit/>
-            </a:bodyPr>
-            <a:lstStyle/>
-            <a:p>
-              <a:pPr algn="ctr"/>
-              <a:r>
-                <a:rPr lang="en-GB" sz="5400" b="1" dirty="0">
-                  <a:ln w="12700" cmpd="sng">
-                    <a:solidFill>
-                      <a:srgbClr val="C4623E"/>
-                    </a:solidFill>
-                    <a:prstDash val="solid"/>
-                  </a:ln>
-                  <a:solidFill>
-                    <a:srgbClr val="C3C02C"/>
-                  </a:solidFill>
-                </a:rPr>
-                <a:t>Coming</a:t>
-              </a:r>
-            </a:p>
-          </p:txBody>
-        </p:sp>
-        <p:sp>
-          <p:nvSpPr>
-            <p:cNvPr id="6" name="Rectangle 5">
-              <a:extLst>
-                <a:ext uri="{FF2B5EF4-FFF2-40B4-BE49-F238E27FC236}">
-                  <a16:creationId xmlns:a16="http://schemas.microsoft.com/office/drawing/2014/main" id="{43F74CAD-D9B8-9647-87FD-0765A2B43177}"/>
-                </a:ext>
-              </a:extLst>
-            </p:cNvPr>
-            <p:cNvSpPr/>
-            <p:nvPr/>
-          </p:nvSpPr>
-          <p:spPr>
-            <a:xfrm>
-              <a:off x="3432082" y="1613243"/>
-              <a:ext cx="341760" cy="923330"/>
-            </a:xfrm>
-            <a:prstGeom prst="rect">
-              <a:avLst/>
-            </a:prstGeom>
-            <a:noFill/>
-          </p:spPr>
-          <p:txBody>
-            <a:bodyPr wrap="none" lIns="91440" tIns="45720" rIns="91440" bIns="45720">
-              <a:spAutoFit/>
-            </a:bodyPr>
-            <a:lstStyle/>
-            <a:p>
-              <a:pPr algn="ctr"/>
-              <a:r>
-                <a:rPr lang="en-GB" sz="5400" b="1" dirty="0">
-                  <a:ln w="12700" cmpd="sng">
-                    <a:solidFill>
-                      <a:srgbClr val="6214C4"/>
-                    </a:solidFill>
-                    <a:prstDash val="solid"/>
-                  </a:ln>
-                  <a:solidFill>
-                    <a:srgbClr val="03C1A1"/>
-                  </a:solidFill>
-                </a:rPr>
-                <a:t> </a:t>
-              </a:r>
-              <a:endParaRPr lang="en-GB" sz="5400" b="1" cap="none" spc="0" dirty="0">
+          <a:prstGeom prst="rect">
+            <a:avLst/>
+          </a:prstGeom>
+          <a:noFill/>
+        </p:spPr>
+        <p:txBody>
+          <a:bodyPr wrap="square" lIns="91440" tIns="45720" rIns="91440" bIns="45720">
+            <a:spAutoFit/>
+          </a:bodyPr>
+          <a:lstStyle/>
+          <a:p>
+            <a:pPr algn="ctr"/>
+            <a:r>
+              <a:rPr lang="en-GB" sz="5400" b="1" dirty="0">
                 <a:ln w="12700" cmpd="sng">
                   <a:solidFill>
-                    <a:srgbClr val="6214C4"/>
+                    <a:srgbClr val="C4623E"/>
                   </a:solidFill>
                   <a:prstDash val="solid"/>
                 </a:ln>
                 <a:solidFill>
-                  <a:srgbClr val="03C1A1"/>
+                  <a:srgbClr val="C3C02C"/>
                 </a:solidFill>
-                <a:effectLst/>
-              </a:endParaRPr>
-            </a:p>
-          </p:txBody>
-        </p:sp>
-      </p:grpSp>
+              </a:rPr>
+              <a:t>As</a:t>
+            </a:r>
+          </a:p>
+        </p:txBody>
+      </p:sp>
       <p:pic>
         <p:nvPicPr>
           <p:cNvPr id="8" name="Picture 7" descr="A screenshot of a cell phone&#10;&#10;Description automatically generated">
@@ -5484,113 +5405,80 @@
           </p:txBody>
         </p:sp>
       </p:grpSp>
-      <p:grpSp>
-        <p:nvGrpSpPr>
-          <p:cNvPr id="17" name="Group 16">
-            <a:extLst>
-              <a:ext uri="{FF2B5EF4-FFF2-40B4-BE49-F238E27FC236}">
-                <a16:creationId xmlns:a16="http://schemas.microsoft.com/office/drawing/2014/main" id="{F0B4468D-1772-E94A-BBF6-FE80170A205A}"/>
-              </a:ext>
-            </a:extLst>
-          </p:cNvPr>
-          <p:cNvGrpSpPr/>
+      <p:sp>
+        <p:nvSpPr>
+          <p:cNvPr id="15" name="Rectangle 14">
+            <a:extLst>
+              <a:ext uri="{FF2B5EF4-FFF2-40B4-BE49-F238E27FC236}">
+                <a16:creationId xmlns:a16="http://schemas.microsoft.com/office/drawing/2014/main" id="{8C426B47-740C-724E-8057-800741E4EEF7}"/>
+              </a:ext>
+            </a:extLst>
+          </p:cNvPr>
+          <p:cNvSpPr/>
           <p:nvPr/>
-        </p:nvGrpSpPr>
-        <p:grpSpPr>
+        </p:nvSpPr>
+        <p:spPr>
           <a:xfrm>
             <a:off x="5453700" y="1652186"/>
-            <a:ext cx="2335410" cy="937251"/>
-            <a:chOff x="7099323" y="1708807"/>
-            <a:chExt cx="2335410" cy="937251"/>
+            <a:ext cx="1992270" cy="923330"/>
           </a:xfrm>
-        </p:grpSpPr>
-        <p:sp>
-          <p:nvSpPr>
-            <p:cNvPr id="15" name="Rectangle 14">
-              <a:extLst>
-                <a:ext uri="{FF2B5EF4-FFF2-40B4-BE49-F238E27FC236}">
-                  <a16:creationId xmlns:a16="http://schemas.microsoft.com/office/drawing/2014/main" id="{8C426B47-740C-724E-8057-800741E4EEF7}"/>
-                </a:ext>
-              </a:extLst>
-            </p:cNvPr>
-            <p:cNvSpPr/>
-            <p:nvPr/>
-          </p:nvSpPr>
-          <p:spPr>
-            <a:xfrm>
-              <a:off x="7099323" y="1708807"/>
-              <a:ext cx="1992270" cy="923330"/>
-            </a:xfrm>
-            <a:prstGeom prst="rect">
-              <a:avLst/>
-            </a:prstGeom>
-            <a:noFill/>
-          </p:spPr>
-          <p:txBody>
-            <a:bodyPr wrap="square" lIns="91440" tIns="45720" rIns="91440" bIns="45720">
-              <a:spAutoFit/>
-            </a:bodyPr>
-            <a:lstStyle/>
-            <a:p>
-              <a:pPr algn="ctr"/>
-              <a:endParaRPr lang="en-GB" sz="5400" b="1" dirty="0">
-                <a:ln w="12700" cmpd="sng">
-                  <a:solidFill>
-                    <a:srgbClr val="C4623E"/>
-                  </a:solidFill>
-                  <a:prstDash val="solid"/>
-                </a:ln>
+          <a:prstGeom prst="rect">
+            <a:avLst/>
+          </a:prstGeom>
+          <a:noFill/>
+        </p:spPr>
+        <p:txBody>
+          <a:bodyPr wrap="square" lIns="91440" tIns="45720" rIns="91440" bIns="45720">
+            <a:spAutoFit/>
+          </a:bodyPr>
+          <a:lstStyle/>
+          <a:p>
+            <a:pPr algn="ctr"/>
+            <a:endParaRPr lang="en-GB" sz="5400" b="1" dirty="0">
+              <a:ln w="12700" cmpd="sng">
                 <a:solidFill>
-                  <a:srgbClr val="C3C02C"/>
+                  <a:srgbClr val="C4623E"/>
                 </a:solidFill>
-              </a:endParaRPr>
-            </a:p>
-          </p:txBody>
-        </p:sp>
-        <p:sp>
-          <p:nvSpPr>
-            <p:cNvPr id="16" name="Rectangle 15">
-              <a:extLst>
-                <a:ext uri="{FF2B5EF4-FFF2-40B4-BE49-F238E27FC236}">
-                  <a16:creationId xmlns:a16="http://schemas.microsoft.com/office/drawing/2014/main" id="{F2C3EE6A-0356-C94A-ADA3-356D917B261A}"/>
-                </a:ext>
-              </a:extLst>
-            </p:cNvPr>
-            <p:cNvSpPr/>
-            <p:nvPr/>
-          </p:nvSpPr>
-          <p:spPr>
-            <a:xfrm>
-              <a:off x="7581341" y="1722728"/>
-              <a:ext cx="1853392" cy="923330"/>
-            </a:xfrm>
-            <a:prstGeom prst="rect">
-              <a:avLst/>
-            </a:prstGeom>
-            <a:noFill/>
-          </p:spPr>
-          <p:txBody>
-            <a:bodyPr wrap="none" lIns="91440" tIns="45720" rIns="91440" bIns="45720">
-              <a:spAutoFit/>
-            </a:bodyPr>
-            <a:lstStyle/>
-            <a:p>
-              <a:pPr algn="ctr"/>
-              <a:r>
-                <a:rPr lang="en-GB" sz="5400" b="1" dirty="0">
-                  <a:ln w="12700" cmpd="sng">
-                    <a:solidFill>
-                      <a:srgbClr val="6214C4"/>
-                    </a:solidFill>
-                    <a:prstDash val="solid"/>
-                  </a:ln>
-                  <a:solidFill>
-                    <a:srgbClr val="03C1A1"/>
-                  </a:solidFill>
-                </a:rPr>
-                <a:t>Soon!</a:t>
-              </a:r>
-              <a:endParaRPr lang="en-GB" sz="5400" b="1" cap="none" spc="0" dirty="0">
+                <a:prstDash val="solid"/>
+              </a:ln>
+              <a:solidFill>
+                <a:srgbClr val="C3C02C"/>
+              </a:solidFill>
+            </a:endParaRPr>
+          </a:p>
+        </p:txBody>
+      </p:sp>
+      <p:sp>
+        <p:nvSpPr>
+          <p:cNvPr id="16" name="Rectangle 15">
+            <a:extLst>
+              <a:ext uri="{FF2B5EF4-FFF2-40B4-BE49-F238E27FC236}">
+                <a16:creationId xmlns:a16="http://schemas.microsoft.com/office/drawing/2014/main" id="{F2C3EE6A-0356-C94A-ADA3-356D917B261A}"/>
+              </a:ext>
+            </a:extLst>
+          </p:cNvPr>
+          <p:cNvSpPr/>
+          <p:nvPr/>
+        </p:nvSpPr>
+        <p:spPr>
+          <a:xfrm>
+            <a:off x="4019088" y="1645824"/>
+            <a:ext cx="3007554" cy="923330"/>
+          </a:xfrm>
+          <a:prstGeom prst="rect">
+            <a:avLst/>
+          </a:prstGeom>
+          <a:noFill/>
+        </p:spPr>
+        <p:txBody>
+          <a:bodyPr wrap="none" lIns="91440" tIns="45720" rIns="91440" bIns="45720">
+            <a:spAutoFit/>
+          </a:bodyPr>
+          <a:lstStyle/>
+          <a:p>
+            <a:pPr algn="ctr"/>
+            <a:r>
+              <a:rPr lang="en-GB" sz="5400" b="1" dirty="0">
                 <a:ln w="12700" cmpd="sng">
                   <a:solidFill>
                     <a:srgbClr val="6214C4"/>
@@ -5600,12 +5488,24 @@
                 <a:solidFill>
                   <a:srgbClr val="03C1A1"/>
                 </a:solidFill>
-                <a:effectLst/>
-              </a:endParaRPr>
-            </a:p>
-          </p:txBody>
-        </p:sp>
-      </p:grpSp>
+              </a:rPr>
+              <a:t>sociation!</a:t>
+            </a:r>
+            <a:endParaRPr lang="en-GB" sz="5400" b="1" cap="none" spc="0" dirty="0">
+              <a:ln w="12700" cmpd="sng">
+                <a:solidFill>
+                  <a:srgbClr val="6214C4"/>
+                </a:solidFill>
+                <a:prstDash val="solid"/>
+              </a:ln>
+              <a:solidFill>
+                <a:srgbClr val="03C1A1"/>
+              </a:solidFill>
+              <a:effectLst/>
+            </a:endParaRPr>
+          </a:p>
+        </p:txBody>
+      </p:sp>
       <p:sp>
         <p:nvSpPr>
           <p:cNvPr id="19" name="Rectangle 18">

</xml_diff>